<commit_message>
modify jsonify process for asset_body
</commit_message>
<xml_diff>
--- a/docs/Target_of_this_project.pptx
+++ b/docs/Target_of_this_project.pptx
@@ -5,7 +5,7 @@
     <p:sldMasterId id="2147483648" r:id="rId1"/>
   </p:sldMasterIdLst>
   <p:notesMasterIdLst>
-    <p:notesMasterId r:id="rId22"/>
+    <p:notesMasterId r:id="rId27"/>
   </p:notesMasterIdLst>
   <p:sldIdLst>
     <p:sldId id="256" r:id="rId2"/>
@@ -24,10 +24,15 @@
     <p:sldId id="447" r:id="rId15"/>
     <p:sldId id="449" r:id="rId16"/>
     <p:sldId id="450" r:id="rId17"/>
-    <p:sldId id="452" r:id="rId18"/>
-    <p:sldId id="451" r:id="rId19"/>
-    <p:sldId id="453" r:id="rId20"/>
-    <p:sldId id="388" r:id="rId21"/>
+    <p:sldId id="458" r:id="rId18"/>
+    <p:sldId id="455" r:id="rId19"/>
+    <p:sldId id="456" r:id="rId20"/>
+    <p:sldId id="457" r:id="rId21"/>
+    <p:sldId id="459" r:id="rId22"/>
+    <p:sldId id="452" r:id="rId23"/>
+    <p:sldId id="451" r:id="rId24"/>
+    <p:sldId id="453" r:id="rId25"/>
+    <p:sldId id="388" r:id="rId26"/>
   </p:sldIdLst>
   <p:sldSz cx="12192000" cy="6858000"/>
   <p:notesSz cx="6858000" cy="9144000"/>
@@ -223,7 +228,7 @@
             <a:fld id="{5BDC7EC5-8995-CC45-A291-77806FE6ECE7}" type="datetimeFigureOut">
               <a:rPr lang="ja-JP" altLang="en-US" smtClean="0"/>
               <a:pPr/>
-              <a:t>2019/8/4</a:t>
+              <a:t>2019/8/8</a:t>
             </a:fld>
             <a:endParaRPr lang="ja-JP" altLang="en-US"/>
           </a:p>
@@ -842,7 +847,7 @@
           <a:p>
             <a:fld id="{05DE190B-F1D7-EA44-8903-46CB7339DA92}" type="datetime1">
               <a:rPr lang="ja-JP" altLang="en-US" smtClean="0"/>
-              <a:t>2019/8/4</a:t>
+              <a:t>2019/8/8</a:t>
             </a:fld>
             <a:endParaRPr lang="ja-JP" altLang="en-US"/>
           </a:p>
@@ -1063,7 +1068,7 @@
           <a:p>
             <a:fld id="{3579CAEB-AE3C-7341-9C68-DA130958E2A8}" type="datetime1">
               <a:rPr kumimoji="1" lang="ja-JP" altLang="en-US" smtClean="0"/>
-              <a:t>2019/8/4</a:t>
+              <a:t>2019/8/8</a:t>
             </a:fld>
             <a:endParaRPr kumimoji="1" lang="ja-JP" altLang="en-US"/>
           </a:p>
@@ -1277,7 +1282,7 @@
           <a:p>
             <a:fld id="{5AD8456B-06EB-C24F-BD52-5B70BCFA0E42}" type="datetime1">
               <a:rPr kumimoji="1" lang="ja-JP" altLang="en-US" smtClean="0"/>
-              <a:t>2019/8/4</a:t>
+              <a:t>2019/8/8</a:t>
             </a:fld>
             <a:endParaRPr kumimoji="1" lang="ja-JP" altLang="en-US"/>
           </a:p>
@@ -1481,7 +1486,7 @@
           <a:p>
             <a:fld id="{C3C72ADA-05E1-D94C-87DF-DF5B5B18AE34}" type="datetime1">
               <a:rPr kumimoji="1" lang="ja-JP" altLang="en-US" smtClean="0"/>
-              <a:t>2019/8/4</a:t>
+              <a:t>2019/8/8</a:t>
             </a:fld>
             <a:endParaRPr kumimoji="1" lang="ja-JP" altLang="en-US"/>
           </a:p>
@@ -1730,7 +1735,7 @@
           <a:p>
             <a:fld id="{D0E8D2BB-56AC-354A-8085-91AF7C4D955B}" type="datetime1">
               <a:rPr kumimoji="1" lang="ja-JP" altLang="en-US" smtClean="0"/>
-              <a:t>2019/8/4</a:t>
+              <a:t>2019/8/8</a:t>
             </a:fld>
             <a:endParaRPr kumimoji="1" lang="ja-JP" altLang="en-US"/>
           </a:p>
@@ -2027,7 +2032,7 @@
           <a:p>
             <a:fld id="{0969224F-CBC4-A64C-A49F-CCE3FDC0DE13}" type="datetime1">
               <a:rPr kumimoji="1" lang="ja-JP" altLang="en-US" smtClean="0"/>
-              <a:t>2019/8/4</a:t>
+              <a:t>2019/8/8</a:t>
             </a:fld>
             <a:endParaRPr kumimoji="1" lang="ja-JP" altLang="en-US"/>
           </a:p>
@@ -2459,7 +2464,7 @@
           <a:p>
             <a:fld id="{76677165-D91B-A14B-98F7-F22D9A7C4B56}" type="datetime1">
               <a:rPr kumimoji="1" lang="ja-JP" altLang="en-US" smtClean="0"/>
-              <a:t>2019/8/4</a:t>
+              <a:t>2019/8/8</a:t>
             </a:fld>
             <a:endParaRPr kumimoji="1" lang="ja-JP" altLang="en-US"/>
           </a:p>
@@ -2580,7 +2585,7 @@
           <a:p>
             <a:fld id="{A8C39C33-2D1D-3C41-9473-5A82E3029E7E}" type="datetime1">
               <a:rPr kumimoji="1" lang="ja-JP" altLang="en-US" smtClean="0"/>
-              <a:t>2019/8/4</a:t>
+              <a:t>2019/8/8</a:t>
             </a:fld>
             <a:endParaRPr kumimoji="1" lang="ja-JP" altLang="en-US"/>
           </a:p>
@@ -2679,7 +2684,7 @@
           <a:p>
             <a:fld id="{475ABA58-7C7E-2149-A47D-2581A521B814}" type="datetime1">
               <a:rPr kumimoji="1" lang="ja-JP" altLang="en-US" smtClean="0"/>
-              <a:t>2019/8/4</a:t>
+              <a:t>2019/8/8</a:t>
             </a:fld>
             <a:endParaRPr kumimoji="1" lang="ja-JP" altLang="en-US"/>
           </a:p>
@@ -2990,7 +2995,7 @@
           <a:p>
             <a:fld id="{32CA821F-8314-554C-96BA-C257B7D162E7}" type="datetime1">
               <a:rPr kumimoji="1" lang="ja-JP" altLang="en-US" smtClean="0"/>
-              <a:t>2019/8/4</a:t>
+              <a:t>2019/8/8</a:t>
             </a:fld>
             <a:endParaRPr kumimoji="1" lang="ja-JP" altLang="en-US"/>
           </a:p>
@@ -3246,7 +3251,7 @@
           <a:p>
             <a:fld id="{A5C81035-2555-294D-A2B2-46F0DC92DFCD}" type="datetime1">
               <a:rPr kumimoji="1" lang="ja-JP" altLang="en-US" smtClean="0"/>
-              <a:t>2019/8/4</a:t>
+              <a:t>2019/8/8</a:t>
             </a:fld>
             <a:endParaRPr kumimoji="1" lang="ja-JP" altLang="en-US"/>
           </a:p>
@@ -3496,7 +3501,7 @@
           <a:p>
             <a:fld id="{9BC4F1F0-0588-2D44-B26F-78F8AC4301F5}" type="datetime1">
               <a:rPr lang="ja-JP" altLang="en-US" smtClean="0"/>
-              <a:t>2019/8/4</a:t>
+              <a:t>2019/8/8</a:t>
             </a:fld>
             <a:endParaRPr lang="ja-JP" altLang="en-US"/>
           </a:p>
@@ -8524,8 +8529,8 @@
         </p:nvSpPr>
         <p:spPr>
           <a:xfrm>
-            <a:off x="3615923" y="2422077"/>
-            <a:ext cx="1093076" cy="276999"/>
+            <a:off x="3615923" y="2314500"/>
+            <a:ext cx="1093076" cy="461665"/>
           </a:xfrm>
           <a:prstGeom prst="rect">
             <a:avLst/>
@@ -8539,12 +8544,8 @@
           <a:lstStyle/>
           <a:p>
             <a:r>
-              <a:rPr kumimoji="1" lang="en-US" altLang="ja-JP" sz="1200" dirty="0" err="1"/>
-              <a:t>attr</a:t>
-            </a:r>
-            <a:r>
               <a:rPr kumimoji="1" lang="en-US" altLang="ja-JP" sz="1200" dirty="0"/>
-              <a:t>: pointer</a:t>
+              <a:t>property: pointer</a:t>
             </a:r>
             <a:endParaRPr kumimoji="1" lang="ja-JP" altLang="en-US" sz="1200"/>
           </a:p>
@@ -8564,8 +8565,8 @@
         </p:nvSpPr>
         <p:spPr>
           <a:xfrm>
-            <a:off x="3622614" y="4042859"/>
-            <a:ext cx="1093076" cy="276999"/>
+            <a:off x="3622614" y="3837541"/>
+            <a:ext cx="1093076" cy="461665"/>
           </a:xfrm>
           <a:prstGeom prst="rect">
             <a:avLst/>
@@ -8579,12 +8580,8 @@
           <a:lstStyle/>
           <a:p>
             <a:r>
-              <a:rPr kumimoji="1" lang="en-US" altLang="ja-JP" sz="1200" dirty="0" err="1"/>
-              <a:t>attr</a:t>
-            </a:r>
-            <a:r>
               <a:rPr kumimoji="1" lang="en-US" altLang="ja-JP" sz="1200" dirty="0"/>
-              <a:t>: pointer</a:t>
+              <a:t>property: pointer</a:t>
             </a:r>
             <a:endParaRPr kumimoji="1" lang="ja-JP" altLang="en-US" sz="1200"/>
           </a:p>
@@ -8604,8 +8601,8 @@
         </p:nvSpPr>
         <p:spPr>
           <a:xfrm>
-            <a:off x="7198367" y="2177533"/>
-            <a:ext cx="1093076" cy="276999"/>
+            <a:off x="7198367" y="2069956"/>
+            <a:ext cx="1093076" cy="461665"/>
           </a:xfrm>
           <a:prstGeom prst="rect">
             <a:avLst/>
@@ -8619,12 +8616,8 @@
           <a:lstStyle/>
           <a:p>
             <a:r>
-              <a:rPr kumimoji="1" lang="en-US" altLang="ja-JP" sz="1200" dirty="0" err="1"/>
-              <a:t>attr</a:t>
-            </a:r>
-            <a:r>
               <a:rPr kumimoji="1" lang="en-US" altLang="ja-JP" sz="1200" dirty="0"/>
-              <a:t>: pointer</a:t>
+              <a:t>property: pointer</a:t>
             </a:r>
             <a:endParaRPr kumimoji="1" lang="ja-JP" altLang="en-US" sz="1200"/>
           </a:p>
@@ -8644,8 +8637,8 @@
         </p:nvSpPr>
         <p:spPr>
           <a:xfrm>
-            <a:off x="7550463" y="3148505"/>
-            <a:ext cx="1093076" cy="276999"/>
+            <a:off x="7788044" y="3040652"/>
+            <a:ext cx="1093076" cy="461665"/>
           </a:xfrm>
           <a:prstGeom prst="rect">
             <a:avLst/>
@@ -8659,12 +8652,8 @@
           <a:lstStyle/>
           <a:p>
             <a:r>
-              <a:rPr kumimoji="1" lang="en-US" altLang="ja-JP" sz="1200" dirty="0" err="1"/>
-              <a:t>attr</a:t>
-            </a:r>
-            <a:r>
               <a:rPr kumimoji="1" lang="en-US" altLang="ja-JP" sz="1200" dirty="0"/>
-              <a:t>: pointer</a:t>
+              <a:t>property: pointer</a:t>
             </a:r>
             <a:endParaRPr kumimoji="1" lang="ja-JP" altLang="en-US" sz="1200"/>
           </a:p>
@@ -8684,8 +8673,8 @@
         </p:nvSpPr>
         <p:spPr>
           <a:xfrm>
-            <a:off x="6985193" y="4247294"/>
-            <a:ext cx="1093076" cy="276999"/>
+            <a:off x="6985193" y="4139717"/>
+            <a:ext cx="1093076" cy="461665"/>
           </a:xfrm>
           <a:prstGeom prst="rect">
             <a:avLst/>
@@ -8699,12 +8688,8 @@
           <a:lstStyle/>
           <a:p>
             <a:r>
-              <a:rPr kumimoji="1" lang="en-US" altLang="ja-JP" sz="1200" dirty="0" err="1"/>
-              <a:t>attr</a:t>
-            </a:r>
-            <a:r>
               <a:rPr kumimoji="1" lang="en-US" altLang="ja-JP" sz="1200" dirty="0"/>
-              <a:t>: pointer</a:t>
+              <a:t>property: pointer</a:t>
             </a:r>
             <a:endParaRPr kumimoji="1" lang="ja-JP" altLang="en-US" sz="1200"/>
           </a:p>
@@ -8725,7 +8710,7 @@
         <p:spPr>
           <a:xfrm>
             <a:off x="7024458" y="4949636"/>
-            <a:ext cx="1093076" cy="276999"/>
+            <a:ext cx="1093076" cy="461665"/>
           </a:xfrm>
           <a:prstGeom prst="rect">
             <a:avLst/>
@@ -8739,12 +8724,8 @@
           <a:lstStyle/>
           <a:p>
             <a:r>
-              <a:rPr kumimoji="1" lang="en-US" altLang="ja-JP" sz="1200" dirty="0" err="1"/>
-              <a:t>attr</a:t>
-            </a:r>
-            <a:r>
               <a:rPr kumimoji="1" lang="en-US" altLang="ja-JP" sz="1200" dirty="0"/>
-              <a:t>: pointer</a:t>
+              <a:t>property: pointer</a:t>
             </a:r>
             <a:endParaRPr kumimoji="1" lang="ja-JP" altLang="en-US" sz="1200"/>
           </a:p>
@@ -8765,7 +8746,7 @@
         <p:spPr>
           <a:xfrm>
             <a:off x="1234723" y="3425377"/>
-            <a:ext cx="1440889" cy="276999"/>
+            <a:ext cx="1440889" cy="461665"/>
           </a:xfrm>
           <a:prstGeom prst="rect">
             <a:avLst/>
@@ -8779,12 +8760,8 @@
           <a:lstStyle/>
           <a:p>
             <a:r>
-              <a:rPr kumimoji="1" lang="en-US" altLang="ja-JP" sz="1200" dirty="0" err="1"/>
-              <a:t>attr</a:t>
-            </a:r>
-            <a:r>
               <a:rPr kumimoji="1" lang="en-US" altLang="ja-JP" sz="1200" dirty="0"/>
-              <a:t>: transaction</a:t>
+              <a:t>property: transaction</a:t>
             </a:r>
             <a:endParaRPr kumimoji="1" lang="ja-JP" altLang="en-US" sz="1200"/>
           </a:p>
@@ -8804,8 +8781,8 @@
         </p:nvSpPr>
         <p:spPr>
           <a:xfrm>
-            <a:off x="9729951" y="4644271"/>
-            <a:ext cx="1440889" cy="276999"/>
+            <a:off x="9729951" y="4580791"/>
+            <a:ext cx="1440889" cy="461665"/>
           </a:xfrm>
           <a:prstGeom prst="rect">
             <a:avLst/>
@@ -8819,12 +8796,8 @@
           <a:lstStyle/>
           <a:p>
             <a:r>
-              <a:rPr kumimoji="1" lang="en-US" altLang="ja-JP" sz="1200" dirty="0" err="1"/>
-              <a:t>attr</a:t>
-            </a:r>
-            <a:r>
               <a:rPr kumimoji="1" lang="en-US" altLang="ja-JP" sz="1200" dirty="0"/>
-              <a:t>: transaction</a:t>
+              <a:t>property: transaction</a:t>
             </a:r>
             <a:endParaRPr kumimoji="1" lang="ja-JP" altLang="en-US" sz="1200"/>
           </a:p>
@@ -8832,10 +8805,10 @@
       </p:sp>
       <p:sp>
         <p:nvSpPr>
-          <p:cNvPr id="7" name="角丸四角形吹き出し 6">
-            <a:extLst>
-              <a:ext uri="{FF2B5EF4-FFF2-40B4-BE49-F238E27FC236}">
-                <a16:creationId xmlns:a16="http://schemas.microsoft.com/office/drawing/2014/main" id="{4F40E744-E194-8447-9FD8-E6F983EA8C59}"/>
+          <p:cNvPr id="44" name="角丸四角形吹き出し 43">
+            <a:extLst>
+              <a:ext uri="{FF2B5EF4-FFF2-40B4-BE49-F238E27FC236}">
+                <a16:creationId xmlns:a16="http://schemas.microsoft.com/office/drawing/2014/main" id="{94C2870F-0E39-5B40-BD44-EC19BA93B71A}"/>
               </a:ext>
             </a:extLst>
           </p:cNvPr>
@@ -8844,8 +8817,8 @@
         </p:nvSpPr>
         <p:spPr>
           <a:xfrm>
-            <a:off x="1470961" y="2256074"/>
-            <a:ext cx="1730657" cy="298809"/>
+            <a:off x="4747263" y="1885062"/>
+            <a:ext cx="1847176" cy="298809"/>
           </a:xfrm>
           <a:prstGeom prst="wedgeRoundRectCallout">
             <a:avLst>
@@ -8875,34 +8848,19 @@
           <a:p>
             <a:pPr algn="ctr"/>
             <a:r>
-              <a:rPr lang="en-US" altLang="ja-JP" sz="1200" dirty="0" err="1"/>
-              <a:t>a</a:t>
-            </a:r>
-            <a:r>
-              <a:rPr kumimoji="1" lang="en-US" altLang="ja-JP" sz="1200" dirty="0" err="1"/>
-              <a:t>ttr</a:t>
-            </a:r>
-            <a:r>
-              <a:rPr kumimoji="1" lang="en-US" altLang="ja-JP" sz="1200" dirty="0"/>
-              <a:t>: </a:t>
-            </a:r>
-            <a:r>
-              <a:rPr kumimoji="1" lang="en-US" altLang="ja-JP" sz="1200" dirty="0" err="1"/>
-              <a:t>asset_body</a:t>
-            </a:r>
-            <a:r>
-              <a:rPr kumimoji="1" lang="ja-JP" altLang="en-US" sz="1200"/>
-              <a:t>など</a:t>
-            </a:r>
-          </a:p>
-        </p:txBody>
-      </p:sp>
-      <p:sp>
-        <p:nvSpPr>
-          <p:cNvPr id="44" name="角丸四角形吹き出し 43">
-            <a:extLst>
-              <a:ext uri="{FF2B5EF4-FFF2-40B4-BE49-F238E27FC236}">
-                <a16:creationId xmlns:a16="http://schemas.microsoft.com/office/drawing/2014/main" id="{94C2870F-0E39-5B40-BD44-EC19BA93B71A}"/>
+              <a:rPr lang="en-US" altLang="ja-JP" sz="1200" dirty="0"/>
+              <a:t>with various properties</a:t>
+            </a:r>
+            <a:endParaRPr kumimoji="1" lang="ja-JP" altLang="en-US" sz="1200"/>
+          </a:p>
+        </p:txBody>
+      </p:sp>
+      <p:sp>
+        <p:nvSpPr>
+          <p:cNvPr id="41" name="角丸四角形吹き出し 40">
+            <a:extLst>
+              <a:ext uri="{FF2B5EF4-FFF2-40B4-BE49-F238E27FC236}">
+                <a16:creationId xmlns:a16="http://schemas.microsoft.com/office/drawing/2014/main" id="{34D4DB92-1031-304D-AF35-F21ACFFD8301}"/>
               </a:ext>
             </a:extLst>
           </p:cNvPr>
@@ -8911,8 +8869,8 @@
         </p:nvSpPr>
         <p:spPr>
           <a:xfrm>
-            <a:off x="4747263" y="1885062"/>
-            <a:ext cx="1730657" cy="298809"/>
+            <a:off x="1483610" y="2338021"/>
+            <a:ext cx="1847176" cy="298809"/>
           </a:xfrm>
           <a:prstGeom prst="wedgeRoundRectCallout">
             <a:avLst>
@@ -8942,34 +8900,19 @@
           <a:p>
             <a:pPr algn="ctr"/>
             <a:r>
-              <a:rPr lang="en-US" altLang="ja-JP" sz="1200" dirty="0" err="1"/>
-              <a:t>a</a:t>
-            </a:r>
-            <a:r>
-              <a:rPr kumimoji="1" lang="en-US" altLang="ja-JP" sz="1200" dirty="0" err="1"/>
-              <a:t>ttr</a:t>
-            </a:r>
-            <a:r>
-              <a:rPr kumimoji="1" lang="en-US" altLang="ja-JP" sz="1200" dirty="0"/>
-              <a:t>: </a:t>
-            </a:r>
-            <a:r>
-              <a:rPr kumimoji="1" lang="en-US" altLang="ja-JP" sz="1200" dirty="0" err="1"/>
-              <a:t>asset_body</a:t>
-            </a:r>
-            <a:r>
-              <a:rPr kumimoji="1" lang="ja-JP" altLang="en-US" sz="1200"/>
-              <a:t>など</a:t>
-            </a:r>
-          </a:p>
-        </p:txBody>
-      </p:sp>
-      <p:sp>
-        <p:nvSpPr>
-          <p:cNvPr id="45" name="角丸四角形吹き出し 44">
-            <a:extLst>
-              <a:ext uri="{FF2B5EF4-FFF2-40B4-BE49-F238E27FC236}">
-                <a16:creationId xmlns:a16="http://schemas.microsoft.com/office/drawing/2014/main" id="{4373C230-2EFF-484D-B725-56F74B517089}"/>
+              <a:rPr lang="en-US" altLang="ja-JP" sz="1200" dirty="0"/>
+              <a:t>with various properties</a:t>
+            </a:r>
+            <a:endParaRPr kumimoji="1" lang="ja-JP" altLang="en-US" sz="1200"/>
+          </a:p>
+        </p:txBody>
+      </p:sp>
+      <p:sp>
+        <p:nvSpPr>
+          <p:cNvPr id="42" name="角丸四角形吹き出し 41">
+            <a:extLst>
+              <a:ext uri="{FF2B5EF4-FFF2-40B4-BE49-F238E27FC236}">
+                <a16:creationId xmlns:a16="http://schemas.microsoft.com/office/drawing/2014/main" id="{858AACD0-1C73-AE47-A022-79B42C47DFF3}"/>
               </a:ext>
             </a:extLst>
           </p:cNvPr>
@@ -8978,8 +8921,8 @@
         </p:nvSpPr>
         <p:spPr>
           <a:xfrm>
-            <a:off x="8712776" y="1690688"/>
-            <a:ext cx="1730657" cy="298809"/>
+            <a:off x="8806363" y="1735657"/>
+            <a:ext cx="1847176" cy="298809"/>
           </a:xfrm>
           <a:prstGeom prst="wedgeRoundRectCallout">
             <a:avLst>
@@ -9009,34 +8952,19 @@
           <a:p>
             <a:pPr algn="ctr"/>
             <a:r>
-              <a:rPr lang="en-US" altLang="ja-JP" sz="1200" dirty="0" err="1"/>
-              <a:t>a</a:t>
-            </a:r>
-            <a:r>
-              <a:rPr kumimoji="1" lang="en-US" altLang="ja-JP" sz="1200" dirty="0" err="1"/>
-              <a:t>ttr</a:t>
-            </a:r>
-            <a:r>
-              <a:rPr kumimoji="1" lang="en-US" altLang="ja-JP" sz="1200" dirty="0"/>
-              <a:t>: </a:t>
-            </a:r>
-            <a:r>
-              <a:rPr kumimoji="1" lang="en-US" altLang="ja-JP" sz="1200" dirty="0" err="1"/>
-              <a:t>asset_body</a:t>
-            </a:r>
-            <a:r>
-              <a:rPr kumimoji="1" lang="ja-JP" altLang="en-US" sz="1200"/>
-              <a:t>など</a:t>
-            </a:r>
-          </a:p>
-        </p:txBody>
-      </p:sp>
-      <p:sp>
-        <p:nvSpPr>
-          <p:cNvPr id="46" name="角丸四角形吹き出し 45">
-            <a:extLst>
-              <a:ext uri="{FF2B5EF4-FFF2-40B4-BE49-F238E27FC236}">
-                <a16:creationId xmlns:a16="http://schemas.microsoft.com/office/drawing/2014/main" id="{538B06B8-89BB-8B4F-853A-00F2D64422FE}"/>
+              <a:rPr lang="en-US" altLang="ja-JP" sz="1200" dirty="0"/>
+              <a:t>with various properties</a:t>
+            </a:r>
+            <a:endParaRPr kumimoji="1" lang="ja-JP" altLang="en-US" sz="1200"/>
+          </a:p>
+        </p:txBody>
+      </p:sp>
+      <p:sp>
+        <p:nvSpPr>
+          <p:cNvPr id="43" name="角丸四角形吹き出し 42">
+            <a:extLst>
+              <a:ext uri="{FF2B5EF4-FFF2-40B4-BE49-F238E27FC236}">
+                <a16:creationId xmlns:a16="http://schemas.microsoft.com/office/drawing/2014/main" id="{784AB264-46C8-6C40-B8DF-CD58BC018895}"/>
               </a:ext>
             </a:extLst>
           </p:cNvPr>
@@ -9045,8 +8973,8 @@
         </p:nvSpPr>
         <p:spPr>
           <a:xfrm>
-            <a:off x="8719738" y="3660032"/>
-            <a:ext cx="1730657" cy="298809"/>
+            <a:off x="8831347" y="3693057"/>
+            <a:ext cx="1847176" cy="298809"/>
           </a:xfrm>
           <a:prstGeom prst="wedgeRoundRectCallout">
             <a:avLst>
@@ -9076,34 +9004,19 @@
           <a:p>
             <a:pPr algn="ctr"/>
             <a:r>
-              <a:rPr lang="en-US" altLang="ja-JP" sz="1200" dirty="0" err="1"/>
-              <a:t>a</a:t>
-            </a:r>
-            <a:r>
-              <a:rPr kumimoji="1" lang="en-US" altLang="ja-JP" sz="1200" dirty="0" err="1"/>
-              <a:t>ttr</a:t>
-            </a:r>
-            <a:r>
-              <a:rPr kumimoji="1" lang="en-US" altLang="ja-JP" sz="1200" dirty="0"/>
-              <a:t>: </a:t>
-            </a:r>
-            <a:r>
-              <a:rPr kumimoji="1" lang="en-US" altLang="ja-JP" sz="1200" dirty="0" err="1"/>
-              <a:t>asset_body</a:t>
-            </a:r>
-            <a:r>
-              <a:rPr kumimoji="1" lang="ja-JP" altLang="en-US" sz="1200"/>
-              <a:t>など</a:t>
-            </a:r>
-          </a:p>
-        </p:txBody>
-      </p:sp>
-      <p:sp>
-        <p:nvSpPr>
-          <p:cNvPr id="48" name="角丸四角形吹き出し 47">
-            <a:extLst>
-              <a:ext uri="{FF2B5EF4-FFF2-40B4-BE49-F238E27FC236}">
-                <a16:creationId xmlns:a16="http://schemas.microsoft.com/office/drawing/2014/main" id="{6ABDF8FC-617C-4A41-9C90-3E78E9A84E1E}"/>
+              <a:rPr lang="en-US" altLang="ja-JP" sz="1200" dirty="0"/>
+              <a:t>with various properties</a:t>
+            </a:r>
+            <a:endParaRPr kumimoji="1" lang="ja-JP" altLang="en-US" sz="1200"/>
+          </a:p>
+        </p:txBody>
+      </p:sp>
+      <p:sp>
+        <p:nvSpPr>
+          <p:cNvPr id="52" name="角丸四角形吹き出し 51">
+            <a:extLst>
+              <a:ext uri="{FF2B5EF4-FFF2-40B4-BE49-F238E27FC236}">
+                <a16:creationId xmlns:a16="http://schemas.microsoft.com/office/drawing/2014/main" id="{63B7EB9A-82A9-5F48-83BA-0528E37941B7}"/>
               </a:ext>
             </a:extLst>
           </p:cNvPr>
@@ -9112,8 +9025,8 @@
         </p:nvSpPr>
         <p:spPr>
           <a:xfrm>
-            <a:off x="4863782" y="3979346"/>
-            <a:ext cx="1730657" cy="298809"/>
+            <a:off x="4895016" y="4007177"/>
+            <a:ext cx="1847176" cy="298809"/>
           </a:xfrm>
           <a:prstGeom prst="wedgeRoundRectCallout">
             <a:avLst>
@@ -9143,34 +9056,19 @@
           <a:p>
             <a:pPr algn="ctr"/>
             <a:r>
-              <a:rPr lang="en-US" altLang="ja-JP" sz="1200" dirty="0" err="1"/>
-              <a:t>a</a:t>
-            </a:r>
-            <a:r>
-              <a:rPr kumimoji="1" lang="en-US" altLang="ja-JP" sz="1200" dirty="0" err="1"/>
-              <a:t>ttr</a:t>
-            </a:r>
-            <a:r>
-              <a:rPr kumimoji="1" lang="en-US" altLang="ja-JP" sz="1200" dirty="0"/>
-              <a:t>: </a:t>
-            </a:r>
-            <a:r>
-              <a:rPr kumimoji="1" lang="en-US" altLang="ja-JP" sz="1200" dirty="0" err="1"/>
-              <a:t>asset_body</a:t>
-            </a:r>
-            <a:r>
-              <a:rPr kumimoji="1" lang="ja-JP" altLang="en-US" sz="1200"/>
-              <a:t>など</a:t>
-            </a:r>
-          </a:p>
-        </p:txBody>
-      </p:sp>
-      <p:sp>
-        <p:nvSpPr>
-          <p:cNvPr id="49" name="角丸四角形吹き出し 48">
-            <a:extLst>
-              <a:ext uri="{FF2B5EF4-FFF2-40B4-BE49-F238E27FC236}">
-                <a16:creationId xmlns:a16="http://schemas.microsoft.com/office/drawing/2014/main" id="{729B42CD-E673-A049-B428-51B5ABE6F1CA}"/>
+              <a:rPr lang="en-US" altLang="ja-JP" sz="1200" dirty="0"/>
+              <a:t>with various properties</a:t>
+            </a:r>
+            <a:endParaRPr kumimoji="1" lang="ja-JP" altLang="en-US" sz="1200"/>
+          </a:p>
+        </p:txBody>
+      </p:sp>
+      <p:sp>
+        <p:nvSpPr>
+          <p:cNvPr id="53" name="角丸四角形吹き出し 52">
+            <a:extLst>
+              <a:ext uri="{FF2B5EF4-FFF2-40B4-BE49-F238E27FC236}">
+                <a16:creationId xmlns:a16="http://schemas.microsoft.com/office/drawing/2014/main" id="{5B891BA3-315D-744D-90FD-24EA841B90CC}"/>
               </a:ext>
             </a:extLst>
           </p:cNvPr>
@@ -9179,13 +9077,13 @@
         </p:nvSpPr>
         <p:spPr>
           <a:xfrm>
-            <a:off x="1392771" y="4589003"/>
-            <a:ext cx="1730657" cy="298809"/>
+            <a:off x="1271163" y="4589003"/>
+            <a:ext cx="1847176" cy="298809"/>
           </a:xfrm>
           <a:prstGeom prst="wedgeRoundRectCallout">
             <a:avLst>
-              <a:gd name="adj1" fmla="val -16582"/>
-              <a:gd name="adj2" fmla="val -137992"/>
+              <a:gd name="adj1" fmla="val -13262"/>
+              <a:gd name="adj2" fmla="val -133316"/>
               <a:gd name="adj3" fmla="val 16667"/>
             </a:avLst>
           </a:prstGeom>
@@ -9210,34 +9108,19 @@
           <a:p>
             <a:pPr algn="ctr"/>
             <a:r>
-              <a:rPr lang="en-US" altLang="ja-JP" sz="1200" dirty="0" err="1"/>
-              <a:t>a</a:t>
-            </a:r>
-            <a:r>
-              <a:rPr kumimoji="1" lang="en-US" altLang="ja-JP" sz="1200" dirty="0" err="1"/>
-              <a:t>ttr</a:t>
-            </a:r>
-            <a:r>
-              <a:rPr kumimoji="1" lang="en-US" altLang="ja-JP" sz="1200" dirty="0"/>
-              <a:t>: </a:t>
-            </a:r>
-            <a:r>
-              <a:rPr kumimoji="1" lang="en-US" altLang="ja-JP" sz="1200" dirty="0" err="1"/>
-              <a:t>asset_body</a:t>
-            </a:r>
-            <a:r>
-              <a:rPr kumimoji="1" lang="ja-JP" altLang="en-US" sz="1200"/>
-              <a:t>など</a:t>
-            </a:r>
-          </a:p>
-        </p:txBody>
-      </p:sp>
-      <p:sp>
-        <p:nvSpPr>
-          <p:cNvPr id="51" name="角丸四角形吹き出し 50">
-            <a:extLst>
-              <a:ext uri="{FF2B5EF4-FFF2-40B4-BE49-F238E27FC236}">
-                <a16:creationId xmlns:a16="http://schemas.microsoft.com/office/drawing/2014/main" id="{86152A76-B99E-594B-A55F-59148A617868}"/>
+              <a:rPr lang="en-US" altLang="ja-JP" sz="1200" dirty="0"/>
+              <a:t>with various properties</a:t>
+            </a:r>
+            <a:endParaRPr kumimoji="1" lang="ja-JP" altLang="en-US" sz="1200"/>
+          </a:p>
+        </p:txBody>
+      </p:sp>
+      <p:sp>
+        <p:nvSpPr>
+          <p:cNvPr id="54" name="角丸四角形吹き出し 53">
+            <a:extLst>
+              <a:ext uri="{FF2B5EF4-FFF2-40B4-BE49-F238E27FC236}">
+                <a16:creationId xmlns:a16="http://schemas.microsoft.com/office/drawing/2014/main" id="{36FBC052-0CE3-B142-A2E4-9FF2629192C0}"/>
               </a:ext>
             </a:extLst>
           </p:cNvPr>
@@ -9246,13 +9129,13 @@
         </p:nvSpPr>
         <p:spPr>
           <a:xfrm>
-            <a:off x="8692973" y="5674502"/>
-            <a:ext cx="1730657" cy="298809"/>
+            <a:off x="8643539" y="5652683"/>
+            <a:ext cx="1847176" cy="298809"/>
           </a:xfrm>
           <a:prstGeom prst="wedgeRoundRectCallout">
             <a:avLst>
-              <a:gd name="adj1" fmla="val -16582"/>
-              <a:gd name="adj2" fmla="val -137992"/>
+              <a:gd name="adj1" fmla="val -13262"/>
+              <a:gd name="adj2" fmla="val -133316"/>
               <a:gd name="adj3" fmla="val 16667"/>
             </a:avLst>
           </a:prstGeom>
@@ -9277,25 +9160,10 @@
           <a:p>
             <a:pPr algn="ctr"/>
             <a:r>
-              <a:rPr lang="en-US" altLang="ja-JP" sz="1200" dirty="0" err="1"/>
-              <a:t>a</a:t>
-            </a:r>
-            <a:r>
-              <a:rPr kumimoji="1" lang="en-US" altLang="ja-JP" sz="1200" dirty="0" err="1"/>
-              <a:t>ttr</a:t>
-            </a:r>
-            <a:r>
-              <a:rPr kumimoji="1" lang="en-US" altLang="ja-JP" sz="1200" dirty="0"/>
-              <a:t>: </a:t>
-            </a:r>
-            <a:r>
-              <a:rPr kumimoji="1" lang="en-US" altLang="ja-JP" sz="1200" dirty="0" err="1"/>
-              <a:t>asset_body</a:t>
-            </a:r>
-            <a:r>
-              <a:rPr kumimoji="1" lang="ja-JP" altLang="en-US" sz="1200"/>
-              <a:t>など</a:t>
-            </a:r>
+              <a:rPr lang="en-US" altLang="ja-JP" sz="1200" dirty="0"/>
+              <a:t>with various properties</a:t>
+            </a:r>
+            <a:endParaRPr kumimoji="1" lang="ja-JP" altLang="en-US" sz="1200"/>
           </a:p>
         </p:txBody>
       </p:sp>
@@ -9350,12 +9218,8 @@
           <a:lstStyle/>
           <a:p>
             <a:r>
-              <a:rPr lang="en-US" altLang="ja-JP" dirty="0"/>
-              <a:t>Neo4j</a:t>
-            </a:r>
-            <a:r>
               <a:rPr lang="ja-JP" altLang="en-US"/>
-              <a:t>への適用</a:t>
+              <a:t>システム構成</a:t>
             </a:r>
             <a:endParaRPr kumimoji="1" lang="ja-JP" altLang="en-US" dirty="0"/>
           </a:p>
@@ -9410,7 +9274,7 @@
     </p:spTree>
     <p:extLst>
       <p:ext uri="{BB962C8B-B14F-4D97-AF65-F5344CB8AC3E}">
-        <p14:creationId xmlns:p14="http://schemas.microsoft.com/office/powerpoint/2010/main" val="250145714"/>
+        <p14:creationId xmlns:p14="http://schemas.microsoft.com/office/powerpoint/2010/main" val="3515492834"/>
       </p:ext>
     </p:extLst>
   </p:cSld>
@@ -9442,7 +9306,7 @@
           <p:cNvPr id="2" name="タイトル 1">
             <a:extLst>
               <a:ext uri="{FF2B5EF4-FFF2-40B4-BE49-F238E27FC236}">
-                <a16:creationId xmlns:a16="http://schemas.microsoft.com/office/drawing/2014/main" id="{684A77F3-7CE8-DC40-BCE2-247F74ADE1E6}"/>
+                <a16:creationId xmlns:a16="http://schemas.microsoft.com/office/drawing/2014/main" id="{7635236D-835C-6D46-BBA2-EAF3EE62E12A}"/>
               </a:ext>
             </a:extLst>
           </p:cNvPr>
@@ -9459,10 +9323,9 @@
           <a:lstStyle/>
           <a:p>
             <a:r>
-              <a:rPr kumimoji="1" lang="en-US" altLang="ja-JP" dirty="0"/>
-              <a:t>Neo4j</a:t>
-            </a:r>
-            <a:endParaRPr kumimoji="1" lang="ja-JP" altLang="en-US"/>
+              <a:rPr kumimoji="1" lang="ja-JP" altLang="en-US"/>
+              <a:t>データベースの構成</a:t>
+            </a:r>
           </a:p>
         </p:txBody>
       </p:sp>
@@ -9471,7 +9334,7 @@
           <p:cNvPr id="3" name="コンテンツ プレースホルダー 2">
             <a:extLst>
               <a:ext uri="{FF2B5EF4-FFF2-40B4-BE49-F238E27FC236}">
-                <a16:creationId xmlns:a16="http://schemas.microsoft.com/office/drawing/2014/main" id="{F9515AEB-7E2E-2B45-B193-4D5F218F758F}"/>
+                <a16:creationId xmlns:a16="http://schemas.microsoft.com/office/drawing/2014/main" id="{24679280-EB0D-0A4E-8027-C946778BACF5}"/>
               </a:ext>
             </a:extLst>
           </p:cNvPr>
@@ -9482,98 +9345,178 @@
             <p:ph idx="1"/>
           </p:nvPr>
         </p:nvSpPr>
-        <p:spPr/>
-        <p:txBody>
-          <a:bodyPr/>
-          <a:lstStyle/>
-          <a:p>
-            <a:r>
-              <a:rPr kumimoji="1" lang="ja-JP" altLang="en-US"/>
-              <a:t>オープンソースで</a:t>
-            </a:r>
+        <p:spPr>
+          <a:xfrm>
+            <a:off x="838200" y="1825625"/>
+            <a:ext cx="10515600" cy="4667250"/>
+          </a:xfrm>
+        </p:spPr>
+        <p:txBody>
+          <a:bodyPr>
+            <a:normAutofit fontScale="92500" lnSpcReduction="10000"/>
+          </a:bodyPr>
+          <a:lstStyle/>
+          <a:p>
             <a:r>
               <a:rPr lang="ja-JP" altLang="en-US"/>
-              <a:t>は最も人気があるグラフデータベース</a:t>
+              <a:t>グラフ</a:t>
+            </a:r>
+            <a:r>
+              <a:rPr lang="en-US" altLang="ja-JP" dirty="0"/>
+              <a:t>DB</a:t>
+            </a:r>
+            <a:r>
+              <a:rPr lang="ja-JP" altLang="en-US"/>
+              <a:t>はトランザクション本体は管理せず、メタ情報のみを管理する</a:t>
             </a:r>
             <a:endParaRPr lang="en-US" altLang="ja-JP" dirty="0"/>
           </a:p>
           <a:p>
             <a:pPr lvl="1"/>
             <a:r>
-              <a:rPr lang="en" altLang="ja-JP" dirty="0">
+              <a:rPr lang="ja-JP" altLang="en-US"/>
+              <a:t>大きなバイナリデータとグラフ</a:t>
+            </a:r>
+            <a:r>
+              <a:rPr lang="en-US" altLang="ja-JP" dirty="0"/>
+              <a:t>DB</a:t>
+            </a:r>
+            <a:r>
+              <a:rPr lang="ja-JP" altLang="en-US"/>
+              <a:t>の相性が悪い</a:t>
+            </a:r>
+            <a:endParaRPr lang="en-US" altLang="ja-JP" dirty="0"/>
+          </a:p>
+          <a:p>
+            <a:pPr lvl="2"/>
+            <a:r>
+              <a:rPr lang="ja-JP" altLang="en-US"/>
+              <a:t>アンチパターンになっている</a:t>
+            </a:r>
+            <a:endParaRPr lang="en-US" altLang="ja-JP" dirty="0"/>
+          </a:p>
+          <a:p>
+            <a:pPr lvl="2"/>
+            <a:r>
+              <a:rPr lang="en-US" altLang="ja-JP" dirty="0">
                 <a:hlinkClick r:id="rId2"/>
               </a:rPr>
-              <a:t>https://neo4j.com</a:t>
-            </a:r>
-            <a:endParaRPr lang="en" altLang="ja-JP" dirty="0"/>
-          </a:p>
-          <a:p>
-            <a:endParaRPr kumimoji="1" lang="en" altLang="ja-JP" dirty="0"/>
-          </a:p>
-          <a:p>
-            <a:r>
-              <a:rPr lang="en" altLang="ja-JP" dirty="0"/>
-              <a:t>Cypher</a:t>
-            </a:r>
+              <a:t>https://neo4j.com/blog/dark-side-neo4j-worst-practices/</a:t>
+            </a:r>
+            <a:endParaRPr lang="en-US" altLang="ja-JP" dirty="0"/>
+          </a:p>
+          <a:p>
+            <a:pPr lvl="1"/>
             <a:r>
               <a:rPr lang="ja-JP" altLang="en-US"/>
-              <a:t>クエリ言語（</a:t>
-            </a:r>
+              <a:t>トランザクションが改ざんされていないかどうかはグラフ</a:t>
+            </a:r>
+            <a:r>
+              <a:rPr lang="en-US" altLang="ja-JP" dirty="0"/>
+              <a:t>DB</a:t>
+            </a:r>
+            <a:r>
+              <a:rPr lang="ja-JP" altLang="en-US"/>
+              <a:t>では判断できないので、トランザクション本体を検証するしかない</a:t>
+            </a:r>
+            <a:endParaRPr lang="en-US" altLang="ja-JP" dirty="0"/>
+          </a:p>
+          <a:p>
+            <a:pPr lvl="1"/>
+            <a:r>
+              <a:rPr lang="ja-JP" altLang="en-US"/>
+              <a:t>メタ情報はトランザクション本体からいつでも（誰でも）作成・再生できる</a:t>
+            </a:r>
+            <a:endParaRPr lang="en-US" altLang="ja-JP" dirty="0"/>
+          </a:p>
+          <a:p>
+            <a:pPr lvl="2"/>
+            <a:r>
+              <a:rPr lang="ja-JP" altLang="en-US"/>
+              <a:t>作成するときに署名検証を行うこと</a:t>
+            </a:r>
+            <a:endParaRPr lang="en-US" altLang="ja-JP" dirty="0"/>
+          </a:p>
+          <a:p>
+            <a:pPr lvl="1"/>
+            <a:r>
+              <a:rPr lang="ja-JP" altLang="en-US"/>
+              <a:t>メタ情報にどこまでの情報を含めるかは実装次第</a:t>
+            </a:r>
+            <a:endParaRPr lang="en-US" altLang="ja-JP" dirty="0"/>
+          </a:p>
+          <a:p>
+            <a:pPr lvl="2"/>
+            <a:r>
+              <a:rPr lang="ja-JP" altLang="en-US"/>
+              <a:t>方針は必要</a:t>
+            </a:r>
+            <a:endParaRPr lang="en-US" altLang="ja-JP" dirty="0"/>
+          </a:p>
+          <a:p>
+            <a:endParaRPr lang="en-US" altLang="ja-JP" dirty="0"/>
+          </a:p>
+          <a:p>
+            <a:r>
+              <a:rPr lang="ja-JP" altLang="en-US"/>
+              <a:t>トランザクション本体は</a:t>
+            </a:r>
+            <a:r>
+              <a:rPr lang="en-US" altLang="ja-JP" dirty="0"/>
+              <a:t>DB</a:t>
+            </a:r>
+            <a:r>
+              <a:rPr lang="ja-JP" altLang="en-US"/>
+              <a:t>（</a:t>
+            </a:r>
+            <a:r>
+              <a:rPr lang="en-US" altLang="ja-JP" dirty="0"/>
+              <a:t>TXDB</a:t>
+            </a:r>
+            <a:r>
+              <a:rPr lang="ja-JP" altLang="en-US"/>
+              <a:t>）に格納する</a:t>
+            </a:r>
+            <a:endParaRPr lang="en-US" altLang="ja-JP" dirty="0"/>
+          </a:p>
+          <a:p>
+            <a:pPr lvl="1"/>
             <a:r>
               <a:rPr lang="en-US" altLang="ja-JP" dirty="0" err="1"/>
-              <a:t>CypherQL</a:t>
+              <a:t>transaction_id</a:t>
             </a:r>
             <a:r>
               <a:rPr lang="ja-JP" altLang="en-US"/>
-              <a:t>）で検索できる</a:t>
+              <a:t>と</a:t>
+            </a:r>
+            <a:r>
+              <a:rPr lang="en-US" altLang="ja-JP" dirty="0" err="1"/>
+              <a:t>transaction_data</a:t>
+            </a:r>
+            <a:r>
+              <a:rPr lang="ja-JP" altLang="en-US"/>
+              <a:t>の紐付けだけでいいので、性能重視の</a:t>
+            </a:r>
+            <a:r>
+              <a:rPr lang="en-US" altLang="ja-JP" dirty="0"/>
+              <a:t>DB</a:t>
+            </a:r>
+            <a:r>
+              <a:rPr lang="ja-JP" altLang="en-US"/>
+              <a:t>実装を利用すればいい</a:t>
             </a:r>
             <a:endParaRPr lang="en-US" altLang="ja-JP" dirty="0"/>
           </a:p>
           <a:p>
-            <a:endParaRPr kumimoji="1" lang="en-US" altLang="ja-JP" dirty="0"/>
-          </a:p>
-          <a:p>
+            <a:pPr lvl="1"/>
+            <a:r>
+              <a:rPr lang="en-US" altLang="ja-JP" dirty="0"/>
+              <a:t>TXDB</a:t>
+            </a:r>
             <a:r>
               <a:rPr lang="ja-JP" altLang="en-US"/>
-              <a:t>本体は</a:t>
-            </a:r>
-            <a:r>
-              <a:rPr lang="en-US" altLang="ja-JP" dirty="0"/>
-              <a:t>Java</a:t>
-            </a:r>
-            <a:r>
-              <a:rPr lang="ja-JP" altLang="en-US"/>
-              <a:t>実装だが、</a:t>
-            </a:r>
-            <a:r>
-              <a:rPr lang="en-US" altLang="ja-JP" dirty="0"/>
-              <a:t>Bolt</a:t>
-            </a:r>
-            <a:r>
-              <a:rPr lang="ja-JP" altLang="en-US"/>
-              <a:t>プロトコルという仕様があり、それを他言語で実装した</a:t>
-            </a:r>
-            <a:r>
-              <a:rPr lang="en-US" altLang="ja-JP" dirty="0"/>
-              <a:t>Bolt</a:t>
-            </a:r>
-            <a:r>
-              <a:rPr lang="ja-JP" altLang="en-US"/>
-              <a:t>ドライバが公開されている</a:t>
-            </a:r>
-            <a:endParaRPr lang="en-US" altLang="ja-JP" dirty="0"/>
-          </a:p>
-          <a:p>
-            <a:pPr lvl="1"/>
-            <a:r>
-              <a:rPr lang="en" altLang="ja-JP" dirty="0"/>
-              <a:t>.NET/Java/JavaScript/Python/Go</a:t>
-            </a:r>
-            <a:r>
-              <a:rPr lang="ja-JP" altLang="en-US"/>
-              <a:t>などが公式にサポートされている</a:t>
-            </a:r>
-            <a:endParaRPr lang="en" altLang="ja-JP" dirty="0"/>
+              <a:t>だけはしっかり保全しなければならない</a:t>
+            </a:r>
           </a:p>
           <a:p>
             <a:endParaRPr kumimoji="1" lang="ja-JP" altLang="en-US"/>
@@ -9585,7 +9528,7 @@
           <p:cNvPr id="4" name="フッター プレースホルダー 3">
             <a:extLst>
               <a:ext uri="{FF2B5EF4-FFF2-40B4-BE49-F238E27FC236}">
-                <a16:creationId xmlns:a16="http://schemas.microsoft.com/office/drawing/2014/main" id="{5C367B80-435F-A245-854C-33308EC401C0}"/>
+                <a16:creationId xmlns:a16="http://schemas.microsoft.com/office/drawing/2014/main" id="{4A8A8828-1806-7A4A-8066-07EBA2D347AE}"/>
               </a:ext>
             </a:extLst>
           </p:cNvPr>
@@ -9614,7 +9557,7 @@
           <p:cNvPr id="5" name="スライド番号プレースホルダー 4">
             <a:extLst>
               <a:ext uri="{FF2B5EF4-FFF2-40B4-BE49-F238E27FC236}">
-                <a16:creationId xmlns:a16="http://schemas.microsoft.com/office/drawing/2014/main" id="{F0CF3E8B-FC7D-0F4A-AE57-F39FEA3EFF46}"/>
+                <a16:creationId xmlns:a16="http://schemas.microsoft.com/office/drawing/2014/main" id="{24D74E78-CDCC-1843-8963-0230C95F45FE}"/>
               </a:ext>
             </a:extLst>
           </p:cNvPr>
@@ -9641,7 +9584,7 @@
     </p:spTree>
     <p:extLst>
       <p:ext uri="{BB962C8B-B14F-4D97-AF65-F5344CB8AC3E}">
-        <p14:creationId xmlns:p14="http://schemas.microsoft.com/office/powerpoint/2010/main" val="3966295593"/>
+        <p14:creationId xmlns:p14="http://schemas.microsoft.com/office/powerpoint/2010/main" val="4000942576"/>
       </p:ext>
     </p:extLst>
   </p:cSld>
@@ -9673,7 +9616,7 @@
           <p:cNvPr id="2" name="タイトル 1">
             <a:extLst>
               <a:ext uri="{FF2B5EF4-FFF2-40B4-BE49-F238E27FC236}">
-                <a16:creationId xmlns:a16="http://schemas.microsoft.com/office/drawing/2014/main" id="{2140C7F0-654E-D743-BA22-E00E0B0046C3}"/>
+                <a16:creationId xmlns:a16="http://schemas.microsoft.com/office/drawing/2014/main" id="{172E9233-B7C8-294A-8300-EE9F3C5FBA53}"/>
               </a:ext>
             </a:extLst>
           </p:cNvPr>
@@ -9690,102 +9633,8 @@
           <a:lstStyle/>
           <a:p>
             <a:r>
-              <a:rPr kumimoji="1" lang="ja-JP" altLang="en-US"/>
-              <a:t>検討すべき事項</a:t>
-            </a:r>
-          </a:p>
-        </p:txBody>
-      </p:sp>
-      <p:sp>
-        <p:nvSpPr>
-          <p:cNvPr id="3" name="コンテンツ プレースホルダー 2">
-            <a:extLst>
-              <a:ext uri="{FF2B5EF4-FFF2-40B4-BE49-F238E27FC236}">
-                <a16:creationId xmlns:a16="http://schemas.microsoft.com/office/drawing/2014/main" id="{2064312D-481B-0A48-8A40-7BADDEFCFF3B}"/>
-              </a:ext>
-            </a:extLst>
-          </p:cNvPr>
-          <p:cNvSpPr>
-            <a:spLocks noGrp="1"/>
-          </p:cNvSpPr>
-          <p:nvPr>
-            <p:ph idx="1"/>
-          </p:nvPr>
-        </p:nvSpPr>
-        <p:spPr/>
-        <p:txBody>
-          <a:bodyPr/>
-          <a:lstStyle/>
-          <a:p>
-            <a:r>
-              <a:rPr kumimoji="1" lang="en-US" altLang="ja-JP" dirty="0"/>
-              <a:t>BBc1</a:t>
-            </a:r>
-            <a:r>
-              <a:rPr kumimoji="1" lang="ja-JP" altLang="en-US"/>
-              <a:t>トランザクションのデータ構造をどのようにグラフ</a:t>
-            </a:r>
-            <a:r>
-              <a:rPr kumimoji="1" lang="en-US" altLang="ja-JP" dirty="0"/>
-              <a:t>DB</a:t>
-            </a:r>
-            <a:r>
-              <a:rPr kumimoji="1" lang="ja-JP" altLang="en-US"/>
-              <a:t>に保存するか</a:t>
-            </a:r>
-            <a:endParaRPr kumimoji="1" lang="en-US" altLang="ja-JP" dirty="0"/>
-          </a:p>
-          <a:p>
-            <a:pPr lvl="1"/>
-            <a:r>
               <a:rPr lang="ja-JP" altLang="en-US"/>
-              <a:t>グラフ構造としては、</a:t>
-            </a:r>
-            <a:r>
-              <a:rPr lang="en-US" altLang="ja-JP" dirty="0"/>
-              <a:t>16</a:t>
-            </a:r>
-            <a:r>
-              <a:rPr lang="ja-JP" altLang="en-US"/>
-              <a:t>ページのような構造を持たせるが、トランザクションデータは署名で保護されており、その構造も保たなければならない</a:t>
-            </a:r>
-            <a:endParaRPr lang="en-US" altLang="ja-JP" dirty="0"/>
-          </a:p>
-          <a:p>
-            <a:endParaRPr kumimoji="1" lang="en-US" altLang="ja-JP" dirty="0"/>
-          </a:p>
-          <a:p>
-            <a:r>
-              <a:rPr lang="en-US" altLang="ja-JP" dirty="0"/>
-              <a:t>DB</a:t>
-            </a:r>
-            <a:r>
-              <a:rPr lang="ja-JP" altLang="en-US"/>
-              <a:t>に実装されているデータインサート、データレプリケーションのタイミングで、トランザクションの署名検証を行えるようにしておきたい</a:t>
-            </a:r>
-            <a:endParaRPr lang="en-US" altLang="ja-JP" dirty="0"/>
-          </a:p>
-          <a:p>
-            <a:pPr lvl="1"/>
-            <a:r>
-              <a:rPr kumimoji="1" lang="ja-JP" altLang="en-US"/>
-              <a:t>不正なトランザクションが投入されるのを避ける</a:t>
-            </a:r>
-            <a:endParaRPr kumimoji="1" lang="en-US" altLang="ja-JP" dirty="0"/>
-          </a:p>
-          <a:p>
-            <a:pPr lvl="1"/>
-            <a:r>
-              <a:rPr lang="ja-JP" altLang="en-US"/>
-              <a:t>特にデータレプリケーションは</a:t>
-            </a:r>
-            <a:r>
-              <a:rPr lang="en-US" altLang="ja-JP" dirty="0"/>
-              <a:t>Neo4j</a:t>
-            </a:r>
-            <a:r>
-              <a:rPr lang="ja-JP" altLang="en-US"/>
-              <a:t>の内部実装で行われていると思われるので、どのように実現できるか、調査が必要</a:t>
+              <a:t>メタ情報生成の実現パターン１</a:t>
             </a:r>
             <a:endParaRPr kumimoji="1" lang="ja-JP" altLang="en-US"/>
           </a:p>
@@ -9796,7 +9645,7 @@
           <p:cNvPr id="4" name="フッター プレースホルダー 3">
             <a:extLst>
               <a:ext uri="{FF2B5EF4-FFF2-40B4-BE49-F238E27FC236}">
-                <a16:creationId xmlns:a16="http://schemas.microsoft.com/office/drawing/2014/main" id="{D7B2189D-3C09-BA48-883D-9E562614A988}"/>
+                <a16:creationId xmlns:a16="http://schemas.microsoft.com/office/drawing/2014/main" id="{ABE0D175-27DA-A04C-A3DF-D01205BD5AEC}"/>
               </a:ext>
             </a:extLst>
           </p:cNvPr>
@@ -9825,7 +9674,7 @@
           <p:cNvPr id="5" name="スライド番号プレースホルダー 4">
             <a:extLst>
               <a:ext uri="{FF2B5EF4-FFF2-40B4-BE49-F238E27FC236}">
-                <a16:creationId xmlns:a16="http://schemas.microsoft.com/office/drawing/2014/main" id="{EFCA7EEB-D7C8-6142-9C21-D8AB85D66184}"/>
+                <a16:creationId xmlns:a16="http://schemas.microsoft.com/office/drawing/2014/main" id="{E7903E09-2A4F-214B-B947-9ED3EEFD13E9}"/>
               </a:ext>
             </a:extLst>
           </p:cNvPr>
@@ -9849,10 +9698,619 @@
           </a:p>
         </p:txBody>
       </p:sp>
+      <p:sp>
+        <p:nvSpPr>
+          <p:cNvPr id="6" name="メモ 5">
+            <a:extLst>
+              <a:ext uri="{FF2B5EF4-FFF2-40B4-BE49-F238E27FC236}">
+                <a16:creationId xmlns:a16="http://schemas.microsoft.com/office/drawing/2014/main" id="{22EE7560-3A67-8D43-B6AB-3D29961CFCE7}"/>
+              </a:ext>
+            </a:extLst>
+          </p:cNvPr>
+          <p:cNvSpPr/>
+          <p:nvPr/>
+        </p:nvSpPr>
+        <p:spPr>
+          <a:xfrm>
+            <a:off x="2431227" y="2407023"/>
+            <a:ext cx="914400" cy="1021977"/>
+          </a:xfrm>
+          <a:prstGeom prst="foldedCorner">
+            <a:avLst>
+              <a:gd name="adj" fmla="val 26079"/>
+            </a:avLst>
+          </a:prstGeom>
+        </p:spPr>
+        <p:style>
+          <a:lnRef idx="2">
+            <a:schemeClr val="dk1"/>
+          </a:lnRef>
+          <a:fillRef idx="1">
+            <a:schemeClr val="lt1"/>
+          </a:fillRef>
+          <a:effectRef idx="0">
+            <a:schemeClr val="dk1"/>
+          </a:effectRef>
+          <a:fontRef idx="minor">
+            <a:schemeClr val="dk1"/>
+          </a:fontRef>
+        </p:style>
+        <p:txBody>
+          <a:bodyPr rtlCol="0" anchor="ctr"/>
+          <a:lstStyle/>
+          <a:p>
+            <a:pPr algn="ctr"/>
+            <a:r>
+              <a:rPr kumimoji="1" lang="en-US" altLang="ja-JP" sz="1100" dirty="0"/>
+              <a:t>transaction</a:t>
+            </a:r>
+            <a:endParaRPr kumimoji="1" lang="ja-JP" altLang="en-US" sz="1100"/>
+          </a:p>
+        </p:txBody>
+      </p:sp>
+      <p:sp>
+        <p:nvSpPr>
+          <p:cNvPr id="7" name="正方形/長方形 6">
+            <a:extLst>
+              <a:ext uri="{FF2B5EF4-FFF2-40B4-BE49-F238E27FC236}">
+                <a16:creationId xmlns:a16="http://schemas.microsoft.com/office/drawing/2014/main" id="{94CB3D2E-CE8F-D44B-9DE2-33EDF1F0673E}"/>
+              </a:ext>
+            </a:extLst>
+          </p:cNvPr>
+          <p:cNvSpPr/>
+          <p:nvPr/>
+        </p:nvSpPr>
+        <p:spPr>
+          <a:xfrm>
+            <a:off x="4996030" y="2407023"/>
+            <a:ext cx="1705984" cy="1021977"/>
+          </a:xfrm>
+          <a:prstGeom prst="rect">
+            <a:avLst/>
+          </a:prstGeom>
+        </p:spPr>
+        <p:style>
+          <a:lnRef idx="2">
+            <a:schemeClr val="dk1"/>
+          </a:lnRef>
+          <a:fillRef idx="1">
+            <a:schemeClr val="lt1"/>
+          </a:fillRef>
+          <a:effectRef idx="0">
+            <a:schemeClr val="dk1"/>
+          </a:effectRef>
+          <a:fontRef idx="minor">
+            <a:schemeClr val="dk1"/>
+          </a:fontRef>
+        </p:style>
+        <p:txBody>
+          <a:bodyPr rtlCol="0" anchor="ctr"/>
+          <a:lstStyle/>
+          <a:p>
+            <a:pPr algn="ctr"/>
+            <a:r>
+              <a:rPr kumimoji="1" lang="ja-JP" altLang="en-US"/>
+              <a:t>メタ情報</a:t>
+            </a:r>
+            <a:endParaRPr kumimoji="1" lang="en-US" altLang="ja-JP" dirty="0"/>
+          </a:p>
+          <a:p>
+            <a:pPr algn="ctr"/>
+            <a:r>
+              <a:rPr kumimoji="1" lang="ja-JP" altLang="en-US"/>
+              <a:t>生成機能</a:t>
+            </a:r>
+          </a:p>
+        </p:txBody>
+      </p:sp>
+      <p:sp>
+        <p:nvSpPr>
+          <p:cNvPr id="8" name="右矢印 7">
+            <a:extLst>
+              <a:ext uri="{FF2B5EF4-FFF2-40B4-BE49-F238E27FC236}">
+                <a16:creationId xmlns:a16="http://schemas.microsoft.com/office/drawing/2014/main" id="{D800D330-9BE4-0643-BAC3-2E2DEBCD41A9}"/>
+              </a:ext>
+            </a:extLst>
+          </p:cNvPr>
+          <p:cNvSpPr/>
+          <p:nvPr/>
+        </p:nvSpPr>
+        <p:spPr>
+          <a:xfrm>
+            <a:off x="3453204" y="2791927"/>
+            <a:ext cx="1441525" cy="236668"/>
+          </a:xfrm>
+          <a:prstGeom prst="rightArrow">
+            <a:avLst/>
+          </a:prstGeom>
+        </p:spPr>
+        <p:style>
+          <a:lnRef idx="2">
+            <a:schemeClr val="dk1"/>
+          </a:lnRef>
+          <a:fillRef idx="1">
+            <a:schemeClr val="lt1"/>
+          </a:fillRef>
+          <a:effectRef idx="0">
+            <a:schemeClr val="dk1"/>
+          </a:effectRef>
+          <a:fontRef idx="minor">
+            <a:schemeClr val="dk1"/>
+          </a:fontRef>
+        </p:style>
+        <p:txBody>
+          <a:bodyPr rtlCol="0" anchor="ctr"/>
+          <a:lstStyle/>
+          <a:p>
+            <a:pPr algn="ctr"/>
+            <a:endParaRPr kumimoji="1" lang="ja-JP" altLang="en-US"/>
+          </a:p>
+        </p:txBody>
+      </p:sp>
+      <p:sp>
+        <p:nvSpPr>
+          <p:cNvPr id="9" name="フローチャート: 磁気ディスク 8">
+            <a:extLst>
+              <a:ext uri="{FF2B5EF4-FFF2-40B4-BE49-F238E27FC236}">
+                <a16:creationId xmlns:a16="http://schemas.microsoft.com/office/drawing/2014/main" id="{31706D18-2674-6341-A105-47C5A9945C5B}"/>
+              </a:ext>
+            </a:extLst>
+          </p:cNvPr>
+          <p:cNvSpPr/>
+          <p:nvPr/>
+        </p:nvSpPr>
+        <p:spPr>
+          <a:xfrm>
+            <a:off x="2420469" y="4416332"/>
+            <a:ext cx="925158" cy="699247"/>
+          </a:xfrm>
+          <a:prstGeom prst="flowChartMagneticDisk">
+            <a:avLst/>
+          </a:prstGeom>
+        </p:spPr>
+        <p:style>
+          <a:lnRef idx="2">
+            <a:schemeClr val="dk1"/>
+          </a:lnRef>
+          <a:fillRef idx="1">
+            <a:schemeClr val="lt1"/>
+          </a:fillRef>
+          <a:effectRef idx="0">
+            <a:schemeClr val="dk1"/>
+          </a:effectRef>
+          <a:fontRef idx="minor">
+            <a:schemeClr val="dk1"/>
+          </a:fontRef>
+        </p:style>
+        <p:txBody>
+          <a:bodyPr rtlCol="0" anchor="ctr"/>
+          <a:lstStyle/>
+          <a:p>
+            <a:pPr algn="ctr"/>
+            <a:r>
+              <a:rPr kumimoji="1" lang="en-US" altLang="ja-JP" dirty="0"/>
+              <a:t>TXDB</a:t>
+            </a:r>
+            <a:endParaRPr kumimoji="1" lang="ja-JP" altLang="en-US"/>
+          </a:p>
+        </p:txBody>
+      </p:sp>
+      <p:sp>
+        <p:nvSpPr>
+          <p:cNvPr id="10" name="右矢印 9">
+            <a:extLst>
+              <a:ext uri="{FF2B5EF4-FFF2-40B4-BE49-F238E27FC236}">
+                <a16:creationId xmlns:a16="http://schemas.microsoft.com/office/drawing/2014/main" id="{8DE4CB10-E60C-764D-9FB6-A7688136219B}"/>
+              </a:ext>
+            </a:extLst>
+          </p:cNvPr>
+          <p:cNvSpPr/>
+          <p:nvPr/>
+        </p:nvSpPr>
+        <p:spPr>
+          <a:xfrm rot="5400000">
+            <a:off x="2580938" y="3789092"/>
+            <a:ext cx="604219" cy="267148"/>
+          </a:xfrm>
+          <a:prstGeom prst="rightArrow">
+            <a:avLst/>
+          </a:prstGeom>
+        </p:spPr>
+        <p:style>
+          <a:lnRef idx="2">
+            <a:schemeClr val="dk1"/>
+          </a:lnRef>
+          <a:fillRef idx="1">
+            <a:schemeClr val="lt1"/>
+          </a:fillRef>
+          <a:effectRef idx="0">
+            <a:schemeClr val="dk1"/>
+          </a:effectRef>
+          <a:fontRef idx="minor">
+            <a:schemeClr val="dk1"/>
+          </a:fontRef>
+        </p:style>
+        <p:txBody>
+          <a:bodyPr rtlCol="0" anchor="ctr"/>
+          <a:lstStyle/>
+          <a:p>
+            <a:pPr algn="ctr"/>
+            <a:endParaRPr kumimoji="1" lang="ja-JP" altLang="en-US"/>
+          </a:p>
+        </p:txBody>
+      </p:sp>
+      <p:sp>
+        <p:nvSpPr>
+          <p:cNvPr id="11" name="右矢印 10">
+            <a:extLst>
+              <a:ext uri="{FF2B5EF4-FFF2-40B4-BE49-F238E27FC236}">
+                <a16:creationId xmlns:a16="http://schemas.microsoft.com/office/drawing/2014/main" id="{297C03FC-72E9-9E4D-8E4E-DD50A0C194C8}"/>
+              </a:ext>
+            </a:extLst>
+          </p:cNvPr>
+          <p:cNvSpPr/>
+          <p:nvPr/>
+        </p:nvSpPr>
+        <p:spPr>
+          <a:xfrm>
+            <a:off x="6803315" y="2799677"/>
+            <a:ext cx="1441525" cy="236668"/>
+          </a:xfrm>
+          <a:prstGeom prst="rightArrow">
+            <a:avLst/>
+          </a:prstGeom>
+        </p:spPr>
+        <p:style>
+          <a:lnRef idx="2">
+            <a:schemeClr val="dk1"/>
+          </a:lnRef>
+          <a:fillRef idx="1">
+            <a:schemeClr val="lt1"/>
+          </a:fillRef>
+          <a:effectRef idx="0">
+            <a:schemeClr val="dk1"/>
+          </a:effectRef>
+          <a:fontRef idx="minor">
+            <a:schemeClr val="dk1"/>
+          </a:fontRef>
+        </p:style>
+        <p:txBody>
+          <a:bodyPr rtlCol="0" anchor="ctr"/>
+          <a:lstStyle/>
+          <a:p>
+            <a:pPr algn="ctr"/>
+            <a:endParaRPr kumimoji="1" lang="ja-JP" altLang="en-US"/>
+          </a:p>
+        </p:txBody>
+      </p:sp>
+      <p:sp>
+        <p:nvSpPr>
+          <p:cNvPr id="12" name="メモ 11">
+            <a:extLst>
+              <a:ext uri="{FF2B5EF4-FFF2-40B4-BE49-F238E27FC236}">
+                <a16:creationId xmlns:a16="http://schemas.microsoft.com/office/drawing/2014/main" id="{6ABC67E8-5228-454C-ACC7-779271D54993}"/>
+              </a:ext>
+            </a:extLst>
+          </p:cNvPr>
+          <p:cNvSpPr/>
+          <p:nvPr/>
+        </p:nvSpPr>
+        <p:spPr>
+          <a:xfrm>
+            <a:off x="8511090" y="2407023"/>
+            <a:ext cx="1056940" cy="1021977"/>
+          </a:xfrm>
+          <a:prstGeom prst="foldedCorner">
+            <a:avLst>
+              <a:gd name="adj" fmla="val 26079"/>
+            </a:avLst>
+          </a:prstGeom>
+        </p:spPr>
+        <p:style>
+          <a:lnRef idx="2">
+            <a:schemeClr val="dk1"/>
+          </a:lnRef>
+          <a:fillRef idx="1">
+            <a:schemeClr val="lt1"/>
+          </a:fillRef>
+          <a:effectRef idx="0">
+            <a:schemeClr val="dk1"/>
+          </a:effectRef>
+          <a:fontRef idx="minor">
+            <a:schemeClr val="dk1"/>
+          </a:fontRef>
+        </p:style>
+        <p:txBody>
+          <a:bodyPr rtlCol="0" anchor="ctr"/>
+          <a:lstStyle/>
+          <a:p>
+            <a:pPr algn="ctr"/>
+            <a:r>
+              <a:rPr lang="ja-JP" altLang="en-US" sz="1100"/>
+              <a:t>メタ情報</a:t>
+            </a:r>
+            <a:endParaRPr lang="en-US" altLang="ja-JP" sz="1100" dirty="0"/>
+          </a:p>
+          <a:p>
+            <a:pPr algn="ctr"/>
+            <a:endParaRPr kumimoji="1" lang="en-US" altLang="ja-JP" sz="1100" dirty="0"/>
+          </a:p>
+          <a:p>
+            <a:pPr algn="ctr"/>
+            <a:r>
+              <a:rPr lang="en-US" altLang="ja-JP" sz="1100" dirty="0"/>
+              <a:t>(Cypher QL)</a:t>
+            </a:r>
+            <a:endParaRPr kumimoji="1" lang="ja-JP" altLang="en-US" sz="1100"/>
+          </a:p>
+        </p:txBody>
+      </p:sp>
+      <p:sp>
+        <p:nvSpPr>
+          <p:cNvPr id="13" name="フローチャート: 磁気ディスク 12">
+            <a:extLst>
+              <a:ext uri="{FF2B5EF4-FFF2-40B4-BE49-F238E27FC236}">
+                <a16:creationId xmlns:a16="http://schemas.microsoft.com/office/drawing/2014/main" id="{93368971-BCC4-2F4F-B756-0667D204D4EE}"/>
+              </a:ext>
+            </a:extLst>
+          </p:cNvPr>
+          <p:cNvSpPr/>
+          <p:nvPr/>
+        </p:nvSpPr>
+        <p:spPr>
+          <a:xfrm>
+            <a:off x="8576981" y="4475975"/>
+            <a:ext cx="925158" cy="699247"/>
+          </a:xfrm>
+          <a:prstGeom prst="flowChartMagneticDisk">
+            <a:avLst/>
+          </a:prstGeom>
+        </p:spPr>
+        <p:style>
+          <a:lnRef idx="2">
+            <a:schemeClr val="dk1"/>
+          </a:lnRef>
+          <a:fillRef idx="1">
+            <a:schemeClr val="lt1"/>
+          </a:fillRef>
+          <a:effectRef idx="0">
+            <a:schemeClr val="dk1"/>
+          </a:effectRef>
+          <a:fontRef idx="minor">
+            <a:schemeClr val="dk1"/>
+          </a:fontRef>
+        </p:style>
+        <p:txBody>
+          <a:bodyPr rtlCol="0" anchor="ctr"/>
+          <a:lstStyle/>
+          <a:p>
+            <a:pPr algn="ctr"/>
+            <a:r>
+              <a:rPr kumimoji="1" lang="ja-JP" altLang="en-US"/>
+              <a:t>グラフ</a:t>
+            </a:r>
+            <a:r>
+              <a:rPr kumimoji="1" lang="en-US" altLang="ja-JP" dirty="0"/>
+              <a:t>DB</a:t>
+            </a:r>
+            <a:endParaRPr kumimoji="1" lang="ja-JP" altLang="en-US"/>
+          </a:p>
+        </p:txBody>
+      </p:sp>
+      <p:sp>
+        <p:nvSpPr>
+          <p:cNvPr id="14" name="右矢印 13">
+            <a:extLst>
+              <a:ext uri="{FF2B5EF4-FFF2-40B4-BE49-F238E27FC236}">
+                <a16:creationId xmlns:a16="http://schemas.microsoft.com/office/drawing/2014/main" id="{B4B5A765-0B2F-5241-B4A4-A4B801824F6A}"/>
+              </a:ext>
+            </a:extLst>
+          </p:cNvPr>
+          <p:cNvSpPr/>
+          <p:nvPr/>
+        </p:nvSpPr>
+        <p:spPr>
+          <a:xfrm rot="5400000">
+            <a:off x="8737451" y="3789092"/>
+            <a:ext cx="604219" cy="267148"/>
+          </a:xfrm>
+          <a:prstGeom prst="rightArrow">
+            <a:avLst/>
+          </a:prstGeom>
+        </p:spPr>
+        <p:style>
+          <a:lnRef idx="2">
+            <a:schemeClr val="dk1"/>
+          </a:lnRef>
+          <a:fillRef idx="1">
+            <a:schemeClr val="lt1"/>
+          </a:fillRef>
+          <a:effectRef idx="0">
+            <a:schemeClr val="dk1"/>
+          </a:effectRef>
+          <a:fontRef idx="minor">
+            <a:schemeClr val="dk1"/>
+          </a:fontRef>
+        </p:style>
+        <p:txBody>
+          <a:bodyPr rtlCol="0" anchor="ctr"/>
+          <a:lstStyle/>
+          <a:p>
+            <a:pPr algn="ctr"/>
+            <a:endParaRPr kumimoji="1" lang="ja-JP" altLang="en-US"/>
+          </a:p>
+        </p:txBody>
+      </p:sp>
+      <p:cxnSp>
+        <p:nvCxnSpPr>
+          <p:cNvPr id="16" name="直線矢印コネクタ 15">
+            <a:extLst>
+              <a:ext uri="{FF2B5EF4-FFF2-40B4-BE49-F238E27FC236}">
+                <a16:creationId xmlns:a16="http://schemas.microsoft.com/office/drawing/2014/main" id="{779F57C0-A6C9-7C4C-969A-F2883D176C5D}"/>
+              </a:ext>
+            </a:extLst>
+          </p:cNvPr>
+          <p:cNvCxnSpPr>
+            <a:cxnSpLocks/>
+          </p:cNvCxnSpPr>
+          <p:nvPr/>
+        </p:nvCxnSpPr>
+        <p:spPr>
+          <a:xfrm flipH="1">
+            <a:off x="3453205" y="3561100"/>
+            <a:ext cx="1474020" cy="1091900"/>
+          </a:xfrm>
+          <a:prstGeom prst="straightConnector1">
+            <a:avLst/>
+          </a:prstGeom>
+          <a:ln>
+            <a:solidFill>
+              <a:schemeClr val="tx1"/>
+            </a:solidFill>
+            <a:headEnd type="triangle"/>
+            <a:tailEnd type="triangle"/>
+          </a:ln>
+        </p:spPr>
+        <p:style>
+          <a:lnRef idx="1">
+            <a:schemeClr val="accent1"/>
+          </a:lnRef>
+          <a:fillRef idx="0">
+            <a:schemeClr val="accent1"/>
+          </a:fillRef>
+          <a:effectRef idx="0">
+            <a:schemeClr val="accent1"/>
+          </a:effectRef>
+          <a:fontRef idx="minor">
+            <a:schemeClr val="tx1"/>
+          </a:fontRef>
+        </p:style>
+      </p:cxnSp>
+      <p:sp>
+        <p:nvSpPr>
+          <p:cNvPr id="18" name="テキスト ボックス 17">
+            <a:extLst>
+              <a:ext uri="{FF2B5EF4-FFF2-40B4-BE49-F238E27FC236}">
+                <a16:creationId xmlns:a16="http://schemas.microsoft.com/office/drawing/2014/main" id="{C3C4CE04-54F6-1F43-B810-9CF2ECC95260}"/>
+              </a:ext>
+            </a:extLst>
+          </p:cNvPr>
+          <p:cNvSpPr txBox="1"/>
+          <p:nvPr/>
+        </p:nvSpPr>
+        <p:spPr>
+          <a:xfrm>
+            <a:off x="4173966" y="4185905"/>
+            <a:ext cx="2629349" cy="954107"/>
+          </a:xfrm>
+          <a:prstGeom prst="rect">
+            <a:avLst/>
+          </a:prstGeom>
+          <a:noFill/>
+        </p:spPr>
+        <p:txBody>
+          <a:bodyPr wrap="square" rtlCol="0">
+            <a:spAutoFit/>
+          </a:bodyPr>
+          <a:lstStyle/>
+          <a:p>
+            <a:r>
+              <a:rPr kumimoji="1" lang="en-US" altLang="ja-JP" sz="1400" dirty="0"/>
+              <a:t>Transaction</a:t>
+            </a:r>
+            <a:r>
+              <a:rPr kumimoji="1" lang="ja-JP" altLang="en-US" sz="1400"/>
+              <a:t>に</a:t>
+            </a:r>
+            <a:r>
+              <a:rPr kumimoji="1" lang="en-US" altLang="ja-JP" sz="1400" dirty="0" err="1"/>
+              <a:t>BBcReference</a:t>
+            </a:r>
+            <a:r>
+              <a:rPr kumimoji="1" lang="ja-JP" altLang="en-US" sz="1400"/>
+              <a:t>が含まれる場合は過去のトランザクションが必要になるため、アクセスが発生する</a:t>
+            </a:r>
+          </a:p>
+        </p:txBody>
+      </p:sp>
+      <p:sp>
+        <p:nvSpPr>
+          <p:cNvPr id="19" name="テキスト ボックス 18">
+            <a:extLst>
+              <a:ext uri="{FF2B5EF4-FFF2-40B4-BE49-F238E27FC236}">
+                <a16:creationId xmlns:a16="http://schemas.microsoft.com/office/drawing/2014/main" id="{F2D80BF9-264E-4B47-92E1-AC334E1519C7}"/>
+              </a:ext>
+            </a:extLst>
+          </p:cNvPr>
+          <p:cNvSpPr txBox="1"/>
+          <p:nvPr/>
+        </p:nvSpPr>
+        <p:spPr>
+          <a:xfrm>
+            <a:off x="1929620" y="1730716"/>
+            <a:ext cx="2832013" cy="646331"/>
+          </a:xfrm>
+          <a:prstGeom prst="rect">
+            <a:avLst/>
+          </a:prstGeom>
+          <a:noFill/>
+        </p:spPr>
+        <p:txBody>
+          <a:bodyPr wrap="square" rtlCol="0">
+            <a:spAutoFit/>
+          </a:bodyPr>
+          <a:lstStyle/>
+          <a:p>
+            <a:r>
+              <a:rPr kumimoji="1" lang="ja-JP" altLang="en-US"/>
+              <a:t>すでに出来上がっているトランザクション</a:t>
+            </a:r>
+          </a:p>
+        </p:txBody>
+      </p:sp>
+      <p:sp>
+        <p:nvSpPr>
+          <p:cNvPr id="20" name="テキスト ボックス 19">
+            <a:extLst>
+              <a:ext uri="{FF2B5EF4-FFF2-40B4-BE49-F238E27FC236}">
+                <a16:creationId xmlns:a16="http://schemas.microsoft.com/office/drawing/2014/main" id="{E138FB0D-1FBB-984F-8904-2030B262873F}"/>
+              </a:ext>
+            </a:extLst>
+          </p:cNvPr>
+          <p:cNvSpPr txBox="1"/>
+          <p:nvPr/>
+        </p:nvSpPr>
+        <p:spPr>
+          <a:xfrm>
+            <a:off x="3453204" y="5643241"/>
+            <a:ext cx="4546672" cy="646331"/>
+          </a:xfrm>
+          <a:prstGeom prst="rect">
+            <a:avLst/>
+          </a:prstGeom>
+          <a:noFill/>
+        </p:spPr>
+        <p:txBody>
+          <a:bodyPr wrap="square" rtlCol="0">
+            <a:spAutoFit/>
+          </a:bodyPr>
+          <a:lstStyle/>
+          <a:p>
+            <a:r>
+              <a:rPr kumimoji="1" lang="en-US" altLang="ja-JP" dirty="0"/>
+              <a:t>TXDB</a:t>
+            </a:r>
+            <a:r>
+              <a:rPr kumimoji="1" lang="ja-JP" altLang="en-US"/>
+              <a:t>からトランザクションを読み込んでメタ情報を生成（再生）することも可能</a:t>
+            </a:r>
+          </a:p>
+        </p:txBody>
+      </p:sp>
     </p:spTree>
     <p:extLst>
       <p:ext uri="{BB962C8B-B14F-4D97-AF65-F5344CB8AC3E}">
-        <p14:creationId xmlns:p14="http://schemas.microsoft.com/office/powerpoint/2010/main" val="453106705"/>
+        <p14:creationId xmlns:p14="http://schemas.microsoft.com/office/powerpoint/2010/main" val="3222813635"/>
       </p:ext>
     </p:extLst>
   </p:cSld>
@@ -10069,7 +10527,7 @@
           <p:cNvPr id="2" name="タイトル 1">
             <a:extLst>
               <a:ext uri="{FF2B5EF4-FFF2-40B4-BE49-F238E27FC236}">
-                <a16:creationId xmlns:a16="http://schemas.microsoft.com/office/drawing/2014/main" id="{75E2EE3F-C517-DF47-8A63-E3E1860B3FA8}"/>
+                <a16:creationId xmlns:a16="http://schemas.microsoft.com/office/drawing/2014/main" id="{172E9233-B7C8-294A-8300-EE9F3C5FBA53}"/>
               </a:ext>
             </a:extLst>
           </p:cNvPr>
@@ -10080,15 +10538,21 @@
             <p:ph type="title"/>
           </p:nvPr>
         </p:nvSpPr>
-        <p:spPr/>
+        <p:spPr>
+          <a:xfrm>
+            <a:off x="838200" y="365125"/>
+            <a:ext cx="10515600" cy="1325563"/>
+          </a:xfrm>
+        </p:spPr>
         <p:txBody>
           <a:bodyPr/>
           <a:lstStyle/>
           <a:p>
             <a:r>
-              <a:rPr kumimoji="1" lang="ja-JP" altLang="en-US"/>
-              <a:t>以上</a:t>
-            </a:r>
+              <a:rPr lang="ja-JP" altLang="en-US"/>
+              <a:t>メタ情報生成の実現パターン２</a:t>
+            </a:r>
+            <a:endParaRPr kumimoji="1" lang="ja-JP" altLang="en-US"/>
           </a:p>
         </p:txBody>
       </p:sp>
@@ -10097,7 +10561,7 @@
           <p:cNvPr id="4" name="フッター プレースホルダー 3">
             <a:extLst>
               <a:ext uri="{FF2B5EF4-FFF2-40B4-BE49-F238E27FC236}">
-                <a16:creationId xmlns:a16="http://schemas.microsoft.com/office/drawing/2014/main" id="{3938C2CD-D546-EB44-94CB-BE1AAE5509EC}"/>
+                <a16:creationId xmlns:a16="http://schemas.microsoft.com/office/drawing/2014/main" id="{ABE0D175-27DA-A04C-A3DF-D01205BD5AEC}"/>
               </a:ext>
             </a:extLst>
           </p:cNvPr>
@@ -10114,7 +10578,7 @@
           <a:lstStyle/>
           <a:p>
             <a:r>
-              <a:rPr kumimoji="1" lang="en" altLang="ja-JP"/>
+              <a:rPr kumimoji="1" lang="en-US" altLang="ja-JP"/>
               <a:t>Copyright (c) 2019 Zettant Inc.</a:t>
             </a:r>
             <a:endParaRPr kumimoji="1" lang="ja-JP" altLang="en-US" dirty="0"/>
@@ -10126,7 +10590,7 @@
           <p:cNvPr id="5" name="スライド番号プレースホルダー 4">
             <a:extLst>
               <a:ext uri="{FF2B5EF4-FFF2-40B4-BE49-F238E27FC236}">
-                <a16:creationId xmlns:a16="http://schemas.microsoft.com/office/drawing/2014/main" id="{A282EED2-9D9C-744F-B60E-367F8C71DB35}"/>
+                <a16:creationId xmlns:a16="http://schemas.microsoft.com/office/drawing/2014/main" id="{E7903E09-2A4F-214B-B947-9ED3EEFD13E9}"/>
               </a:ext>
             </a:extLst>
           </p:cNvPr>
@@ -10145,6 +10609,2949 @@
             <a:fld id="{1726EC67-F370-534A-B256-AF4D6E27D0FA}" type="slidenum">
               <a:rPr kumimoji="1" lang="ja-JP" altLang="en-US" smtClean="0"/>
               <a:t>20</a:t>
+            </a:fld>
+            <a:endParaRPr kumimoji="1" lang="ja-JP" altLang="en-US"/>
+          </a:p>
+        </p:txBody>
+      </p:sp>
+      <p:sp>
+        <p:nvSpPr>
+          <p:cNvPr id="7" name="正方形/長方形 6">
+            <a:extLst>
+              <a:ext uri="{FF2B5EF4-FFF2-40B4-BE49-F238E27FC236}">
+                <a16:creationId xmlns:a16="http://schemas.microsoft.com/office/drawing/2014/main" id="{94CB3D2E-CE8F-D44B-9DE2-33EDF1F0673E}"/>
+              </a:ext>
+            </a:extLst>
+          </p:cNvPr>
+          <p:cNvSpPr/>
+          <p:nvPr/>
+        </p:nvSpPr>
+        <p:spPr>
+          <a:xfrm>
+            <a:off x="4996030" y="2407023"/>
+            <a:ext cx="1705984" cy="1021977"/>
+          </a:xfrm>
+          <a:prstGeom prst="rect">
+            <a:avLst/>
+          </a:prstGeom>
+        </p:spPr>
+        <p:style>
+          <a:lnRef idx="2">
+            <a:schemeClr val="dk1"/>
+          </a:lnRef>
+          <a:fillRef idx="1">
+            <a:schemeClr val="lt1"/>
+          </a:fillRef>
+          <a:effectRef idx="0">
+            <a:schemeClr val="dk1"/>
+          </a:effectRef>
+          <a:fontRef idx="minor">
+            <a:schemeClr val="dk1"/>
+          </a:fontRef>
+        </p:style>
+        <p:txBody>
+          <a:bodyPr rtlCol="0" anchor="ctr"/>
+          <a:lstStyle/>
+          <a:p>
+            <a:pPr algn="ctr"/>
+            <a:r>
+              <a:rPr kumimoji="1" lang="ja-JP" altLang="en-US"/>
+              <a:t>トランザクション＆メタ情報生成機能</a:t>
+            </a:r>
+          </a:p>
+        </p:txBody>
+      </p:sp>
+      <p:sp>
+        <p:nvSpPr>
+          <p:cNvPr id="8" name="右矢印 7">
+            <a:extLst>
+              <a:ext uri="{FF2B5EF4-FFF2-40B4-BE49-F238E27FC236}">
+                <a16:creationId xmlns:a16="http://schemas.microsoft.com/office/drawing/2014/main" id="{D800D330-9BE4-0643-BAC3-2E2DEBCD41A9}"/>
+              </a:ext>
+            </a:extLst>
+          </p:cNvPr>
+          <p:cNvSpPr/>
+          <p:nvPr/>
+        </p:nvSpPr>
+        <p:spPr>
+          <a:xfrm>
+            <a:off x="3873066" y="2791927"/>
+            <a:ext cx="984581" cy="236668"/>
+          </a:xfrm>
+          <a:prstGeom prst="rightArrow">
+            <a:avLst/>
+          </a:prstGeom>
+        </p:spPr>
+        <p:style>
+          <a:lnRef idx="2">
+            <a:schemeClr val="dk1"/>
+          </a:lnRef>
+          <a:fillRef idx="1">
+            <a:schemeClr val="lt1"/>
+          </a:fillRef>
+          <a:effectRef idx="0">
+            <a:schemeClr val="dk1"/>
+          </a:effectRef>
+          <a:fontRef idx="minor">
+            <a:schemeClr val="dk1"/>
+          </a:fontRef>
+        </p:style>
+        <p:txBody>
+          <a:bodyPr rtlCol="0" anchor="ctr"/>
+          <a:lstStyle/>
+          <a:p>
+            <a:pPr algn="ctr"/>
+            <a:endParaRPr kumimoji="1" lang="ja-JP" altLang="en-US"/>
+          </a:p>
+        </p:txBody>
+      </p:sp>
+      <p:sp>
+        <p:nvSpPr>
+          <p:cNvPr id="10" name="右矢印 9">
+            <a:extLst>
+              <a:ext uri="{FF2B5EF4-FFF2-40B4-BE49-F238E27FC236}">
+                <a16:creationId xmlns:a16="http://schemas.microsoft.com/office/drawing/2014/main" id="{8DE4CB10-E60C-764D-9FB6-A7688136219B}"/>
+              </a:ext>
+            </a:extLst>
+          </p:cNvPr>
+          <p:cNvSpPr/>
+          <p:nvPr/>
+        </p:nvSpPr>
+        <p:spPr>
+          <a:xfrm rot="5400000">
+            <a:off x="5592374" y="3789092"/>
+            <a:ext cx="604219" cy="267148"/>
+          </a:xfrm>
+          <a:prstGeom prst="rightArrow">
+            <a:avLst/>
+          </a:prstGeom>
+        </p:spPr>
+        <p:style>
+          <a:lnRef idx="2">
+            <a:schemeClr val="dk1"/>
+          </a:lnRef>
+          <a:fillRef idx="1">
+            <a:schemeClr val="lt1"/>
+          </a:fillRef>
+          <a:effectRef idx="0">
+            <a:schemeClr val="dk1"/>
+          </a:effectRef>
+          <a:fontRef idx="minor">
+            <a:schemeClr val="dk1"/>
+          </a:fontRef>
+        </p:style>
+        <p:txBody>
+          <a:bodyPr rtlCol="0" anchor="ctr"/>
+          <a:lstStyle/>
+          <a:p>
+            <a:pPr algn="ctr"/>
+            <a:endParaRPr kumimoji="1" lang="ja-JP" altLang="en-US"/>
+          </a:p>
+        </p:txBody>
+      </p:sp>
+      <p:sp>
+        <p:nvSpPr>
+          <p:cNvPr id="11" name="右矢印 10">
+            <a:extLst>
+              <a:ext uri="{FF2B5EF4-FFF2-40B4-BE49-F238E27FC236}">
+                <a16:creationId xmlns:a16="http://schemas.microsoft.com/office/drawing/2014/main" id="{297C03FC-72E9-9E4D-8E4E-DD50A0C194C8}"/>
+              </a:ext>
+            </a:extLst>
+          </p:cNvPr>
+          <p:cNvSpPr/>
+          <p:nvPr/>
+        </p:nvSpPr>
+        <p:spPr>
+          <a:xfrm>
+            <a:off x="6803315" y="2799677"/>
+            <a:ext cx="1441525" cy="236668"/>
+          </a:xfrm>
+          <a:prstGeom prst="rightArrow">
+            <a:avLst/>
+          </a:prstGeom>
+        </p:spPr>
+        <p:style>
+          <a:lnRef idx="2">
+            <a:schemeClr val="dk1"/>
+          </a:lnRef>
+          <a:fillRef idx="1">
+            <a:schemeClr val="lt1"/>
+          </a:fillRef>
+          <a:effectRef idx="0">
+            <a:schemeClr val="dk1"/>
+          </a:effectRef>
+          <a:fontRef idx="minor">
+            <a:schemeClr val="dk1"/>
+          </a:fontRef>
+        </p:style>
+        <p:txBody>
+          <a:bodyPr rtlCol="0" anchor="ctr"/>
+          <a:lstStyle/>
+          <a:p>
+            <a:pPr algn="ctr"/>
+            <a:endParaRPr kumimoji="1" lang="ja-JP" altLang="en-US"/>
+          </a:p>
+        </p:txBody>
+      </p:sp>
+      <p:sp>
+        <p:nvSpPr>
+          <p:cNvPr id="12" name="メモ 11">
+            <a:extLst>
+              <a:ext uri="{FF2B5EF4-FFF2-40B4-BE49-F238E27FC236}">
+                <a16:creationId xmlns:a16="http://schemas.microsoft.com/office/drawing/2014/main" id="{6ABC67E8-5228-454C-ACC7-779271D54993}"/>
+              </a:ext>
+            </a:extLst>
+          </p:cNvPr>
+          <p:cNvSpPr/>
+          <p:nvPr/>
+        </p:nvSpPr>
+        <p:spPr>
+          <a:xfrm>
+            <a:off x="8511090" y="2407023"/>
+            <a:ext cx="1056940" cy="1021977"/>
+          </a:xfrm>
+          <a:prstGeom prst="foldedCorner">
+            <a:avLst>
+              <a:gd name="adj" fmla="val 26079"/>
+            </a:avLst>
+          </a:prstGeom>
+        </p:spPr>
+        <p:style>
+          <a:lnRef idx="2">
+            <a:schemeClr val="dk1"/>
+          </a:lnRef>
+          <a:fillRef idx="1">
+            <a:schemeClr val="lt1"/>
+          </a:fillRef>
+          <a:effectRef idx="0">
+            <a:schemeClr val="dk1"/>
+          </a:effectRef>
+          <a:fontRef idx="minor">
+            <a:schemeClr val="dk1"/>
+          </a:fontRef>
+        </p:style>
+        <p:txBody>
+          <a:bodyPr rtlCol="0" anchor="ctr"/>
+          <a:lstStyle/>
+          <a:p>
+            <a:pPr algn="ctr"/>
+            <a:r>
+              <a:rPr lang="ja-JP" altLang="en-US" sz="1100"/>
+              <a:t>メタ情報</a:t>
+            </a:r>
+            <a:endParaRPr lang="en-US" altLang="ja-JP" sz="1100" dirty="0"/>
+          </a:p>
+          <a:p>
+            <a:pPr algn="ctr"/>
+            <a:endParaRPr kumimoji="1" lang="en-US" altLang="ja-JP" sz="1100" dirty="0"/>
+          </a:p>
+          <a:p>
+            <a:pPr algn="ctr"/>
+            <a:r>
+              <a:rPr lang="en-US" altLang="ja-JP" sz="1100" dirty="0"/>
+              <a:t>(Cypher QL)</a:t>
+            </a:r>
+            <a:endParaRPr kumimoji="1" lang="ja-JP" altLang="en-US" sz="1100"/>
+          </a:p>
+        </p:txBody>
+      </p:sp>
+      <p:sp>
+        <p:nvSpPr>
+          <p:cNvPr id="17" name="メモ 16">
+            <a:extLst>
+              <a:ext uri="{FF2B5EF4-FFF2-40B4-BE49-F238E27FC236}">
+                <a16:creationId xmlns:a16="http://schemas.microsoft.com/office/drawing/2014/main" id="{96624E51-B0A0-D749-9FB1-D901CDF70633}"/>
+              </a:ext>
+            </a:extLst>
+          </p:cNvPr>
+          <p:cNvSpPr/>
+          <p:nvPr/>
+        </p:nvSpPr>
+        <p:spPr>
+          <a:xfrm>
+            <a:off x="5437283" y="4314609"/>
+            <a:ext cx="914400" cy="1021977"/>
+          </a:xfrm>
+          <a:prstGeom prst="foldedCorner">
+            <a:avLst>
+              <a:gd name="adj" fmla="val 26079"/>
+            </a:avLst>
+          </a:prstGeom>
+        </p:spPr>
+        <p:style>
+          <a:lnRef idx="2">
+            <a:schemeClr val="dk1"/>
+          </a:lnRef>
+          <a:fillRef idx="1">
+            <a:schemeClr val="lt1"/>
+          </a:fillRef>
+          <a:effectRef idx="0">
+            <a:schemeClr val="dk1"/>
+          </a:effectRef>
+          <a:fontRef idx="minor">
+            <a:schemeClr val="dk1"/>
+          </a:fontRef>
+        </p:style>
+        <p:txBody>
+          <a:bodyPr rtlCol="0" anchor="ctr"/>
+          <a:lstStyle/>
+          <a:p>
+            <a:pPr algn="ctr"/>
+            <a:r>
+              <a:rPr kumimoji="1" lang="en-US" altLang="ja-JP" sz="1100" dirty="0"/>
+              <a:t>transaction</a:t>
+            </a:r>
+            <a:endParaRPr kumimoji="1" lang="ja-JP" altLang="en-US" sz="1100"/>
+          </a:p>
+        </p:txBody>
+      </p:sp>
+      <p:sp>
+        <p:nvSpPr>
+          <p:cNvPr id="3" name="テキスト ボックス 2">
+            <a:extLst>
+              <a:ext uri="{FF2B5EF4-FFF2-40B4-BE49-F238E27FC236}">
+                <a16:creationId xmlns:a16="http://schemas.microsoft.com/office/drawing/2014/main" id="{E2FFD2A9-B2C7-BD41-86BA-3EACAEBC75FA}"/>
+              </a:ext>
+            </a:extLst>
+          </p:cNvPr>
+          <p:cNvSpPr txBox="1"/>
+          <p:nvPr/>
+        </p:nvSpPr>
+        <p:spPr>
+          <a:xfrm>
+            <a:off x="2194894" y="2594845"/>
+            <a:ext cx="1678172" cy="646331"/>
+          </a:xfrm>
+          <a:prstGeom prst="rect">
+            <a:avLst/>
+          </a:prstGeom>
+          <a:noFill/>
+        </p:spPr>
+        <p:txBody>
+          <a:bodyPr wrap="square" rtlCol="0">
+            <a:spAutoFit/>
+          </a:bodyPr>
+          <a:lstStyle/>
+          <a:p>
+            <a:r>
+              <a:rPr kumimoji="1" lang="ja-JP" altLang="en-US"/>
+              <a:t>アセット情報の入力</a:t>
+            </a:r>
+          </a:p>
+        </p:txBody>
+      </p:sp>
+      <p:sp>
+        <p:nvSpPr>
+          <p:cNvPr id="19" name="テキスト ボックス 18">
+            <a:extLst>
+              <a:ext uri="{FF2B5EF4-FFF2-40B4-BE49-F238E27FC236}">
+                <a16:creationId xmlns:a16="http://schemas.microsoft.com/office/drawing/2014/main" id="{9F4B1E2C-5F4F-6A41-99DB-861EDDD7797E}"/>
+              </a:ext>
+            </a:extLst>
+          </p:cNvPr>
+          <p:cNvSpPr txBox="1"/>
+          <p:nvPr/>
+        </p:nvSpPr>
+        <p:spPr>
+          <a:xfrm>
+            <a:off x="5437283" y="4833777"/>
+            <a:ext cx="914400" cy="369332"/>
+          </a:xfrm>
+          <a:prstGeom prst="rect">
+            <a:avLst/>
+          </a:prstGeom>
+          <a:noFill/>
+        </p:spPr>
+        <p:txBody>
+          <a:bodyPr wrap="square" rtlCol="0">
+            <a:spAutoFit/>
+          </a:bodyPr>
+          <a:lstStyle/>
+          <a:p>
+            <a:r>
+              <a:rPr kumimoji="1" lang="ja-JP" altLang="en-US"/>
+              <a:t>未署名</a:t>
+            </a:r>
+          </a:p>
+        </p:txBody>
+      </p:sp>
+      <p:sp>
+        <p:nvSpPr>
+          <p:cNvPr id="20" name="テキスト ボックス 19">
+            <a:extLst>
+              <a:ext uri="{FF2B5EF4-FFF2-40B4-BE49-F238E27FC236}">
+                <a16:creationId xmlns:a16="http://schemas.microsoft.com/office/drawing/2014/main" id="{2EB3E2EE-6F5A-2A4A-842D-C0D27D684AC0}"/>
+              </a:ext>
+            </a:extLst>
+          </p:cNvPr>
+          <p:cNvSpPr txBox="1"/>
+          <p:nvPr/>
+        </p:nvSpPr>
+        <p:spPr>
+          <a:xfrm>
+            <a:off x="3523382" y="4381833"/>
+            <a:ext cx="1913901" cy="523220"/>
+          </a:xfrm>
+          <a:prstGeom prst="rect">
+            <a:avLst/>
+          </a:prstGeom>
+          <a:noFill/>
+        </p:spPr>
+        <p:txBody>
+          <a:bodyPr wrap="square" rtlCol="0">
+            <a:spAutoFit/>
+          </a:bodyPr>
+          <a:lstStyle/>
+          <a:p>
+            <a:r>
+              <a:rPr kumimoji="1" lang="ja-JP" altLang="en-US" sz="1400"/>
+              <a:t>別途署名をつける処理（＝合意）が必要</a:t>
+            </a:r>
+          </a:p>
+        </p:txBody>
+      </p:sp>
+      <p:sp>
+        <p:nvSpPr>
+          <p:cNvPr id="21" name="フローチャート: 磁気ディスク 20">
+            <a:extLst>
+              <a:ext uri="{FF2B5EF4-FFF2-40B4-BE49-F238E27FC236}">
+                <a16:creationId xmlns:a16="http://schemas.microsoft.com/office/drawing/2014/main" id="{E0EEE1BF-795D-D447-B413-14A139B1DB1E}"/>
+              </a:ext>
+            </a:extLst>
+          </p:cNvPr>
+          <p:cNvSpPr/>
+          <p:nvPr/>
+        </p:nvSpPr>
+        <p:spPr>
+          <a:xfrm>
+            <a:off x="8576981" y="4475975"/>
+            <a:ext cx="925158" cy="699247"/>
+          </a:xfrm>
+          <a:prstGeom prst="flowChartMagneticDisk">
+            <a:avLst/>
+          </a:prstGeom>
+        </p:spPr>
+        <p:style>
+          <a:lnRef idx="2">
+            <a:schemeClr val="dk1"/>
+          </a:lnRef>
+          <a:fillRef idx="1">
+            <a:schemeClr val="lt1"/>
+          </a:fillRef>
+          <a:effectRef idx="0">
+            <a:schemeClr val="dk1"/>
+          </a:effectRef>
+          <a:fontRef idx="minor">
+            <a:schemeClr val="dk1"/>
+          </a:fontRef>
+        </p:style>
+        <p:txBody>
+          <a:bodyPr rtlCol="0" anchor="ctr"/>
+          <a:lstStyle/>
+          <a:p>
+            <a:pPr algn="ctr"/>
+            <a:r>
+              <a:rPr kumimoji="1" lang="ja-JP" altLang="en-US"/>
+              <a:t>グラフ</a:t>
+            </a:r>
+            <a:r>
+              <a:rPr kumimoji="1" lang="en-US" altLang="ja-JP" dirty="0"/>
+              <a:t>DB</a:t>
+            </a:r>
+            <a:endParaRPr kumimoji="1" lang="ja-JP" altLang="en-US"/>
+          </a:p>
+        </p:txBody>
+      </p:sp>
+      <p:sp>
+        <p:nvSpPr>
+          <p:cNvPr id="22" name="右矢印 21">
+            <a:extLst>
+              <a:ext uri="{FF2B5EF4-FFF2-40B4-BE49-F238E27FC236}">
+                <a16:creationId xmlns:a16="http://schemas.microsoft.com/office/drawing/2014/main" id="{56FAE52F-2599-DF47-AAC4-F41025E65760}"/>
+              </a:ext>
+            </a:extLst>
+          </p:cNvPr>
+          <p:cNvSpPr/>
+          <p:nvPr/>
+        </p:nvSpPr>
+        <p:spPr>
+          <a:xfrm rot="5400000">
+            <a:off x="8737451" y="3789092"/>
+            <a:ext cx="604219" cy="267148"/>
+          </a:xfrm>
+          <a:prstGeom prst="rightArrow">
+            <a:avLst/>
+          </a:prstGeom>
+        </p:spPr>
+        <p:style>
+          <a:lnRef idx="2">
+            <a:schemeClr val="dk1"/>
+          </a:lnRef>
+          <a:fillRef idx="1">
+            <a:schemeClr val="lt1"/>
+          </a:fillRef>
+          <a:effectRef idx="0">
+            <a:schemeClr val="dk1"/>
+          </a:effectRef>
+          <a:fontRef idx="minor">
+            <a:schemeClr val="dk1"/>
+          </a:fontRef>
+        </p:style>
+        <p:txBody>
+          <a:bodyPr rtlCol="0" anchor="ctr"/>
+          <a:lstStyle/>
+          <a:p>
+            <a:pPr algn="ctr"/>
+            <a:endParaRPr kumimoji="1" lang="ja-JP" altLang="en-US"/>
+          </a:p>
+        </p:txBody>
+      </p:sp>
+      <p:sp>
+        <p:nvSpPr>
+          <p:cNvPr id="23" name="フローチャート: 磁気ディスク 22">
+            <a:extLst>
+              <a:ext uri="{FF2B5EF4-FFF2-40B4-BE49-F238E27FC236}">
+                <a16:creationId xmlns:a16="http://schemas.microsoft.com/office/drawing/2014/main" id="{C89D0BD4-EDB2-284D-BEB9-1D137741A954}"/>
+              </a:ext>
+            </a:extLst>
+          </p:cNvPr>
+          <p:cNvSpPr/>
+          <p:nvPr/>
+        </p:nvSpPr>
+        <p:spPr>
+          <a:xfrm>
+            <a:off x="3187870" y="5496845"/>
+            <a:ext cx="925158" cy="699247"/>
+          </a:xfrm>
+          <a:prstGeom prst="flowChartMagneticDisk">
+            <a:avLst/>
+          </a:prstGeom>
+        </p:spPr>
+        <p:style>
+          <a:lnRef idx="2">
+            <a:schemeClr val="dk1"/>
+          </a:lnRef>
+          <a:fillRef idx="1">
+            <a:schemeClr val="lt1"/>
+          </a:fillRef>
+          <a:effectRef idx="0">
+            <a:schemeClr val="dk1"/>
+          </a:effectRef>
+          <a:fontRef idx="minor">
+            <a:schemeClr val="dk1"/>
+          </a:fontRef>
+        </p:style>
+        <p:txBody>
+          <a:bodyPr rtlCol="0" anchor="ctr"/>
+          <a:lstStyle/>
+          <a:p>
+            <a:pPr algn="ctr"/>
+            <a:r>
+              <a:rPr kumimoji="1" lang="en-US" altLang="ja-JP" dirty="0"/>
+              <a:t>TXDB</a:t>
+            </a:r>
+            <a:endParaRPr kumimoji="1" lang="ja-JP" altLang="en-US"/>
+          </a:p>
+        </p:txBody>
+      </p:sp>
+      <p:sp>
+        <p:nvSpPr>
+          <p:cNvPr id="24" name="右矢印 23">
+            <a:extLst>
+              <a:ext uri="{FF2B5EF4-FFF2-40B4-BE49-F238E27FC236}">
+                <a16:creationId xmlns:a16="http://schemas.microsoft.com/office/drawing/2014/main" id="{476272A4-6D7E-9648-A566-A7AA833F0F3A}"/>
+              </a:ext>
+            </a:extLst>
+          </p:cNvPr>
+          <p:cNvSpPr/>
+          <p:nvPr/>
+        </p:nvSpPr>
+        <p:spPr>
+          <a:xfrm rot="8532125">
+            <a:off x="4235043" y="5303403"/>
+            <a:ext cx="973102" cy="267148"/>
+          </a:xfrm>
+          <a:prstGeom prst="rightArrow">
+            <a:avLst/>
+          </a:prstGeom>
+        </p:spPr>
+        <p:style>
+          <a:lnRef idx="2">
+            <a:schemeClr val="dk1"/>
+          </a:lnRef>
+          <a:fillRef idx="1">
+            <a:schemeClr val="lt1"/>
+          </a:fillRef>
+          <a:effectRef idx="0">
+            <a:schemeClr val="dk1"/>
+          </a:effectRef>
+          <a:fontRef idx="minor">
+            <a:schemeClr val="dk1"/>
+          </a:fontRef>
+        </p:style>
+        <p:txBody>
+          <a:bodyPr rtlCol="0" anchor="ctr"/>
+          <a:lstStyle/>
+          <a:p>
+            <a:pPr algn="ctr"/>
+            <a:endParaRPr kumimoji="1" lang="ja-JP" altLang="en-US"/>
+          </a:p>
+        </p:txBody>
+      </p:sp>
+    </p:spTree>
+    <p:extLst>
+      <p:ext uri="{BB962C8B-B14F-4D97-AF65-F5344CB8AC3E}">
+        <p14:creationId xmlns:p14="http://schemas.microsoft.com/office/powerpoint/2010/main" val="3028688071"/>
+      </p:ext>
+    </p:extLst>
+  </p:cSld>
+  <p:clrMapOvr>
+    <a:masterClrMapping/>
+  </p:clrMapOvr>
+</p:sld>
+</file>
+
+<file path=ppt/slides/slide21.xml><?xml version="1.0" encoding="utf-8"?>
+<p:sld xmlns:a="http://schemas.openxmlformats.org/drawingml/2006/main" xmlns:r="http://schemas.openxmlformats.org/officeDocument/2006/relationships" xmlns:p="http://schemas.openxmlformats.org/presentationml/2006/main">
+  <p:cSld>
+    <p:spTree>
+      <p:nvGrpSpPr>
+        <p:cNvPr id="1" name=""/>
+        <p:cNvGrpSpPr/>
+        <p:nvPr/>
+      </p:nvGrpSpPr>
+      <p:grpSpPr>
+        <a:xfrm>
+          <a:off x="0" y="0"/>
+          <a:ext cx="0" cy="0"/>
+          <a:chOff x="0" y="0"/>
+          <a:chExt cx="0" cy="0"/>
+        </a:xfrm>
+      </p:grpSpPr>
+      <p:sp>
+        <p:nvSpPr>
+          <p:cNvPr id="12" name="円/楕円 11">
+            <a:extLst>
+              <a:ext uri="{FF2B5EF4-FFF2-40B4-BE49-F238E27FC236}">
+                <a16:creationId xmlns:a16="http://schemas.microsoft.com/office/drawing/2014/main" id="{5670E957-92D5-EA41-977B-69EE692F396E}"/>
+              </a:ext>
+            </a:extLst>
+          </p:cNvPr>
+          <p:cNvSpPr/>
+          <p:nvPr/>
+        </p:nvSpPr>
+        <p:spPr>
+          <a:xfrm>
+            <a:off x="2428116" y="5233908"/>
+            <a:ext cx="1549758" cy="969280"/>
+          </a:xfrm>
+          <a:prstGeom prst="ellipse">
+            <a:avLst/>
+          </a:prstGeom>
+        </p:spPr>
+        <p:style>
+          <a:lnRef idx="2">
+            <a:schemeClr val="dk1"/>
+          </a:lnRef>
+          <a:fillRef idx="1">
+            <a:schemeClr val="lt1"/>
+          </a:fillRef>
+          <a:effectRef idx="0">
+            <a:schemeClr val="dk1"/>
+          </a:effectRef>
+          <a:fontRef idx="minor">
+            <a:schemeClr val="dk1"/>
+          </a:fontRef>
+        </p:style>
+        <p:txBody>
+          <a:bodyPr rtlCol="0" anchor="ctr"/>
+          <a:lstStyle/>
+          <a:p>
+            <a:pPr algn="ctr"/>
+            <a:r>
+              <a:rPr kumimoji="1" lang="en-US" altLang="ja-JP" sz="1200" dirty="0"/>
+              <a:t>DB</a:t>
+            </a:r>
+            <a:r>
+              <a:rPr kumimoji="1" lang="ja-JP" altLang="en-US" sz="1200"/>
+              <a:t>クラスタ</a:t>
+            </a:r>
+          </a:p>
+        </p:txBody>
+      </p:sp>
+      <p:sp>
+        <p:nvSpPr>
+          <p:cNvPr id="2" name="タイトル 1">
+            <a:extLst>
+              <a:ext uri="{FF2B5EF4-FFF2-40B4-BE49-F238E27FC236}">
+                <a16:creationId xmlns:a16="http://schemas.microsoft.com/office/drawing/2014/main" id="{EBFBF7E0-256D-3D4C-94C3-5CDAEAFFBA39}"/>
+              </a:ext>
+            </a:extLst>
+          </p:cNvPr>
+          <p:cNvSpPr>
+            <a:spLocks noGrp="1"/>
+          </p:cNvSpPr>
+          <p:nvPr>
+            <p:ph type="title"/>
+          </p:nvPr>
+        </p:nvSpPr>
+        <p:spPr/>
+        <p:txBody>
+          <a:bodyPr/>
+          <a:lstStyle/>
+          <a:p>
+            <a:r>
+              <a:rPr kumimoji="1" lang="en-US" altLang="ja-JP" dirty="0"/>
+              <a:t>BBc-1</a:t>
+            </a:r>
+            <a:r>
+              <a:rPr kumimoji="1" lang="ja-JP" altLang="en-US"/>
+              <a:t>システム例</a:t>
+            </a:r>
+          </a:p>
+        </p:txBody>
+      </p:sp>
+      <p:sp>
+        <p:nvSpPr>
+          <p:cNvPr id="4" name="フッター プレースホルダー 3">
+            <a:extLst>
+              <a:ext uri="{FF2B5EF4-FFF2-40B4-BE49-F238E27FC236}">
+                <a16:creationId xmlns:a16="http://schemas.microsoft.com/office/drawing/2014/main" id="{97AF4EA9-36BA-4E4E-BC4E-840DA9532E14}"/>
+              </a:ext>
+            </a:extLst>
+          </p:cNvPr>
+          <p:cNvSpPr>
+            <a:spLocks noGrp="1"/>
+          </p:cNvSpPr>
+          <p:nvPr>
+            <p:ph type="ftr" sz="quarter" idx="11"/>
+          </p:nvPr>
+        </p:nvSpPr>
+        <p:spPr/>
+        <p:txBody>
+          <a:bodyPr/>
+          <a:lstStyle/>
+          <a:p>
+            <a:r>
+              <a:rPr kumimoji="1" lang="en-US" altLang="ja-JP"/>
+              <a:t>Copyright (c) 2019 Zettant Inc.</a:t>
+            </a:r>
+            <a:endParaRPr kumimoji="1" lang="ja-JP" altLang="en-US" dirty="0"/>
+          </a:p>
+        </p:txBody>
+      </p:sp>
+      <p:sp>
+        <p:nvSpPr>
+          <p:cNvPr id="5" name="スライド番号プレースホルダー 4">
+            <a:extLst>
+              <a:ext uri="{FF2B5EF4-FFF2-40B4-BE49-F238E27FC236}">
+                <a16:creationId xmlns:a16="http://schemas.microsoft.com/office/drawing/2014/main" id="{EF496DB0-35C5-F84B-AC84-8A71BCED8BA8}"/>
+              </a:ext>
+            </a:extLst>
+          </p:cNvPr>
+          <p:cNvSpPr>
+            <a:spLocks noGrp="1"/>
+          </p:cNvSpPr>
+          <p:nvPr>
+            <p:ph type="sldNum" sz="quarter" idx="12"/>
+          </p:nvPr>
+        </p:nvSpPr>
+        <p:spPr/>
+        <p:txBody>
+          <a:bodyPr/>
+          <a:lstStyle/>
+          <a:p>
+            <a:fld id="{1726EC67-F370-534A-B256-AF4D6E27D0FA}" type="slidenum">
+              <a:rPr kumimoji="1" lang="ja-JP" altLang="en-US" smtClean="0"/>
+              <a:t>21</a:t>
+            </a:fld>
+            <a:endParaRPr kumimoji="1" lang="ja-JP" altLang="en-US"/>
+          </a:p>
+        </p:txBody>
+      </p:sp>
+      <p:sp>
+        <p:nvSpPr>
+          <p:cNvPr id="7" name="正方形/長方形 6">
+            <a:extLst>
+              <a:ext uri="{FF2B5EF4-FFF2-40B4-BE49-F238E27FC236}">
+                <a16:creationId xmlns:a16="http://schemas.microsoft.com/office/drawing/2014/main" id="{E1400446-AC5E-4B46-AB26-56CE8C19E0FC}"/>
+              </a:ext>
+            </a:extLst>
+          </p:cNvPr>
+          <p:cNvSpPr/>
+          <p:nvPr/>
+        </p:nvSpPr>
+        <p:spPr>
+          <a:xfrm>
+            <a:off x="2944242" y="2758605"/>
+            <a:ext cx="2425496" cy="1021977"/>
+          </a:xfrm>
+          <a:prstGeom prst="rect">
+            <a:avLst/>
+          </a:prstGeom>
+        </p:spPr>
+        <p:style>
+          <a:lnRef idx="2">
+            <a:schemeClr val="dk1"/>
+          </a:lnRef>
+          <a:fillRef idx="1">
+            <a:schemeClr val="lt1"/>
+          </a:fillRef>
+          <a:effectRef idx="0">
+            <a:schemeClr val="dk1"/>
+          </a:effectRef>
+          <a:fontRef idx="minor">
+            <a:schemeClr val="dk1"/>
+          </a:fontRef>
+        </p:style>
+        <p:txBody>
+          <a:bodyPr rtlCol="0" anchor="ctr"/>
+          <a:lstStyle/>
+          <a:p>
+            <a:pPr algn="ctr"/>
+            <a:r>
+              <a:rPr kumimoji="1" lang="ja-JP" altLang="en-US"/>
+              <a:t>トランザクション</a:t>
+            </a:r>
+            <a:endParaRPr kumimoji="1" lang="en-US" altLang="ja-JP" dirty="0"/>
+          </a:p>
+          <a:p>
+            <a:pPr algn="ctr"/>
+            <a:r>
+              <a:rPr lang="ja-JP" altLang="en-US"/>
+              <a:t>登録機能</a:t>
+            </a:r>
+            <a:endParaRPr lang="en-US" altLang="ja-JP" dirty="0"/>
+          </a:p>
+          <a:p>
+            <a:pPr algn="ctr"/>
+            <a:r>
+              <a:rPr lang="ja-JP" altLang="en-US"/>
+              <a:t>（</a:t>
+            </a:r>
+            <a:r>
+              <a:rPr kumimoji="1" lang="ja-JP" altLang="en-US"/>
+              <a:t>メタ情報生成）</a:t>
+            </a:r>
+          </a:p>
+        </p:txBody>
+      </p:sp>
+      <p:sp>
+        <p:nvSpPr>
+          <p:cNvPr id="8" name="フローチャート: 磁気ディスク 7">
+            <a:extLst>
+              <a:ext uri="{FF2B5EF4-FFF2-40B4-BE49-F238E27FC236}">
+                <a16:creationId xmlns:a16="http://schemas.microsoft.com/office/drawing/2014/main" id="{DC608CB3-A89E-194A-85B9-EAF338D20AB8}"/>
+              </a:ext>
+            </a:extLst>
+          </p:cNvPr>
+          <p:cNvSpPr/>
+          <p:nvPr/>
+        </p:nvSpPr>
+        <p:spPr>
+          <a:xfrm>
+            <a:off x="2060819" y="5199135"/>
+            <a:ext cx="661116" cy="446754"/>
+          </a:xfrm>
+          <a:prstGeom prst="flowChartMagneticDisk">
+            <a:avLst/>
+          </a:prstGeom>
+        </p:spPr>
+        <p:style>
+          <a:lnRef idx="2">
+            <a:schemeClr val="dk1"/>
+          </a:lnRef>
+          <a:fillRef idx="1">
+            <a:schemeClr val="lt1"/>
+          </a:fillRef>
+          <a:effectRef idx="0">
+            <a:schemeClr val="dk1"/>
+          </a:effectRef>
+          <a:fontRef idx="minor">
+            <a:schemeClr val="dk1"/>
+          </a:fontRef>
+        </p:style>
+        <p:txBody>
+          <a:bodyPr rtlCol="0" anchor="ctr"/>
+          <a:lstStyle/>
+          <a:p>
+            <a:pPr algn="ctr"/>
+            <a:r>
+              <a:rPr kumimoji="1" lang="en-US" altLang="ja-JP" sz="1100" dirty="0"/>
+              <a:t>TXDB</a:t>
+            </a:r>
+            <a:endParaRPr kumimoji="1" lang="ja-JP" altLang="en-US" sz="1100"/>
+          </a:p>
+        </p:txBody>
+      </p:sp>
+      <p:sp>
+        <p:nvSpPr>
+          <p:cNvPr id="9" name="フローチャート: 磁気ディスク 8">
+            <a:extLst>
+              <a:ext uri="{FF2B5EF4-FFF2-40B4-BE49-F238E27FC236}">
+                <a16:creationId xmlns:a16="http://schemas.microsoft.com/office/drawing/2014/main" id="{14446B62-4A5C-7C4C-9D1C-957B5BEFE2A4}"/>
+              </a:ext>
+            </a:extLst>
+          </p:cNvPr>
+          <p:cNvSpPr/>
+          <p:nvPr/>
+        </p:nvSpPr>
+        <p:spPr>
+          <a:xfrm>
+            <a:off x="2455172" y="5945038"/>
+            <a:ext cx="661116" cy="446754"/>
+          </a:xfrm>
+          <a:prstGeom prst="flowChartMagneticDisk">
+            <a:avLst/>
+          </a:prstGeom>
+        </p:spPr>
+        <p:style>
+          <a:lnRef idx="2">
+            <a:schemeClr val="dk1"/>
+          </a:lnRef>
+          <a:fillRef idx="1">
+            <a:schemeClr val="lt1"/>
+          </a:fillRef>
+          <a:effectRef idx="0">
+            <a:schemeClr val="dk1"/>
+          </a:effectRef>
+          <a:fontRef idx="minor">
+            <a:schemeClr val="dk1"/>
+          </a:fontRef>
+        </p:style>
+        <p:txBody>
+          <a:bodyPr rtlCol="0" anchor="ctr"/>
+          <a:lstStyle/>
+          <a:p>
+            <a:pPr algn="ctr"/>
+            <a:r>
+              <a:rPr kumimoji="1" lang="en-US" altLang="ja-JP" sz="1100" dirty="0"/>
+              <a:t>TXDB</a:t>
+            </a:r>
+            <a:endParaRPr kumimoji="1" lang="ja-JP" altLang="en-US" sz="1100"/>
+          </a:p>
+        </p:txBody>
+      </p:sp>
+      <p:sp>
+        <p:nvSpPr>
+          <p:cNvPr id="10" name="フローチャート: 磁気ディスク 9">
+            <a:extLst>
+              <a:ext uri="{FF2B5EF4-FFF2-40B4-BE49-F238E27FC236}">
+                <a16:creationId xmlns:a16="http://schemas.microsoft.com/office/drawing/2014/main" id="{366E1034-F0E5-334F-A8F7-4907971243A2}"/>
+              </a:ext>
+            </a:extLst>
+          </p:cNvPr>
+          <p:cNvSpPr/>
+          <p:nvPr/>
+        </p:nvSpPr>
+        <p:spPr>
+          <a:xfrm>
+            <a:off x="3202995" y="4977289"/>
+            <a:ext cx="661116" cy="446754"/>
+          </a:xfrm>
+          <a:prstGeom prst="flowChartMagneticDisk">
+            <a:avLst/>
+          </a:prstGeom>
+        </p:spPr>
+        <p:style>
+          <a:lnRef idx="2">
+            <a:schemeClr val="dk1"/>
+          </a:lnRef>
+          <a:fillRef idx="1">
+            <a:schemeClr val="lt1"/>
+          </a:fillRef>
+          <a:effectRef idx="0">
+            <a:schemeClr val="dk1"/>
+          </a:effectRef>
+          <a:fontRef idx="minor">
+            <a:schemeClr val="dk1"/>
+          </a:fontRef>
+        </p:style>
+        <p:txBody>
+          <a:bodyPr rtlCol="0" anchor="ctr"/>
+          <a:lstStyle/>
+          <a:p>
+            <a:pPr algn="ctr"/>
+            <a:r>
+              <a:rPr kumimoji="1" lang="en-US" altLang="ja-JP" sz="1100" dirty="0"/>
+              <a:t>TXDB</a:t>
+            </a:r>
+            <a:endParaRPr kumimoji="1" lang="ja-JP" altLang="en-US" sz="1100"/>
+          </a:p>
+        </p:txBody>
+      </p:sp>
+      <p:sp>
+        <p:nvSpPr>
+          <p:cNvPr id="11" name="フローチャート: 磁気ディスク 10">
+            <a:extLst>
+              <a:ext uri="{FF2B5EF4-FFF2-40B4-BE49-F238E27FC236}">
+                <a16:creationId xmlns:a16="http://schemas.microsoft.com/office/drawing/2014/main" id="{8075B109-88F3-6240-81B4-04C0402B8F1E}"/>
+              </a:ext>
+            </a:extLst>
+          </p:cNvPr>
+          <p:cNvSpPr/>
+          <p:nvPr/>
+        </p:nvSpPr>
+        <p:spPr>
+          <a:xfrm>
+            <a:off x="3610577" y="5645889"/>
+            <a:ext cx="661116" cy="446754"/>
+          </a:xfrm>
+          <a:prstGeom prst="flowChartMagneticDisk">
+            <a:avLst/>
+          </a:prstGeom>
+        </p:spPr>
+        <p:style>
+          <a:lnRef idx="2">
+            <a:schemeClr val="dk1"/>
+          </a:lnRef>
+          <a:fillRef idx="1">
+            <a:schemeClr val="lt1"/>
+          </a:fillRef>
+          <a:effectRef idx="0">
+            <a:schemeClr val="dk1"/>
+          </a:effectRef>
+          <a:fontRef idx="minor">
+            <a:schemeClr val="dk1"/>
+          </a:fontRef>
+        </p:style>
+        <p:txBody>
+          <a:bodyPr rtlCol="0" anchor="ctr"/>
+          <a:lstStyle/>
+          <a:p>
+            <a:pPr algn="ctr"/>
+            <a:r>
+              <a:rPr kumimoji="1" lang="en-US" altLang="ja-JP" sz="1100" dirty="0"/>
+              <a:t>TXDB</a:t>
+            </a:r>
+            <a:endParaRPr kumimoji="1" lang="ja-JP" altLang="en-US" sz="1100"/>
+          </a:p>
+        </p:txBody>
+      </p:sp>
+      <p:sp>
+        <p:nvSpPr>
+          <p:cNvPr id="14" name="角丸四角形吹き出し 13">
+            <a:extLst>
+              <a:ext uri="{FF2B5EF4-FFF2-40B4-BE49-F238E27FC236}">
+                <a16:creationId xmlns:a16="http://schemas.microsoft.com/office/drawing/2014/main" id="{E1CC0210-448F-4D4D-AA3D-5AAD8408B890}"/>
+              </a:ext>
+            </a:extLst>
+          </p:cNvPr>
+          <p:cNvSpPr/>
+          <p:nvPr/>
+        </p:nvSpPr>
+        <p:spPr>
+          <a:xfrm>
+            <a:off x="318028" y="4359348"/>
+            <a:ext cx="2073349" cy="684780"/>
+          </a:xfrm>
+          <a:prstGeom prst="wedgeRoundRectCallout">
+            <a:avLst>
+              <a:gd name="adj1" fmla="val 68911"/>
+              <a:gd name="adj2" fmla="val 50078"/>
+              <a:gd name="adj3" fmla="val 16667"/>
+            </a:avLst>
+          </a:prstGeom>
+        </p:spPr>
+        <p:style>
+          <a:lnRef idx="2">
+            <a:schemeClr val="accent1">
+              <a:shade val="50000"/>
+            </a:schemeClr>
+          </a:lnRef>
+          <a:fillRef idx="1">
+            <a:schemeClr val="accent1"/>
+          </a:fillRef>
+          <a:effectRef idx="0">
+            <a:schemeClr val="accent1"/>
+          </a:effectRef>
+          <a:fontRef idx="minor">
+            <a:schemeClr val="lt1"/>
+          </a:fontRef>
+        </p:style>
+        <p:txBody>
+          <a:bodyPr rtlCol="0" anchor="ctr"/>
+          <a:lstStyle/>
+          <a:p>
+            <a:pPr algn="ctr"/>
+            <a:r>
+              <a:rPr kumimoji="1" lang="en-US" altLang="ja-JP" sz="1200" dirty="0"/>
+              <a:t>Replication</a:t>
+            </a:r>
+            <a:r>
+              <a:rPr kumimoji="1" lang="ja-JP" altLang="en-US" sz="1200"/>
+              <a:t>は</a:t>
+            </a:r>
+            <a:r>
+              <a:rPr kumimoji="1" lang="en-US" altLang="ja-JP" sz="1200" dirty="0"/>
+              <a:t>DB</a:t>
+            </a:r>
+            <a:r>
+              <a:rPr kumimoji="1" lang="ja-JP" altLang="en-US" sz="1200"/>
+              <a:t>の機能に任せる。ただし</a:t>
+            </a:r>
+            <a:r>
+              <a:rPr kumimoji="1" lang="en-US" altLang="ja-JP" sz="1200" dirty="0"/>
+              <a:t>insert</a:t>
+            </a:r>
+            <a:r>
+              <a:rPr kumimoji="1" lang="ja-JP" altLang="en-US" sz="1200"/>
+              <a:t>する前に署名検証するべき</a:t>
+            </a:r>
+          </a:p>
+        </p:txBody>
+      </p:sp>
+      <p:sp>
+        <p:nvSpPr>
+          <p:cNvPr id="15" name="円/楕円 14">
+            <a:extLst>
+              <a:ext uri="{FF2B5EF4-FFF2-40B4-BE49-F238E27FC236}">
+                <a16:creationId xmlns:a16="http://schemas.microsoft.com/office/drawing/2014/main" id="{496CFC37-59C7-D94D-BC3F-3C2BFE48A664}"/>
+              </a:ext>
+            </a:extLst>
+          </p:cNvPr>
+          <p:cNvSpPr/>
+          <p:nvPr/>
+        </p:nvSpPr>
+        <p:spPr>
+          <a:xfrm>
+            <a:off x="7324856" y="5044128"/>
+            <a:ext cx="1549758" cy="969280"/>
+          </a:xfrm>
+          <a:prstGeom prst="ellipse">
+            <a:avLst/>
+          </a:prstGeom>
+        </p:spPr>
+        <p:style>
+          <a:lnRef idx="2">
+            <a:schemeClr val="dk1"/>
+          </a:lnRef>
+          <a:fillRef idx="1">
+            <a:schemeClr val="lt1"/>
+          </a:fillRef>
+          <a:effectRef idx="0">
+            <a:schemeClr val="dk1"/>
+          </a:effectRef>
+          <a:fontRef idx="minor">
+            <a:schemeClr val="dk1"/>
+          </a:fontRef>
+        </p:style>
+        <p:txBody>
+          <a:bodyPr rtlCol="0" anchor="ctr"/>
+          <a:lstStyle/>
+          <a:p>
+            <a:pPr algn="ctr"/>
+            <a:r>
+              <a:rPr kumimoji="1" lang="en-US" altLang="ja-JP" sz="1200" dirty="0"/>
+              <a:t>DB</a:t>
+            </a:r>
+            <a:r>
+              <a:rPr kumimoji="1" lang="ja-JP" altLang="en-US" sz="1200"/>
+              <a:t>クラスタ</a:t>
+            </a:r>
+          </a:p>
+        </p:txBody>
+      </p:sp>
+      <p:sp>
+        <p:nvSpPr>
+          <p:cNvPr id="16" name="フローチャート: 磁気ディスク 15">
+            <a:extLst>
+              <a:ext uri="{FF2B5EF4-FFF2-40B4-BE49-F238E27FC236}">
+                <a16:creationId xmlns:a16="http://schemas.microsoft.com/office/drawing/2014/main" id="{D799B4B1-6A44-344E-A092-5456B45FAEF0}"/>
+              </a:ext>
+            </a:extLst>
+          </p:cNvPr>
+          <p:cNvSpPr/>
+          <p:nvPr/>
+        </p:nvSpPr>
+        <p:spPr>
+          <a:xfrm>
+            <a:off x="6957559" y="5009355"/>
+            <a:ext cx="661116" cy="446754"/>
+          </a:xfrm>
+          <a:prstGeom prst="flowChartMagneticDisk">
+            <a:avLst/>
+          </a:prstGeom>
+        </p:spPr>
+        <p:style>
+          <a:lnRef idx="2">
+            <a:schemeClr val="dk1"/>
+          </a:lnRef>
+          <a:fillRef idx="1">
+            <a:schemeClr val="lt1"/>
+          </a:fillRef>
+          <a:effectRef idx="0">
+            <a:schemeClr val="dk1"/>
+          </a:effectRef>
+          <a:fontRef idx="minor">
+            <a:schemeClr val="dk1"/>
+          </a:fontRef>
+        </p:style>
+        <p:txBody>
+          <a:bodyPr rtlCol="0" anchor="ctr"/>
+          <a:lstStyle/>
+          <a:p>
+            <a:pPr algn="ctr"/>
+            <a:r>
+              <a:rPr lang="ja-JP" altLang="en-US" sz="1100"/>
+              <a:t>グラフ</a:t>
+            </a:r>
+            <a:r>
+              <a:rPr kumimoji="1" lang="en-US" altLang="ja-JP" sz="1100" dirty="0"/>
+              <a:t>DB</a:t>
+            </a:r>
+            <a:endParaRPr kumimoji="1" lang="ja-JP" altLang="en-US" sz="1100"/>
+          </a:p>
+        </p:txBody>
+      </p:sp>
+      <p:sp>
+        <p:nvSpPr>
+          <p:cNvPr id="17" name="フローチャート: 磁気ディスク 16">
+            <a:extLst>
+              <a:ext uri="{FF2B5EF4-FFF2-40B4-BE49-F238E27FC236}">
+                <a16:creationId xmlns:a16="http://schemas.microsoft.com/office/drawing/2014/main" id="{F5F4BFBF-5A55-4749-9183-79F18AC4461E}"/>
+              </a:ext>
+            </a:extLst>
+          </p:cNvPr>
+          <p:cNvSpPr/>
+          <p:nvPr/>
+        </p:nvSpPr>
+        <p:spPr>
+          <a:xfrm>
+            <a:off x="7351912" y="5755258"/>
+            <a:ext cx="661116" cy="446754"/>
+          </a:xfrm>
+          <a:prstGeom prst="flowChartMagneticDisk">
+            <a:avLst/>
+          </a:prstGeom>
+        </p:spPr>
+        <p:style>
+          <a:lnRef idx="2">
+            <a:schemeClr val="dk1"/>
+          </a:lnRef>
+          <a:fillRef idx="1">
+            <a:schemeClr val="lt1"/>
+          </a:fillRef>
+          <a:effectRef idx="0">
+            <a:schemeClr val="dk1"/>
+          </a:effectRef>
+          <a:fontRef idx="minor">
+            <a:schemeClr val="dk1"/>
+          </a:fontRef>
+        </p:style>
+        <p:txBody>
+          <a:bodyPr rtlCol="0" anchor="ctr"/>
+          <a:lstStyle/>
+          <a:p>
+            <a:pPr algn="ctr"/>
+            <a:r>
+              <a:rPr lang="ja-JP" altLang="en-US" sz="1100"/>
+              <a:t>グラフ</a:t>
+            </a:r>
+            <a:r>
+              <a:rPr lang="en-US" altLang="ja-JP" sz="1100" dirty="0"/>
+              <a:t>DB</a:t>
+            </a:r>
+            <a:endParaRPr lang="ja-JP" altLang="en-US" sz="1100"/>
+          </a:p>
+        </p:txBody>
+      </p:sp>
+      <p:sp>
+        <p:nvSpPr>
+          <p:cNvPr id="18" name="フローチャート: 磁気ディスク 17">
+            <a:extLst>
+              <a:ext uri="{FF2B5EF4-FFF2-40B4-BE49-F238E27FC236}">
+                <a16:creationId xmlns:a16="http://schemas.microsoft.com/office/drawing/2014/main" id="{B8FDB3CD-22B4-A64D-8DE7-D144C075603B}"/>
+              </a:ext>
+            </a:extLst>
+          </p:cNvPr>
+          <p:cNvSpPr/>
+          <p:nvPr/>
+        </p:nvSpPr>
+        <p:spPr>
+          <a:xfrm>
+            <a:off x="8099735" y="4787509"/>
+            <a:ext cx="661116" cy="446754"/>
+          </a:xfrm>
+          <a:prstGeom prst="flowChartMagneticDisk">
+            <a:avLst/>
+          </a:prstGeom>
+        </p:spPr>
+        <p:style>
+          <a:lnRef idx="2">
+            <a:schemeClr val="dk1"/>
+          </a:lnRef>
+          <a:fillRef idx="1">
+            <a:schemeClr val="lt1"/>
+          </a:fillRef>
+          <a:effectRef idx="0">
+            <a:schemeClr val="dk1"/>
+          </a:effectRef>
+          <a:fontRef idx="minor">
+            <a:schemeClr val="dk1"/>
+          </a:fontRef>
+        </p:style>
+        <p:txBody>
+          <a:bodyPr rtlCol="0" anchor="ctr"/>
+          <a:lstStyle/>
+          <a:p>
+            <a:pPr algn="ctr"/>
+            <a:r>
+              <a:rPr lang="ja-JP" altLang="en-US" sz="1100"/>
+              <a:t>グラフ</a:t>
+            </a:r>
+            <a:r>
+              <a:rPr lang="en-US" altLang="ja-JP" sz="1100" dirty="0"/>
+              <a:t>DB</a:t>
+            </a:r>
+            <a:endParaRPr lang="ja-JP" altLang="en-US" sz="1100"/>
+          </a:p>
+        </p:txBody>
+      </p:sp>
+      <p:sp>
+        <p:nvSpPr>
+          <p:cNvPr id="19" name="フローチャート: 磁気ディスク 18">
+            <a:extLst>
+              <a:ext uri="{FF2B5EF4-FFF2-40B4-BE49-F238E27FC236}">
+                <a16:creationId xmlns:a16="http://schemas.microsoft.com/office/drawing/2014/main" id="{72C8A128-8486-C641-B771-41654D53BC6F}"/>
+              </a:ext>
+            </a:extLst>
+          </p:cNvPr>
+          <p:cNvSpPr/>
+          <p:nvPr/>
+        </p:nvSpPr>
+        <p:spPr>
+          <a:xfrm>
+            <a:off x="8507317" y="5456109"/>
+            <a:ext cx="661116" cy="446754"/>
+          </a:xfrm>
+          <a:prstGeom prst="flowChartMagneticDisk">
+            <a:avLst/>
+          </a:prstGeom>
+        </p:spPr>
+        <p:style>
+          <a:lnRef idx="2">
+            <a:schemeClr val="dk1"/>
+          </a:lnRef>
+          <a:fillRef idx="1">
+            <a:schemeClr val="lt1"/>
+          </a:fillRef>
+          <a:effectRef idx="0">
+            <a:schemeClr val="dk1"/>
+          </a:effectRef>
+          <a:fontRef idx="minor">
+            <a:schemeClr val="dk1"/>
+          </a:fontRef>
+        </p:style>
+        <p:txBody>
+          <a:bodyPr rtlCol="0" anchor="ctr"/>
+          <a:lstStyle/>
+          <a:p>
+            <a:pPr algn="ctr"/>
+            <a:r>
+              <a:rPr lang="ja-JP" altLang="en-US" sz="1100"/>
+              <a:t>グラフ</a:t>
+            </a:r>
+            <a:r>
+              <a:rPr lang="en-US" altLang="ja-JP" sz="1100" dirty="0"/>
+              <a:t>DB</a:t>
+            </a:r>
+            <a:endParaRPr lang="ja-JP" altLang="en-US" sz="1100"/>
+          </a:p>
+        </p:txBody>
+      </p:sp>
+      <p:sp>
+        <p:nvSpPr>
+          <p:cNvPr id="20" name="角丸四角形吹き出し 19">
+            <a:extLst>
+              <a:ext uri="{FF2B5EF4-FFF2-40B4-BE49-F238E27FC236}">
+                <a16:creationId xmlns:a16="http://schemas.microsoft.com/office/drawing/2014/main" id="{26B931FE-A0C5-8E4B-9F42-2E2DB6ABD265}"/>
+              </a:ext>
+            </a:extLst>
+          </p:cNvPr>
+          <p:cNvSpPr/>
+          <p:nvPr/>
+        </p:nvSpPr>
+        <p:spPr>
+          <a:xfrm>
+            <a:off x="9168433" y="4495082"/>
+            <a:ext cx="1507227" cy="446754"/>
+          </a:xfrm>
+          <a:prstGeom prst="wedgeRoundRectCallout">
+            <a:avLst>
+              <a:gd name="adj1" fmla="val -57440"/>
+              <a:gd name="adj2" fmla="val 106382"/>
+              <a:gd name="adj3" fmla="val 16667"/>
+            </a:avLst>
+          </a:prstGeom>
+        </p:spPr>
+        <p:style>
+          <a:lnRef idx="2">
+            <a:schemeClr val="accent1">
+              <a:shade val="50000"/>
+            </a:schemeClr>
+          </a:lnRef>
+          <a:fillRef idx="1">
+            <a:schemeClr val="accent1"/>
+          </a:fillRef>
+          <a:effectRef idx="0">
+            <a:schemeClr val="accent1"/>
+          </a:effectRef>
+          <a:fontRef idx="minor">
+            <a:schemeClr val="lt1"/>
+          </a:fontRef>
+        </p:style>
+        <p:txBody>
+          <a:bodyPr rtlCol="0" anchor="ctr"/>
+          <a:lstStyle/>
+          <a:p>
+            <a:pPr algn="ctr"/>
+            <a:r>
+              <a:rPr kumimoji="1" lang="en-US" altLang="ja-JP" sz="1200" dirty="0"/>
+              <a:t>Replication</a:t>
+            </a:r>
+            <a:r>
+              <a:rPr kumimoji="1" lang="ja-JP" altLang="en-US" sz="1200"/>
+              <a:t>は</a:t>
+            </a:r>
+            <a:r>
+              <a:rPr kumimoji="1" lang="en-US" altLang="ja-JP" sz="1200" dirty="0"/>
+              <a:t>DB</a:t>
+            </a:r>
+            <a:r>
+              <a:rPr kumimoji="1" lang="ja-JP" altLang="en-US" sz="1200"/>
+              <a:t>の機能に任せる</a:t>
+            </a:r>
+          </a:p>
+        </p:txBody>
+      </p:sp>
+      <p:cxnSp>
+        <p:nvCxnSpPr>
+          <p:cNvPr id="22" name="直線コネクタ 21">
+            <a:extLst>
+              <a:ext uri="{FF2B5EF4-FFF2-40B4-BE49-F238E27FC236}">
+                <a16:creationId xmlns:a16="http://schemas.microsoft.com/office/drawing/2014/main" id="{807CA963-E1AB-A74C-93E8-DECCACFBA897}"/>
+              </a:ext>
+            </a:extLst>
+          </p:cNvPr>
+          <p:cNvCxnSpPr/>
+          <p:nvPr/>
+        </p:nvCxnSpPr>
+        <p:spPr>
+          <a:xfrm>
+            <a:off x="106326" y="4040372"/>
+            <a:ext cx="10930269" cy="0"/>
+          </a:xfrm>
+          <a:prstGeom prst="line">
+            <a:avLst/>
+          </a:prstGeom>
+          <a:ln>
+            <a:solidFill>
+              <a:schemeClr val="tx1"/>
+            </a:solidFill>
+            <a:prstDash val="dash"/>
+          </a:ln>
+        </p:spPr>
+        <p:style>
+          <a:lnRef idx="1">
+            <a:schemeClr val="accent1"/>
+          </a:lnRef>
+          <a:fillRef idx="0">
+            <a:schemeClr val="accent1"/>
+          </a:fillRef>
+          <a:effectRef idx="0">
+            <a:schemeClr val="accent1"/>
+          </a:effectRef>
+          <a:fontRef idx="minor">
+            <a:schemeClr val="tx1"/>
+          </a:fontRef>
+        </p:style>
+      </p:cxnSp>
+      <p:cxnSp>
+        <p:nvCxnSpPr>
+          <p:cNvPr id="24" name="直線矢印コネクタ 23">
+            <a:extLst>
+              <a:ext uri="{FF2B5EF4-FFF2-40B4-BE49-F238E27FC236}">
+                <a16:creationId xmlns:a16="http://schemas.microsoft.com/office/drawing/2014/main" id="{C97DCB88-7E80-3249-8339-4BBC6EFB7383}"/>
+              </a:ext>
+            </a:extLst>
+          </p:cNvPr>
+          <p:cNvCxnSpPr>
+            <a:stCxn id="7" idx="2"/>
+          </p:cNvCxnSpPr>
+          <p:nvPr/>
+        </p:nvCxnSpPr>
+        <p:spPr>
+          <a:xfrm flipH="1">
+            <a:off x="3528084" y="3780582"/>
+            <a:ext cx="628906" cy="959971"/>
+          </a:xfrm>
+          <a:prstGeom prst="straightConnector1">
+            <a:avLst/>
+          </a:prstGeom>
+          <a:ln>
+            <a:solidFill>
+              <a:schemeClr val="tx1"/>
+            </a:solidFill>
+            <a:tailEnd type="triangle"/>
+          </a:ln>
+        </p:spPr>
+        <p:style>
+          <a:lnRef idx="1">
+            <a:schemeClr val="accent1"/>
+          </a:lnRef>
+          <a:fillRef idx="0">
+            <a:schemeClr val="accent1"/>
+          </a:fillRef>
+          <a:effectRef idx="0">
+            <a:schemeClr val="accent1"/>
+          </a:effectRef>
+          <a:fontRef idx="minor">
+            <a:schemeClr val="tx1"/>
+          </a:fontRef>
+        </p:style>
+      </p:cxnSp>
+      <p:cxnSp>
+        <p:nvCxnSpPr>
+          <p:cNvPr id="25" name="直線矢印コネクタ 24">
+            <a:extLst>
+              <a:ext uri="{FF2B5EF4-FFF2-40B4-BE49-F238E27FC236}">
+                <a16:creationId xmlns:a16="http://schemas.microsoft.com/office/drawing/2014/main" id="{51F20BCD-AC64-AE4A-BD61-40D705EC44C3}"/>
+              </a:ext>
+            </a:extLst>
+          </p:cNvPr>
+          <p:cNvCxnSpPr>
+            <a:cxnSpLocks/>
+            <a:stCxn id="7" idx="2"/>
+          </p:cNvCxnSpPr>
+          <p:nvPr/>
+        </p:nvCxnSpPr>
+        <p:spPr>
+          <a:xfrm>
+            <a:off x="4156990" y="3780582"/>
+            <a:ext cx="2321182" cy="1108256"/>
+          </a:xfrm>
+          <a:prstGeom prst="straightConnector1">
+            <a:avLst/>
+          </a:prstGeom>
+          <a:ln>
+            <a:solidFill>
+              <a:schemeClr val="tx1"/>
+            </a:solidFill>
+            <a:tailEnd type="triangle"/>
+          </a:ln>
+        </p:spPr>
+        <p:style>
+          <a:lnRef idx="1">
+            <a:schemeClr val="accent1"/>
+          </a:lnRef>
+          <a:fillRef idx="0">
+            <a:schemeClr val="accent1"/>
+          </a:fillRef>
+          <a:effectRef idx="0">
+            <a:schemeClr val="accent1"/>
+          </a:effectRef>
+          <a:fontRef idx="minor">
+            <a:schemeClr val="tx1"/>
+          </a:fontRef>
+        </p:style>
+      </p:cxnSp>
+      <p:sp>
+        <p:nvSpPr>
+          <p:cNvPr id="28" name="正方形/長方形 27">
+            <a:extLst>
+              <a:ext uri="{FF2B5EF4-FFF2-40B4-BE49-F238E27FC236}">
+                <a16:creationId xmlns:a16="http://schemas.microsoft.com/office/drawing/2014/main" id="{B5B09E92-715F-E546-A660-FE473E54ED0F}"/>
+              </a:ext>
+            </a:extLst>
+          </p:cNvPr>
+          <p:cNvSpPr/>
+          <p:nvPr/>
+        </p:nvSpPr>
+        <p:spPr>
+          <a:xfrm>
+            <a:off x="5922602" y="2752666"/>
+            <a:ext cx="2230797" cy="1021977"/>
+          </a:xfrm>
+          <a:prstGeom prst="rect">
+            <a:avLst/>
+          </a:prstGeom>
+        </p:spPr>
+        <p:style>
+          <a:lnRef idx="2">
+            <a:schemeClr val="dk1"/>
+          </a:lnRef>
+          <a:fillRef idx="1">
+            <a:schemeClr val="lt1"/>
+          </a:fillRef>
+          <a:effectRef idx="0">
+            <a:schemeClr val="dk1"/>
+          </a:effectRef>
+          <a:fontRef idx="minor">
+            <a:schemeClr val="dk1"/>
+          </a:fontRef>
+        </p:style>
+        <p:txBody>
+          <a:bodyPr rtlCol="0" anchor="ctr"/>
+          <a:lstStyle/>
+          <a:p>
+            <a:pPr algn="ctr"/>
+            <a:r>
+              <a:rPr kumimoji="1" lang="ja-JP" altLang="en-US"/>
+              <a:t>トランザクション検索機能</a:t>
+            </a:r>
+          </a:p>
+        </p:txBody>
+      </p:sp>
+      <p:cxnSp>
+        <p:nvCxnSpPr>
+          <p:cNvPr id="29" name="直線矢印コネクタ 28">
+            <a:extLst>
+              <a:ext uri="{FF2B5EF4-FFF2-40B4-BE49-F238E27FC236}">
+                <a16:creationId xmlns:a16="http://schemas.microsoft.com/office/drawing/2014/main" id="{2142B87D-1835-0B43-808D-DEA7448038AA}"/>
+              </a:ext>
+            </a:extLst>
+          </p:cNvPr>
+          <p:cNvCxnSpPr>
+            <a:cxnSpLocks/>
+            <a:stCxn id="28" idx="2"/>
+          </p:cNvCxnSpPr>
+          <p:nvPr/>
+        </p:nvCxnSpPr>
+        <p:spPr>
+          <a:xfrm>
+            <a:off x="7038001" y="3774643"/>
+            <a:ext cx="755664" cy="965910"/>
+          </a:xfrm>
+          <a:prstGeom prst="straightConnector1">
+            <a:avLst/>
+          </a:prstGeom>
+          <a:ln>
+            <a:solidFill>
+              <a:schemeClr val="tx1"/>
+            </a:solidFill>
+            <a:headEnd type="triangle" w="med" len="med"/>
+            <a:tailEnd type="triangle" w="med" len="med"/>
+          </a:ln>
+        </p:spPr>
+        <p:style>
+          <a:lnRef idx="1">
+            <a:schemeClr val="accent1"/>
+          </a:lnRef>
+          <a:fillRef idx="0">
+            <a:schemeClr val="accent1"/>
+          </a:fillRef>
+          <a:effectRef idx="0">
+            <a:schemeClr val="accent1"/>
+          </a:effectRef>
+          <a:fontRef idx="minor">
+            <a:schemeClr val="tx1"/>
+          </a:fontRef>
+        </p:style>
+      </p:cxnSp>
+      <p:cxnSp>
+        <p:nvCxnSpPr>
+          <p:cNvPr id="32" name="直線矢印コネクタ 31">
+            <a:extLst>
+              <a:ext uri="{FF2B5EF4-FFF2-40B4-BE49-F238E27FC236}">
+                <a16:creationId xmlns:a16="http://schemas.microsoft.com/office/drawing/2014/main" id="{55668483-9853-CD4A-A48C-DC30A4ADC8B1}"/>
+              </a:ext>
+            </a:extLst>
+          </p:cNvPr>
+          <p:cNvCxnSpPr>
+            <a:cxnSpLocks/>
+            <a:stCxn id="28" idx="2"/>
+          </p:cNvCxnSpPr>
+          <p:nvPr/>
+        </p:nvCxnSpPr>
+        <p:spPr>
+          <a:xfrm flipH="1">
+            <a:off x="4465674" y="3774643"/>
+            <a:ext cx="2572327" cy="965910"/>
+          </a:xfrm>
+          <a:prstGeom prst="straightConnector1">
+            <a:avLst/>
+          </a:prstGeom>
+          <a:ln>
+            <a:solidFill>
+              <a:schemeClr val="tx1"/>
+            </a:solidFill>
+            <a:headEnd type="triangle" w="med" len="med"/>
+            <a:tailEnd type="triangle" w="med" len="med"/>
+          </a:ln>
+        </p:spPr>
+        <p:style>
+          <a:lnRef idx="1">
+            <a:schemeClr val="accent1"/>
+          </a:lnRef>
+          <a:fillRef idx="0">
+            <a:schemeClr val="accent1"/>
+          </a:fillRef>
+          <a:effectRef idx="0">
+            <a:schemeClr val="accent1"/>
+          </a:effectRef>
+          <a:fontRef idx="minor">
+            <a:schemeClr val="tx1"/>
+          </a:fontRef>
+        </p:style>
+      </p:cxnSp>
+      <p:cxnSp>
+        <p:nvCxnSpPr>
+          <p:cNvPr id="35" name="直線コネクタ 34">
+            <a:extLst>
+              <a:ext uri="{FF2B5EF4-FFF2-40B4-BE49-F238E27FC236}">
+                <a16:creationId xmlns:a16="http://schemas.microsoft.com/office/drawing/2014/main" id="{5E8457BC-EA1E-5548-BBFB-F244E6CFB3A4}"/>
+              </a:ext>
+            </a:extLst>
+          </p:cNvPr>
+          <p:cNvCxnSpPr/>
+          <p:nvPr/>
+        </p:nvCxnSpPr>
+        <p:spPr>
+          <a:xfrm>
+            <a:off x="130186" y="2480930"/>
+            <a:ext cx="10930269" cy="0"/>
+          </a:xfrm>
+          <a:prstGeom prst="line">
+            <a:avLst/>
+          </a:prstGeom>
+          <a:ln>
+            <a:solidFill>
+              <a:schemeClr val="tx1"/>
+            </a:solidFill>
+            <a:prstDash val="dash"/>
+          </a:ln>
+        </p:spPr>
+        <p:style>
+          <a:lnRef idx="1">
+            <a:schemeClr val="accent1"/>
+          </a:lnRef>
+          <a:fillRef idx="0">
+            <a:schemeClr val="accent1"/>
+          </a:fillRef>
+          <a:effectRef idx="0">
+            <a:schemeClr val="accent1"/>
+          </a:effectRef>
+          <a:fontRef idx="minor">
+            <a:schemeClr val="tx1"/>
+          </a:fontRef>
+        </p:style>
+      </p:cxnSp>
+      <p:sp>
+        <p:nvSpPr>
+          <p:cNvPr id="36" name="正方形/長方形 35">
+            <a:extLst>
+              <a:ext uri="{FF2B5EF4-FFF2-40B4-BE49-F238E27FC236}">
+                <a16:creationId xmlns:a16="http://schemas.microsoft.com/office/drawing/2014/main" id="{85A6DEC5-27B1-4E42-AE34-29A95CA3723B}"/>
+              </a:ext>
+            </a:extLst>
+          </p:cNvPr>
+          <p:cNvSpPr/>
+          <p:nvPr/>
+        </p:nvSpPr>
+        <p:spPr>
+          <a:xfrm>
+            <a:off x="4539089" y="1655041"/>
+            <a:ext cx="2425496" cy="602752"/>
+          </a:xfrm>
+          <a:prstGeom prst="rect">
+            <a:avLst/>
+          </a:prstGeom>
+        </p:spPr>
+        <p:style>
+          <a:lnRef idx="2">
+            <a:schemeClr val="dk1"/>
+          </a:lnRef>
+          <a:fillRef idx="1">
+            <a:schemeClr val="lt1"/>
+          </a:fillRef>
+          <a:effectRef idx="0">
+            <a:schemeClr val="dk1"/>
+          </a:effectRef>
+          <a:fontRef idx="minor">
+            <a:schemeClr val="dk1"/>
+          </a:fontRef>
+        </p:style>
+        <p:txBody>
+          <a:bodyPr rtlCol="0" anchor="ctr"/>
+          <a:lstStyle/>
+          <a:p>
+            <a:pPr algn="ctr"/>
+            <a:r>
+              <a:rPr kumimoji="1" lang="ja-JP" altLang="en-US"/>
+              <a:t>アプリケーション</a:t>
+            </a:r>
+          </a:p>
+        </p:txBody>
+      </p:sp>
+      <p:cxnSp>
+        <p:nvCxnSpPr>
+          <p:cNvPr id="37" name="直線矢印コネクタ 36">
+            <a:extLst>
+              <a:ext uri="{FF2B5EF4-FFF2-40B4-BE49-F238E27FC236}">
+                <a16:creationId xmlns:a16="http://schemas.microsoft.com/office/drawing/2014/main" id="{E34DA679-6C4C-1F4E-A8EB-9322089FCE43}"/>
+              </a:ext>
+            </a:extLst>
+          </p:cNvPr>
+          <p:cNvCxnSpPr>
+            <a:cxnSpLocks/>
+            <a:stCxn id="36" idx="2"/>
+            <a:endCxn id="7" idx="0"/>
+          </p:cNvCxnSpPr>
+          <p:nvPr/>
+        </p:nvCxnSpPr>
+        <p:spPr>
+          <a:xfrm flipH="1">
+            <a:off x="4156990" y="2257793"/>
+            <a:ext cx="1594847" cy="500812"/>
+          </a:xfrm>
+          <a:prstGeom prst="straightConnector1">
+            <a:avLst/>
+          </a:prstGeom>
+          <a:ln>
+            <a:solidFill>
+              <a:schemeClr val="tx1"/>
+            </a:solidFill>
+            <a:headEnd type="triangle" w="med" len="med"/>
+            <a:tailEnd type="triangle" w="med" len="med"/>
+          </a:ln>
+        </p:spPr>
+        <p:style>
+          <a:lnRef idx="1">
+            <a:schemeClr val="accent1"/>
+          </a:lnRef>
+          <a:fillRef idx="0">
+            <a:schemeClr val="accent1"/>
+          </a:fillRef>
+          <a:effectRef idx="0">
+            <a:schemeClr val="accent1"/>
+          </a:effectRef>
+          <a:fontRef idx="minor">
+            <a:schemeClr val="tx1"/>
+          </a:fontRef>
+        </p:style>
+      </p:cxnSp>
+      <p:cxnSp>
+        <p:nvCxnSpPr>
+          <p:cNvPr id="40" name="直線矢印コネクタ 39">
+            <a:extLst>
+              <a:ext uri="{FF2B5EF4-FFF2-40B4-BE49-F238E27FC236}">
+                <a16:creationId xmlns:a16="http://schemas.microsoft.com/office/drawing/2014/main" id="{10B728A3-C659-9640-83F8-94B65993F9EE}"/>
+              </a:ext>
+            </a:extLst>
+          </p:cNvPr>
+          <p:cNvCxnSpPr>
+            <a:cxnSpLocks/>
+            <a:stCxn id="36" idx="2"/>
+            <a:endCxn id="28" idx="0"/>
+          </p:cNvCxnSpPr>
+          <p:nvPr/>
+        </p:nvCxnSpPr>
+        <p:spPr>
+          <a:xfrm>
+            <a:off x="5751837" y="2257793"/>
+            <a:ext cx="1286164" cy="494873"/>
+          </a:xfrm>
+          <a:prstGeom prst="straightConnector1">
+            <a:avLst/>
+          </a:prstGeom>
+          <a:ln>
+            <a:solidFill>
+              <a:schemeClr val="tx1"/>
+            </a:solidFill>
+            <a:headEnd type="triangle" w="med" len="med"/>
+            <a:tailEnd type="triangle" w="med" len="med"/>
+          </a:ln>
+        </p:spPr>
+        <p:style>
+          <a:lnRef idx="1">
+            <a:schemeClr val="accent1"/>
+          </a:lnRef>
+          <a:fillRef idx="0">
+            <a:schemeClr val="accent1"/>
+          </a:fillRef>
+          <a:effectRef idx="0">
+            <a:schemeClr val="accent1"/>
+          </a:effectRef>
+          <a:fontRef idx="minor">
+            <a:schemeClr val="tx1"/>
+          </a:fontRef>
+        </p:style>
+      </p:cxnSp>
+      <p:sp>
+        <p:nvSpPr>
+          <p:cNvPr id="43" name="角丸四角形吹き出し 42">
+            <a:extLst>
+              <a:ext uri="{FF2B5EF4-FFF2-40B4-BE49-F238E27FC236}">
+                <a16:creationId xmlns:a16="http://schemas.microsoft.com/office/drawing/2014/main" id="{9127B9DD-5F4C-B042-AA3F-33914C489624}"/>
+              </a:ext>
+            </a:extLst>
+          </p:cNvPr>
+          <p:cNvSpPr/>
+          <p:nvPr/>
+        </p:nvSpPr>
+        <p:spPr>
+          <a:xfrm>
+            <a:off x="9982200" y="365125"/>
+            <a:ext cx="1975563" cy="821510"/>
+          </a:xfrm>
+          <a:prstGeom prst="wedgeRoundRectCallout">
+            <a:avLst>
+              <a:gd name="adj1" fmla="val -31896"/>
+              <a:gd name="adj2" fmla="val 12173"/>
+              <a:gd name="adj3" fmla="val 16667"/>
+            </a:avLst>
+          </a:prstGeom>
+        </p:spPr>
+        <p:style>
+          <a:lnRef idx="2">
+            <a:schemeClr val="dk1"/>
+          </a:lnRef>
+          <a:fillRef idx="1">
+            <a:schemeClr val="lt1"/>
+          </a:fillRef>
+          <a:effectRef idx="0">
+            <a:schemeClr val="dk1"/>
+          </a:effectRef>
+          <a:fontRef idx="minor">
+            <a:schemeClr val="dk1"/>
+          </a:fontRef>
+        </p:style>
+        <p:txBody>
+          <a:bodyPr rtlCol="0" anchor="ctr"/>
+          <a:lstStyle/>
+          <a:p>
+            <a:pPr algn="ctr"/>
+            <a:r>
+              <a:rPr kumimoji="1" lang="ja-JP" altLang="en-US" sz="1200"/>
+              <a:t>これらすべての機能については、どこにホストするかは自由に選べばよい</a:t>
+            </a:r>
+          </a:p>
+        </p:txBody>
+      </p:sp>
+      <p:sp>
+        <p:nvSpPr>
+          <p:cNvPr id="44" name="角丸四角形吹き出し 43">
+            <a:extLst>
+              <a:ext uri="{FF2B5EF4-FFF2-40B4-BE49-F238E27FC236}">
+                <a16:creationId xmlns:a16="http://schemas.microsoft.com/office/drawing/2014/main" id="{E8004D77-B076-CD40-853B-1E0E61D70C76}"/>
+              </a:ext>
+            </a:extLst>
+          </p:cNvPr>
+          <p:cNvSpPr/>
+          <p:nvPr/>
+        </p:nvSpPr>
+        <p:spPr>
+          <a:xfrm>
+            <a:off x="6702852" y="1077160"/>
+            <a:ext cx="1831646" cy="497595"/>
+          </a:xfrm>
+          <a:prstGeom prst="wedgeRoundRectCallout">
+            <a:avLst>
+              <a:gd name="adj1" fmla="val -46343"/>
+              <a:gd name="adj2" fmla="val 99549"/>
+              <a:gd name="adj3" fmla="val 16667"/>
+            </a:avLst>
+          </a:prstGeom>
+        </p:spPr>
+        <p:style>
+          <a:lnRef idx="2">
+            <a:schemeClr val="accent1">
+              <a:shade val="50000"/>
+            </a:schemeClr>
+          </a:lnRef>
+          <a:fillRef idx="1">
+            <a:schemeClr val="accent1"/>
+          </a:fillRef>
+          <a:effectRef idx="0">
+            <a:schemeClr val="accent1"/>
+          </a:effectRef>
+          <a:fontRef idx="minor">
+            <a:schemeClr val="lt1"/>
+          </a:fontRef>
+        </p:style>
+        <p:txBody>
+          <a:bodyPr rtlCol="0" anchor="ctr"/>
+          <a:lstStyle/>
+          <a:p>
+            <a:pPr algn="ctr"/>
+            <a:r>
+              <a:rPr kumimoji="1" lang="ja-JP" altLang="en-US" sz="1200"/>
+              <a:t>合意（署名付与）はアプリレイヤで実施する</a:t>
+            </a:r>
+          </a:p>
+        </p:txBody>
+      </p:sp>
+      <p:sp>
+        <p:nvSpPr>
+          <p:cNvPr id="45" name="テキスト ボックス 44">
+            <a:extLst>
+              <a:ext uri="{FF2B5EF4-FFF2-40B4-BE49-F238E27FC236}">
+                <a16:creationId xmlns:a16="http://schemas.microsoft.com/office/drawing/2014/main" id="{73CE7043-62F3-D641-9E5E-51E8839A6D33}"/>
+              </a:ext>
+            </a:extLst>
+          </p:cNvPr>
+          <p:cNvSpPr txBox="1"/>
+          <p:nvPr/>
+        </p:nvSpPr>
+        <p:spPr>
+          <a:xfrm>
+            <a:off x="238253" y="1838753"/>
+            <a:ext cx="1925853" cy="507831"/>
+          </a:xfrm>
+          <a:prstGeom prst="rect">
+            <a:avLst/>
+          </a:prstGeom>
+          <a:noFill/>
+        </p:spPr>
+        <p:txBody>
+          <a:bodyPr wrap="square" rtlCol="0">
+            <a:spAutoFit/>
+          </a:bodyPr>
+          <a:lstStyle/>
+          <a:p>
+            <a:r>
+              <a:rPr lang="en-US" altLang="ja-JP" sz="900" dirty="0"/>
+              <a:t>b</a:t>
+            </a:r>
+            <a:r>
+              <a:rPr kumimoji="1" lang="en-US" altLang="ja-JP" sz="900" dirty="0"/>
+              <a:t>bc1</a:t>
+            </a:r>
+            <a:r>
+              <a:rPr kumimoji="1" lang="ja-JP" altLang="en-US" sz="900"/>
+              <a:t>リファレンス実装</a:t>
+            </a:r>
+            <a:r>
+              <a:rPr kumimoji="1" lang="en-US" altLang="ja-JP" sz="900" dirty="0"/>
+              <a:t>(python</a:t>
+            </a:r>
+            <a:r>
+              <a:rPr kumimoji="1" lang="ja-JP" altLang="en-US" sz="900"/>
+              <a:t>版</a:t>
+            </a:r>
+            <a:r>
+              <a:rPr kumimoji="1" lang="en-US" altLang="ja-JP" sz="900" dirty="0"/>
+              <a:t>)</a:t>
+            </a:r>
+            <a:r>
+              <a:rPr kumimoji="1" lang="ja-JP" altLang="en-US" sz="900"/>
+              <a:t>では、ここは</a:t>
+            </a:r>
+            <a:r>
+              <a:rPr kumimoji="1" lang="en-US" altLang="ja-JP" sz="900" dirty="0" err="1"/>
+              <a:t>bbc_core</a:t>
+            </a:r>
+            <a:r>
+              <a:rPr kumimoji="1" lang="ja-JP" altLang="en-US" sz="900"/>
+              <a:t>と</a:t>
+            </a:r>
+            <a:r>
+              <a:rPr kumimoji="1" lang="en-US" altLang="ja-JP" sz="900" dirty="0" err="1"/>
+              <a:t>bbc_app</a:t>
+            </a:r>
+            <a:r>
+              <a:rPr kumimoji="1" lang="ja-JP" altLang="en-US" sz="900"/>
+              <a:t>で実現されていた</a:t>
+            </a:r>
+          </a:p>
+        </p:txBody>
+      </p:sp>
+      <p:sp>
+        <p:nvSpPr>
+          <p:cNvPr id="46" name="テキスト ボックス 45">
+            <a:extLst>
+              <a:ext uri="{FF2B5EF4-FFF2-40B4-BE49-F238E27FC236}">
+                <a16:creationId xmlns:a16="http://schemas.microsoft.com/office/drawing/2014/main" id="{25C33BF9-7E4A-BE41-BC33-6EE3C9B952EE}"/>
+              </a:ext>
+            </a:extLst>
+          </p:cNvPr>
+          <p:cNvSpPr txBox="1"/>
+          <p:nvPr/>
+        </p:nvSpPr>
+        <p:spPr>
+          <a:xfrm>
+            <a:off x="236356" y="3077832"/>
+            <a:ext cx="2153124" cy="507831"/>
+          </a:xfrm>
+          <a:prstGeom prst="rect">
+            <a:avLst/>
+          </a:prstGeom>
+          <a:noFill/>
+        </p:spPr>
+        <p:txBody>
+          <a:bodyPr wrap="square" rtlCol="0">
+            <a:spAutoFit/>
+          </a:bodyPr>
+          <a:lstStyle/>
+          <a:p>
+            <a:r>
+              <a:rPr lang="en-US" altLang="ja-JP" sz="900" dirty="0"/>
+              <a:t>b</a:t>
+            </a:r>
+            <a:r>
+              <a:rPr kumimoji="1" lang="en-US" altLang="ja-JP" sz="900" dirty="0"/>
+              <a:t>bc1</a:t>
+            </a:r>
+            <a:r>
+              <a:rPr kumimoji="1" lang="ja-JP" altLang="en-US" sz="900"/>
+              <a:t>リファレンス実装</a:t>
+            </a:r>
+            <a:r>
+              <a:rPr kumimoji="1" lang="en-US" altLang="ja-JP" sz="900" dirty="0"/>
+              <a:t>(python</a:t>
+            </a:r>
+            <a:r>
+              <a:rPr kumimoji="1" lang="ja-JP" altLang="en-US" sz="900"/>
+              <a:t>版</a:t>
+            </a:r>
+            <a:r>
+              <a:rPr kumimoji="1" lang="en-US" altLang="ja-JP" sz="900" dirty="0"/>
+              <a:t>)</a:t>
+            </a:r>
+            <a:r>
+              <a:rPr kumimoji="1" lang="ja-JP" altLang="en-US" sz="900"/>
+              <a:t>では、ここに当たる機能は</a:t>
+            </a:r>
+            <a:r>
+              <a:rPr kumimoji="1" lang="en-US" altLang="ja-JP" sz="900" dirty="0" err="1"/>
+              <a:t>data_handler.py</a:t>
+            </a:r>
+            <a:r>
+              <a:rPr kumimoji="1" lang="ja-JP" altLang="en-US" sz="900"/>
+              <a:t>で実装されていた</a:t>
+            </a:r>
+          </a:p>
+        </p:txBody>
+      </p:sp>
+      <p:sp>
+        <p:nvSpPr>
+          <p:cNvPr id="47" name="テキスト ボックス 46">
+            <a:extLst>
+              <a:ext uri="{FF2B5EF4-FFF2-40B4-BE49-F238E27FC236}">
+                <a16:creationId xmlns:a16="http://schemas.microsoft.com/office/drawing/2014/main" id="{ADC9128C-7726-C442-B918-6ED3235C8878}"/>
+              </a:ext>
+            </a:extLst>
+          </p:cNvPr>
+          <p:cNvSpPr txBox="1"/>
+          <p:nvPr/>
+        </p:nvSpPr>
+        <p:spPr>
+          <a:xfrm>
+            <a:off x="4653455" y="5514327"/>
+            <a:ext cx="2230688" cy="646331"/>
+          </a:xfrm>
+          <a:prstGeom prst="rect">
+            <a:avLst/>
+          </a:prstGeom>
+          <a:noFill/>
+        </p:spPr>
+        <p:txBody>
+          <a:bodyPr wrap="square" rtlCol="0">
+            <a:spAutoFit/>
+          </a:bodyPr>
+          <a:lstStyle/>
+          <a:p>
+            <a:r>
+              <a:rPr lang="en-US" altLang="ja-JP" sz="900" dirty="0"/>
+              <a:t>b</a:t>
+            </a:r>
+            <a:r>
+              <a:rPr kumimoji="1" lang="en-US" altLang="ja-JP" sz="900" dirty="0"/>
+              <a:t>bc1</a:t>
+            </a:r>
+            <a:r>
+              <a:rPr kumimoji="1" lang="ja-JP" altLang="en-US" sz="900"/>
+              <a:t>リファレンス実装</a:t>
+            </a:r>
+            <a:r>
+              <a:rPr kumimoji="1" lang="en-US" altLang="ja-JP" sz="900" dirty="0"/>
+              <a:t>(python</a:t>
+            </a:r>
+            <a:r>
+              <a:rPr kumimoji="1" lang="ja-JP" altLang="en-US" sz="900"/>
+              <a:t>版</a:t>
+            </a:r>
+            <a:r>
+              <a:rPr kumimoji="1" lang="en-US" altLang="ja-JP" sz="900" dirty="0"/>
+              <a:t>)</a:t>
+            </a:r>
+            <a:r>
+              <a:rPr kumimoji="1" lang="ja-JP" altLang="en-US" sz="900"/>
+              <a:t>では、ここに当たる機能は</a:t>
+            </a:r>
+            <a:r>
+              <a:rPr kumimoji="1" lang="en-US" altLang="ja-JP" sz="900" dirty="0" err="1"/>
+              <a:t>data_handler.py</a:t>
+            </a:r>
+            <a:r>
+              <a:rPr kumimoji="1" lang="ja-JP" altLang="en-US" sz="900"/>
+              <a:t>と</a:t>
+            </a:r>
+            <a:r>
+              <a:rPr kumimoji="1" lang="en-US" altLang="ja-JP" sz="900" dirty="0" err="1"/>
+              <a:t>bbc_network.py</a:t>
+            </a:r>
+            <a:r>
+              <a:rPr kumimoji="1" lang="ja-JP" altLang="en-US" sz="900"/>
+              <a:t>、</a:t>
+            </a:r>
+            <a:r>
+              <a:rPr kumimoji="1" lang="en-US" altLang="ja-JP" sz="900" dirty="0"/>
+              <a:t>sqlite3</a:t>
+            </a:r>
+            <a:r>
+              <a:rPr kumimoji="1" lang="ja-JP" altLang="en-US" sz="900"/>
+              <a:t>（または</a:t>
+            </a:r>
+            <a:r>
+              <a:rPr kumimoji="1" lang="en-US" altLang="ja-JP" sz="900" dirty="0" err="1"/>
+              <a:t>mysql</a:t>
+            </a:r>
+            <a:r>
+              <a:rPr kumimoji="1" lang="ja-JP" altLang="en-US" sz="900"/>
+              <a:t>）で実装されていた</a:t>
+            </a:r>
+          </a:p>
+        </p:txBody>
+      </p:sp>
+    </p:spTree>
+    <p:extLst>
+      <p:ext uri="{BB962C8B-B14F-4D97-AF65-F5344CB8AC3E}">
+        <p14:creationId xmlns:p14="http://schemas.microsoft.com/office/powerpoint/2010/main" val="3555493280"/>
+      </p:ext>
+    </p:extLst>
+  </p:cSld>
+  <p:clrMapOvr>
+    <a:masterClrMapping/>
+  </p:clrMapOvr>
+</p:sld>
+</file>
+
+<file path=ppt/slides/slide22.xml><?xml version="1.0" encoding="utf-8"?>
+<p:sld xmlns:a="http://schemas.openxmlformats.org/drawingml/2006/main" xmlns:r="http://schemas.openxmlformats.org/officeDocument/2006/relationships" xmlns:p="http://schemas.openxmlformats.org/presentationml/2006/main">
+  <p:cSld>
+    <p:spTree>
+      <p:nvGrpSpPr>
+        <p:cNvPr id="1" name=""/>
+        <p:cNvGrpSpPr/>
+        <p:nvPr/>
+      </p:nvGrpSpPr>
+      <p:grpSpPr>
+        <a:xfrm>
+          <a:off x="0" y="0"/>
+          <a:ext cx="0" cy="0"/>
+          <a:chOff x="0" y="0"/>
+          <a:chExt cx="0" cy="0"/>
+        </a:xfrm>
+      </p:grpSpPr>
+      <p:sp>
+        <p:nvSpPr>
+          <p:cNvPr id="2" name="タイトル 1"/>
+          <p:cNvSpPr>
+            <a:spLocks noGrp="1"/>
+          </p:cNvSpPr>
+          <p:nvPr>
+            <p:ph type="title"/>
+          </p:nvPr>
+        </p:nvSpPr>
+        <p:spPr>
+          <a:xfrm>
+            <a:off x="838200" y="2599279"/>
+            <a:ext cx="10515600" cy="1325563"/>
+          </a:xfrm>
+        </p:spPr>
+        <p:txBody>
+          <a:bodyPr/>
+          <a:lstStyle/>
+          <a:p>
+            <a:r>
+              <a:rPr lang="en-US" altLang="ja-JP" dirty="0"/>
+              <a:t>Neo4j</a:t>
+            </a:r>
+            <a:r>
+              <a:rPr lang="ja-JP" altLang="en-US"/>
+              <a:t>への適用</a:t>
+            </a:r>
+            <a:endParaRPr kumimoji="1" lang="ja-JP" altLang="en-US" dirty="0"/>
+          </a:p>
+        </p:txBody>
+      </p:sp>
+      <p:sp>
+        <p:nvSpPr>
+          <p:cNvPr id="4" name="フッター プレースホルダー 3"/>
+          <p:cNvSpPr>
+            <a:spLocks noGrp="1"/>
+          </p:cNvSpPr>
+          <p:nvPr>
+            <p:ph type="ftr" sz="quarter" idx="11"/>
+          </p:nvPr>
+        </p:nvSpPr>
+        <p:spPr/>
+        <p:txBody>
+          <a:bodyPr/>
+          <a:lstStyle/>
+          <a:p>
+            <a:r>
+              <a:rPr kumimoji="1" lang="en" altLang="ja-JP"/>
+              <a:t>Copyright (c) 2019 Zettant Inc.</a:t>
+            </a:r>
+            <a:endParaRPr kumimoji="1" lang="ja-JP" altLang="en-US"/>
+          </a:p>
+        </p:txBody>
+      </p:sp>
+      <p:sp>
+        <p:nvSpPr>
+          <p:cNvPr id="5" name="スライド番号プレースホルダー 4"/>
+          <p:cNvSpPr>
+            <a:spLocks noGrp="1"/>
+          </p:cNvSpPr>
+          <p:nvPr>
+            <p:ph type="sldNum" sz="quarter" idx="12"/>
+          </p:nvPr>
+        </p:nvSpPr>
+        <p:spPr/>
+        <p:txBody>
+          <a:bodyPr/>
+          <a:lstStyle/>
+          <a:p>
+            <a:fld id="{1726EC67-F370-534A-B256-AF4D6E27D0FA}" type="slidenum">
+              <a:rPr kumimoji="1" lang="ja-JP" altLang="en-US" smtClean="0"/>
+              <a:t>22</a:t>
+            </a:fld>
+            <a:endParaRPr kumimoji="1" lang="ja-JP" altLang="en-US"/>
+          </a:p>
+        </p:txBody>
+      </p:sp>
+    </p:spTree>
+    <p:extLst>
+      <p:ext uri="{BB962C8B-B14F-4D97-AF65-F5344CB8AC3E}">
+        <p14:creationId xmlns:p14="http://schemas.microsoft.com/office/powerpoint/2010/main" val="250145714"/>
+      </p:ext>
+    </p:extLst>
+  </p:cSld>
+  <p:clrMapOvr>
+    <a:masterClrMapping/>
+  </p:clrMapOvr>
+</p:sld>
+</file>
+
+<file path=ppt/slides/slide23.xml><?xml version="1.0" encoding="utf-8"?>
+<p:sld xmlns:a="http://schemas.openxmlformats.org/drawingml/2006/main" xmlns:r="http://schemas.openxmlformats.org/officeDocument/2006/relationships" xmlns:p="http://schemas.openxmlformats.org/presentationml/2006/main">
+  <p:cSld>
+    <p:spTree>
+      <p:nvGrpSpPr>
+        <p:cNvPr id="1" name=""/>
+        <p:cNvGrpSpPr/>
+        <p:nvPr/>
+      </p:nvGrpSpPr>
+      <p:grpSpPr>
+        <a:xfrm>
+          <a:off x="0" y="0"/>
+          <a:ext cx="0" cy="0"/>
+          <a:chOff x="0" y="0"/>
+          <a:chExt cx="0" cy="0"/>
+        </a:xfrm>
+      </p:grpSpPr>
+      <p:sp>
+        <p:nvSpPr>
+          <p:cNvPr id="2" name="タイトル 1">
+            <a:extLst>
+              <a:ext uri="{FF2B5EF4-FFF2-40B4-BE49-F238E27FC236}">
+                <a16:creationId xmlns:a16="http://schemas.microsoft.com/office/drawing/2014/main" id="{684A77F3-7CE8-DC40-BCE2-247F74ADE1E6}"/>
+              </a:ext>
+            </a:extLst>
+          </p:cNvPr>
+          <p:cNvSpPr>
+            <a:spLocks noGrp="1"/>
+          </p:cNvSpPr>
+          <p:nvPr>
+            <p:ph type="title"/>
+          </p:nvPr>
+        </p:nvSpPr>
+        <p:spPr/>
+        <p:txBody>
+          <a:bodyPr/>
+          <a:lstStyle/>
+          <a:p>
+            <a:r>
+              <a:rPr kumimoji="1" lang="en-US" altLang="ja-JP" dirty="0"/>
+              <a:t>Neo4j</a:t>
+            </a:r>
+            <a:endParaRPr kumimoji="1" lang="ja-JP" altLang="en-US"/>
+          </a:p>
+        </p:txBody>
+      </p:sp>
+      <p:sp>
+        <p:nvSpPr>
+          <p:cNvPr id="3" name="コンテンツ プレースホルダー 2">
+            <a:extLst>
+              <a:ext uri="{FF2B5EF4-FFF2-40B4-BE49-F238E27FC236}">
+                <a16:creationId xmlns:a16="http://schemas.microsoft.com/office/drawing/2014/main" id="{F9515AEB-7E2E-2B45-B193-4D5F218F758F}"/>
+              </a:ext>
+            </a:extLst>
+          </p:cNvPr>
+          <p:cNvSpPr>
+            <a:spLocks noGrp="1"/>
+          </p:cNvSpPr>
+          <p:nvPr>
+            <p:ph idx="1"/>
+          </p:nvPr>
+        </p:nvSpPr>
+        <p:spPr>
+          <a:xfrm>
+            <a:off x="838200" y="1825625"/>
+            <a:ext cx="10515600" cy="4667250"/>
+          </a:xfrm>
+        </p:spPr>
+        <p:txBody>
+          <a:bodyPr>
+            <a:normAutofit/>
+          </a:bodyPr>
+          <a:lstStyle/>
+          <a:p>
+            <a:r>
+              <a:rPr kumimoji="1" lang="ja-JP" altLang="en-US"/>
+              <a:t>オープンソースで</a:t>
+            </a:r>
+            <a:r>
+              <a:rPr lang="ja-JP" altLang="en-US"/>
+              <a:t>は最も人気があるグラフデータベース</a:t>
+            </a:r>
+            <a:endParaRPr lang="en-US" altLang="ja-JP" dirty="0"/>
+          </a:p>
+          <a:p>
+            <a:pPr lvl="1"/>
+            <a:r>
+              <a:rPr lang="en" altLang="ja-JP" dirty="0">
+                <a:hlinkClick r:id="rId2"/>
+              </a:rPr>
+              <a:t>https://neo4j.com</a:t>
+            </a:r>
+            <a:endParaRPr lang="en" altLang="ja-JP" dirty="0"/>
+          </a:p>
+          <a:p>
+            <a:endParaRPr kumimoji="1" lang="en-US" altLang="ja-JP" dirty="0"/>
+          </a:p>
+          <a:p>
+            <a:r>
+              <a:rPr lang="ja-JP" altLang="en-US"/>
+              <a:t>本体は</a:t>
+            </a:r>
+            <a:r>
+              <a:rPr lang="en-US" altLang="ja-JP" dirty="0"/>
+              <a:t>Java</a:t>
+            </a:r>
+            <a:r>
+              <a:rPr lang="ja-JP" altLang="en-US"/>
+              <a:t>実装だが、</a:t>
+            </a:r>
+            <a:r>
+              <a:rPr lang="en-US" altLang="ja-JP" dirty="0"/>
+              <a:t>Bolt</a:t>
+            </a:r>
+            <a:r>
+              <a:rPr lang="ja-JP" altLang="en-US"/>
+              <a:t>プロトコルという仕様があり、それを他言語で実装した</a:t>
+            </a:r>
+            <a:r>
+              <a:rPr lang="en-US" altLang="ja-JP" dirty="0"/>
+              <a:t>Bolt</a:t>
+            </a:r>
+            <a:r>
+              <a:rPr lang="ja-JP" altLang="en-US"/>
+              <a:t>ドライバが公開されている</a:t>
+            </a:r>
+            <a:endParaRPr lang="en-US" altLang="ja-JP" dirty="0"/>
+          </a:p>
+          <a:p>
+            <a:pPr lvl="1"/>
+            <a:r>
+              <a:rPr lang="en" altLang="ja-JP" dirty="0"/>
+              <a:t>.NET/Java/JavaScript/Python/Go</a:t>
+            </a:r>
+            <a:r>
+              <a:rPr lang="ja-JP" altLang="en-US"/>
+              <a:t>などが公式にサポートされている</a:t>
+            </a:r>
+            <a:endParaRPr lang="en-US" altLang="ja-JP" dirty="0"/>
+          </a:p>
+          <a:p>
+            <a:endParaRPr lang="en" altLang="ja-JP" dirty="0"/>
+          </a:p>
+          <a:p>
+            <a:r>
+              <a:rPr lang="en" altLang="ja-JP" dirty="0"/>
+              <a:t>Cypher</a:t>
+            </a:r>
+            <a:r>
+              <a:rPr lang="ja-JP" altLang="en-US"/>
+              <a:t>クエリ言語（</a:t>
+            </a:r>
+            <a:r>
+              <a:rPr lang="en-US" altLang="ja-JP" dirty="0" err="1"/>
+              <a:t>CypherQL</a:t>
+            </a:r>
+            <a:r>
+              <a:rPr lang="ja-JP" altLang="en-US"/>
+              <a:t>）で検索できる</a:t>
+            </a:r>
+            <a:endParaRPr lang="en-US" altLang="ja-JP" dirty="0"/>
+          </a:p>
+          <a:p>
+            <a:endParaRPr kumimoji="1" lang="en-US" altLang="ja-JP" dirty="0"/>
+          </a:p>
+          <a:p>
+            <a:r>
+              <a:rPr lang="ja-JP" altLang="en-US"/>
+              <a:t>ノードやエッジにプロパティを設定できる</a:t>
+            </a:r>
+            <a:endParaRPr lang="en-US" altLang="ja-JP" dirty="0"/>
+          </a:p>
+          <a:p>
+            <a:pPr lvl="1"/>
+            <a:r>
+              <a:rPr kumimoji="1" lang="ja-JP" altLang="en-US"/>
+              <a:t>すべて</a:t>
+            </a:r>
+            <a:r>
+              <a:rPr kumimoji="1" lang="en-US" altLang="ja-JP" dirty="0"/>
+              <a:t>JSON</a:t>
+            </a:r>
+            <a:r>
+              <a:rPr kumimoji="1" lang="ja-JP" altLang="en-US"/>
+              <a:t>形式</a:t>
+            </a:r>
+          </a:p>
+        </p:txBody>
+      </p:sp>
+      <p:sp>
+        <p:nvSpPr>
+          <p:cNvPr id="4" name="フッター プレースホルダー 3">
+            <a:extLst>
+              <a:ext uri="{FF2B5EF4-FFF2-40B4-BE49-F238E27FC236}">
+                <a16:creationId xmlns:a16="http://schemas.microsoft.com/office/drawing/2014/main" id="{5C367B80-435F-A245-854C-33308EC401C0}"/>
+              </a:ext>
+            </a:extLst>
+          </p:cNvPr>
+          <p:cNvSpPr>
+            <a:spLocks noGrp="1"/>
+          </p:cNvSpPr>
+          <p:nvPr>
+            <p:ph type="ftr" sz="quarter" idx="11"/>
+          </p:nvPr>
+        </p:nvSpPr>
+        <p:spPr/>
+        <p:txBody>
+          <a:bodyPr/>
+          <a:lstStyle/>
+          <a:p>
+            <a:r>
+              <a:rPr kumimoji="1" lang="en-US" altLang="ja-JP"/>
+              <a:t>Copyright (c) 2019 Zettant Inc.</a:t>
+            </a:r>
+            <a:endParaRPr kumimoji="1" lang="ja-JP" altLang="en-US" dirty="0"/>
+          </a:p>
+        </p:txBody>
+      </p:sp>
+      <p:sp>
+        <p:nvSpPr>
+          <p:cNvPr id="5" name="スライド番号プレースホルダー 4">
+            <a:extLst>
+              <a:ext uri="{FF2B5EF4-FFF2-40B4-BE49-F238E27FC236}">
+                <a16:creationId xmlns:a16="http://schemas.microsoft.com/office/drawing/2014/main" id="{F0CF3E8B-FC7D-0F4A-AE57-F39FEA3EFF46}"/>
+              </a:ext>
+            </a:extLst>
+          </p:cNvPr>
+          <p:cNvSpPr>
+            <a:spLocks noGrp="1"/>
+          </p:cNvSpPr>
+          <p:nvPr>
+            <p:ph type="sldNum" sz="quarter" idx="12"/>
+          </p:nvPr>
+        </p:nvSpPr>
+        <p:spPr/>
+        <p:txBody>
+          <a:bodyPr/>
+          <a:lstStyle/>
+          <a:p>
+            <a:fld id="{1726EC67-F370-534A-B256-AF4D6E27D0FA}" type="slidenum">
+              <a:rPr kumimoji="1" lang="ja-JP" altLang="en-US" smtClean="0"/>
+              <a:t>23</a:t>
+            </a:fld>
+            <a:endParaRPr kumimoji="1" lang="ja-JP" altLang="en-US"/>
+          </a:p>
+        </p:txBody>
+      </p:sp>
+    </p:spTree>
+    <p:extLst>
+      <p:ext uri="{BB962C8B-B14F-4D97-AF65-F5344CB8AC3E}">
+        <p14:creationId xmlns:p14="http://schemas.microsoft.com/office/powerpoint/2010/main" val="3966295593"/>
+      </p:ext>
+    </p:extLst>
+  </p:cSld>
+  <p:clrMapOvr>
+    <a:masterClrMapping/>
+  </p:clrMapOvr>
+</p:sld>
+</file>
+
+<file path=ppt/slides/slide24.xml><?xml version="1.0" encoding="utf-8"?>
+<p:sld xmlns:a="http://schemas.openxmlformats.org/drawingml/2006/main" xmlns:r="http://schemas.openxmlformats.org/officeDocument/2006/relationships" xmlns:p="http://schemas.openxmlformats.org/presentationml/2006/main">
+  <p:cSld>
+    <p:spTree>
+      <p:nvGrpSpPr>
+        <p:cNvPr id="1" name=""/>
+        <p:cNvGrpSpPr/>
+        <p:nvPr/>
+      </p:nvGrpSpPr>
+      <p:grpSpPr>
+        <a:xfrm>
+          <a:off x="0" y="0"/>
+          <a:ext cx="0" cy="0"/>
+          <a:chOff x="0" y="0"/>
+          <a:chExt cx="0" cy="0"/>
+        </a:xfrm>
+      </p:grpSpPr>
+      <p:sp>
+        <p:nvSpPr>
+          <p:cNvPr id="2" name="タイトル 1">
+            <a:extLst>
+              <a:ext uri="{FF2B5EF4-FFF2-40B4-BE49-F238E27FC236}">
+                <a16:creationId xmlns:a16="http://schemas.microsoft.com/office/drawing/2014/main" id="{2140C7F0-654E-D743-BA22-E00E0B0046C3}"/>
+              </a:ext>
+            </a:extLst>
+          </p:cNvPr>
+          <p:cNvSpPr>
+            <a:spLocks noGrp="1"/>
+          </p:cNvSpPr>
+          <p:nvPr>
+            <p:ph type="title"/>
+          </p:nvPr>
+        </p:nvSpPr>
+        <p:spPr/>
+        <p:txBody>
+          <a:bodyPr/>
+          <a:lstStyle/>
+          <a:p>
+            <a:r>
+              <a:rPr kumimoji="1" lang="en-US" altLang="ja-JP" dirty="0"/>
+              <a:t>Neo4j</a:t>
+            </a:r>
+            <a:r>
+              <a:rPr kumimoji="1" lang="ja-JP" altLang="en-US"/>
+              <a:t>に対応するために</a:t>
+            </a:r>
+          </a:p>
+        </p:txBody>
+      </p:sp>
+      <p:sp>
+        <p:nvSpPr>
+          <p:cNvPr id="3" name="コンテンツ プレースホルダー 2">
+            <a:extLst>
+              <a:ext uri="{FF2B5EF4-FFF2-40B4-BE49-F238E27FC236}">
+                <a16:creationId xmlns:a16="http://schemas.microsoft.com/office/drawing/2014/main" id="{2064312D-481B-0A48-8A40-7BADDEFCFF3B}"/>
+              </a:ext>
+            </a:extLst>
+          </p:cNvPr>
+          <p:cNvSpPr>
+            <a:spLocks noGrp="1"/>
+          </p:cNvSpPr>
+          <p:nvPr>
+            <p:ph idx="1"/>
+          </p:nvPr>
+        </p:nvSpPr>
+        <p:spPr/>
+        <p:txBody>
+          <a:bodyPr/>
+          <a:lstStyle/>
+          <a:p>
+            <a:r>
+              <a:rPr kumimoji="1" lang="en-US" altLang="ja-JP" dirty="0" err="1"/>
+              <a:t>BBcAsset</a:t>
+            </a:r>
+            <a:r>
+              <a:rPr kumimoji="1" lang="ja-JP" altLang="en-US"/>
+              <a:t>の</a:t>
+            </a:r>
+            <a:r>
+              <a:rPr lang="en-US" altLang="ja-JP" dirty="0" err="1"/>
+              <a:t>asset_body</a:t>
+            </a:r>
+            <a:r>
+              <a:rPr lang="ja-JP" altLang="en-US"/>
+              <a:t>には、</a:t>
+            </a:r>
+            <a:r>
+              <a:rPr lang="en-US" altLang="ja-JP" dirty="0"/>
+              <a:t>JSON</a:t>
+            </a:r>
+            <a:r>
+              <a:rPr lang="ja-JP" altLang="en-US"/>
+              <a:t>文字列を記述するものとする</a:t>
+            </a:r>
+            <a:endParaRPr lang="en-US" altLang="ja-JP" dirty="0"/>
+          </a:p>
+          <a:p>
+            <a:pPr lvl="1"/>
+            <a:r>
+              <a:rPr kumimoji="1" lang="ja-JP" altLang="en-US"/>
+              <a:t>そのままそれをグラフのノードのプロパティとすることで、</a:t>
+            </a:r>
+            <a:r>
+              <a:rPr kumimoji="1" lang="en-US" altLang="ja-JP" dirty="0" err="1"/>
+              <a:t>asset_body</a:t>
+            </a:r>
+            <a:r>
+              <a:rPr kumimoji="1" lang="ja-JP" altLang="en-US"/>
+              <a:t>の内容でも検索できるようになる</a:t>
+            </a:r>
+            <a:endParaRPr kumimoji="1" lang="en-US" altLang="ja-JP" dirty="0"/>
+          </a:p>
+          <a:p>
+            <a:endParaRPr lang="en-US" altLang="ja-JP" dirty="0"/>
+          </a:p>
+          <a:p>
+            <a:r>
+              <a:rPr kumimoji="1" lang="en-US" altLang="ja-JP" dirty="0"/>
+              <a:t>Neo4j</a:t>
+            </a:r>
+            <a:r>
+              <a:rPr kumimoji="1" lang="ja-JP" altLang="en-US"/>
+              <a:t>では、</a:t>
+            </a:r>
+            <a:r>
+              <a:rPr kumimoji="1" lang="en-US" altLang="ja-JP" dirty="0" err="1"/>
+              <a:t>transaction_id</a:t>
+            </a:r>
+            <a:r>
+              <a:rPr kumimoji="1" lang="ja-JP" altLang="en-US"/>
+              <a:t>など各種</a:t>
+            </a:r>
+            <a:r>
+              <a:rPr kumimoji="1" lang="en-US" altLang="ja-JP" dirty="0"/>
+              <a:t>ID</a:t>
+            </a:r>
+            <a:r>
+              <a:rPr kumimoji="1" lang="ja-JP" altLang="en-US"/>
+              <a:t>はバイナリではなく</a:t>
+            </a:r>
+            <a:r>
+              <a:rPr kumimoji="1" lang="en-US" altLang="ja-JP" dirty="0"/>
+              <a:t>16</a:t>
+            </a:r>
+            <a:r>
+              <a:rPr lang="ja-JP" altLang="en-US"/>
+              <a:t>進文字列化してプロパティとして登録する</a:t>
+            </a:r>
+            <a:endParaRPr lang="en-US" altLang="ja-JP" dirty="0"/>
+          </a:p>
+          <a:p>
+            <a:pPr lvl="1"/>
+            <a:r>
+              <a:rPr kumimoji="1" lang="en-US" altLang="ja-JP" dirty="0"/>
+              <a:t>Pros: </a:t>
+            </a:r>
+            <a:r>
+              <a:rPr kumimoji="1" lang="ja-JP" altLang="en-US"/>
+              <a:t>可視化しやすくなる。実装しやすくなる</a:t>
+            </a:r>
+            <a:endParaRPr kumimoji="1" lang="en-US" altLang="ja-JP" dirty="0"/>
+          </a:p>
+          <a:p>
+            <a:pPr lvl="1"/>
+            <a:r>
+              <a:rPr lang="en-US" altLang="ja-JP" dirty="0"/>
+              <a:t>Cons:</a:t>
+            </a:r>
+            <a:r>
+              <a:rPr lang="ja-JP" altLang="en-US"/>
+              <a:t> データサイズが</a:t>
+            </a:r>
+            <a:r>
+              <a:rPr lang="en-US" altLang="ja-JP" dirty="0"/>
+              <a:t>2</a:t>
+            </a:r>
+            <a:r>
+              <a:rPr lang="ja-JP" altLang="en-US"/>
+              <a:t>倍になる</a:t>
+            </a:r>
+            <a:endParaRPr lang="en-US" altLang="ja-JP" dirty="0"/>
+          </a:p>
+          <a:p>
+            <a:endParaRPr kumimoji="1" lang="ja-JP" altLang="en-US"/>
+          </a:p>
+        </p:txBody>
+      </p:sp>
+      <p:sp>
+        <p:nvSpPr>
+          <p:cNvPr id="4" name="フッター プレースホルダー 3">
+            <a:extLst>
+              <a:ext uri="{FF2B5EF4-FFF2-40B4-BE49-F238E27FC236}">
+                <a16:creationId xmlns:a16="http://schemas.microsoft.com/office/drawing/2014/main" id="{D7B2189D-3C09-BA48-883D-9E562614A988}"/>
+              </a:ext>
+            </a:extLst>
+          </p:cNvPr>
+          <p:cNvSpPr>
+            <a:spLocks noGrp="1"/>
+          </p:cNvSpPr>
+          <p:nvPr>
+            <p:ph type="ftr" sz="quarter" idx="11"/>
+          </p:nvPr>
+        </p:nvSpPr>
+        <p:spPr/>
+        <p:txBody>
+          <a:bodyPr/>
+          <a:lstStyle/>
+          <a:p>
+            <a:r>
+              <a:rPr kumimoji="1" lang="en-US" altLang="ja-JP"/>
+              <a:t>Copyright (c) 2019 Zettant Inc.</a:t>
+            </a:r>
+            <a:endParaRPr kumimoji="1" lang="ja-JP" altLang="en-US" dirty="0"/>
+          </a:p>
+        </p:txBody>
+      </p:sp>
+      <p:sp>
+        <p:nvSpPr>
+          <p:cNvPr id="5" name="スライド番号プレースホルダー 4">
+            <a:extLst>
+              <a:ext uri="{FF2B5EF4-FFF2-40B4-BE49-F238E27FC236}">
+                <a16:creationId xmlns:a16="http://schemas.microsoft.com/office/drawing/2014/main" id="{EFCA7EEB-D7C8-6142-9C21-D8AB85D66184}"/>
+              </a:ext>
+            </a:extLst>
+          </p:cNvPr>
+          <p:cNvSpPr>
+            <a:spLocks noGrp="1"/>
+          </p:cNvSpPr>
+          <p:nvPr>
+            <p:ph type="sldNum" sz="quarter" idx="12"/>
+          </p:nvPr>
+        </p:nvSpPr>
+        <p:spPr/>
+        <p:txBody>
+          <a:bodyPr/>
+          <a:lstStyle/>
+          <a:p>
+            <a:fld id="{1726EC67-F370-534A-B256-AF4D6E27D0FA}" type="slidenum">
+              <a:rPr kumimoji="1" lang="ja-JP" altLang="en-US" smtClean="0"/>
+              <a:t>24</a:t>
+            </a:fld>
+            <a:endParaRPr kumimoji="1" lang="ja-JP" altLang="en-US"/>
+          </a:p>
+        </p:txBody>
+      </p:sp>
+    </p:spTree>
+    <p:extLst>
+      <p:ext uri="{BB962C8B-B14F-4D97-AF65-F5344CB8AC3E}">
+        <p14:creationId xmlns:p14="http://schemas.microsoft.com/office/powerpoint/2010/main" val="453106705"/>
+      </p:ext>
+    </p:extLst>
+  </p:cSld>
+  <p:clrMapOvr>
+    <a:masterClrMapping/>
+  </p:clrMapOvr>
+</p:sld>
+</file>
+
+<file path=ppt/slides/slide25.xml><?xml version="1.0" encoding="utf-8"?>
+<p:sld xmlns:a="http://schemas.openxmlformats.org/drawingml/2006/main" xmlns:r="http://schemas.openxmlformats.org/officeDocument/2006/relationships" xmlns:p="http://schemas.openxmlformats.org/presentationml/2006/main">
+  <p:cSld>
+    <p:spTree>
+      <p:nvGrpSpPr>
+        <p:cNvPr id="1" name=""/>
+        <p:cNvGrpSpPr/>
+        <p:nvPr/>
+      </p:nvGrpSpPr>
+      <p:grpSpPr>
+        <a:xfrm>
+          <a:off x="0" y="0"/>
+          <a:ext cx="0" cy="0"/>
+          <a:chOff x="0" y="0"/>
+          <a:chExt cx="0" cy="0"/>
+        </a:xfrm>
+      </p:grpSpPr>
+      <p:sp>
+        <p:nvSpPr>
+          <p:cNvPr id="2" name="タイトル 1">
+            <a:extLst>
+              <a:ext uri="{FF2B5EF4-FFF2-40B4-BE49-F238E27FC236}">
+                <a16:creationId xmlns:a16="http://schemas.microsoft.com/office/drawing/2014/main" id="{75E2EE3F-C517-DF47-8A63-E3E1860B3FA8}"/>
+              </a:ext>
+            </a:extLst>
+          </p:cNvPr>
+          <p:cNvSpPr>
+            <a:spLocks noGrp="1"/>
+          </p:cNvSpPr>
+          <p:nvPr>
+            <p:ph type="title"/>
+          </p:nvPr>
+        </p:nvSpPr>
+        <p:spPr/>
+        <p:txBody>
+          <a:bodyPr/>
+          <a:lstStyle/>
+          <a:p>
+            <a:r>
+              <a:rPr kumimoji="1" lang="ja-JP" altLang="en-US"/>
+              <a:t>以上</a:t>
+            </a:r>
+          </a:p>
+        </p:txBody>
+      </p:sp>
+      <p:sp>
+        <p:nvSpPr>
+          <p:cNvPr id="4" name="フッター プレースホルダー 3">
+            <a:extLst>
+              <a:ext uri="{FF2B5EF4-FFF2-40B4-BE49-F238E27FC236}">
+                <a16:creationId xmlns:a16="http://schemas.microsoft.com/office/drawing/2014/main" id="{3938C2CD-D546-EB44-94CB-BE1AAE5509EC}"/>
+              </a:ext>
+            </a:extLst>
+          </p:cNvPr>
+          <p:cNvSpPr>
+            <a:spLocks noGrp="1"/>
+          </p:cNvSpPr>
+          <p:nvPr>
+            <p:ph type="ftr" sz="quarter" idx="11"/>
+          </p:nvPr>
+        </p:nvSpPr>
+        <p:spPr/>
+        <p:txBody>
+          <a:bodyPr/>
+          <a:lstStyle/>
+          <a:p>
+            <a:r>
+              <a:rPr kumimoji="1" lang="en" altLang="ja-JP"/>
+              <a:t>Copyright (c) 2019 Zettant Inc.</a:t>
+            </a:r>
+            <a:endParaRPr kumimoji="1" lang="ja-JP" altLang="en-US" dirty="0"/>
+          </a:p>
+        </p:txBody>
+      </p:sp>
+      <p:sp>
+        <p:nvSpPr>
+          <p:cNvPr id="5" name="スライド番号プレースホルダー 4">
+            <a:extLst>
+              <a:ext uri="{FF2B5EF4-FFF2-40B4-BE49-F238E27FC236}">
+                <a16:creationId xmlns:a16="http://schemas.microsoft.com/office/drawing/2014/main" id="{A282EED2-9D9C-744F-B60E-367F8C71DB35}"/>
+              </a:ext>
+            </a:extLst>
+          </p:cNvPr>
+          <p:cNvSpPr>
+            <a:spLocks noGrp="1"/>
+          </p:cNvSpPr>
+          <p:nvPr>
+            <p:ph type="sldNum" sz="quarter" idx="12"/>
+          </p:nvPr>
+        </p:nvSpPr>
+        <p:spPr/>
+        <p:txBody>
+          <a:bodyPr/>
+          <a:lstStyle/>
+          <a:p>
+            <a:fld id="{1726EC67-F370-534A-B256-AF4D6E27D0FA}" type="slidenum">
+              <a:rPr kumimoji="1" lang="ja-JP" altLang="en-US" smtClean="0"/>
+              <a:t>25</a:t>
             </a:fld>
             <a:endParaRPr kumimoji="1" lang="ja-JP" altLang="en-US"/>
           </a:p>
@@ -10213,7 +13620,7 @@
             <p:ph idx="1"/>
             <p:extLst>
               <p:ext uri="{D42A27DB-BD31-4B8C-83A1-F6EECF244321}">
-                <p14:modId xmlns:p14="http://schemas.microsoft.com/office/powerpoint/2010/main" val="2947814975"/>
+                <p14:modId xmlns:p14="http://schemas.microsoft.com/office/powerpoint/2010/main" val="1650672815"/>
               </p:ext>
             </p:extLst>
           </p:nvPr>
@@ -10594,20 +14001,12 @@
                         <a:defRPr/>
                       </a:pPr>
                       <a:r>
-                        <a:rPr lang="en-US" altLang="ja-JP" sz="2400" b="0" i="0" dirty="0">
-                          <a:latin typeface="Hiragino Kaku Gothic Pro W3" panose="020B0300000000000000" pitchFamily="34" charset="-128"/>
-                          <a:ea typeface="Hiragino Kaku Gothic Pro W3" panose="020B0300000000000000" pitchFamily="34" charset="-128"/>
-                          <a:cs typeface="MS PGothic" charset="-128"/>
-                        </a:rPr>
-                        <a:t>Neo4j</a:t>
-                      </a:r>
-                      <a:r>
                         <a:rPr lang="ja-JP" altLang="en-US" sz="2400" b="0" i="0">
                           <a:latin typeface="Hiragino Kaku Gothic Pro W3" panose="020B0300000000000000" pitchFamily="34" charset="-128"/>
                           <a:ea typeface="Hiragino Kaku Gothic Pro W3" panose="020B0300000000000000" pitchFamily="34" charset="-128"/>
                           <a:cs typeface="MS PGothic" charset="-128"/>
                         </a:rPr>
-                        <a:t>への適用</a:t>
+                        <a:t>システム構成</a:t>
                       </a:r>
                       <a:endParaRPr lang="en-US" altLang="ja-JP" sz="2400" b="0" i="0" dirty="0">
                         <a:latin typeface="Hiragino Kaku Gothic Pro W3" panose="020B0300000000000000" pitchFamily="34" charset="-128"/>
@@ -10695,7 +14094,40 @@
                     <a:bodyPr/>
                     <a:lstStyle/>
                     <a:p>
-                      <a:endParaRPr kumimoji="1" lang="en-US" altLang="ja-JP" sz="2400" b="0" i="0" dirty="0">
+                      <a:pPr marL="0" marR="0" lvl="0" indent="0" algn="l" defTabSz="914400" rtl="0" eaLnBrk="1" fontAlgn="auto" latinLnBrk="0" hangingPunct="1">
+                        <a:lnSpc>
+                          <a:spcPct val="100000"/>
+                        </a:lnSpc>
+                        <a:spcBef>
+                          <a:spcPts val="0"/>
+                        </a:spcBef>
+                        <a:spcAft>
+                          <a:spcPts val="0"/>
+                        </a:spcAft>
+                        <a:buClrTx/>
+                        <a:buSzTx/>
+                        <a:buFontTx/>
+                        <a:buNone/>
+                        <a:tabLst/>
+                        <a:defRPr/>
+                      </a:pPr>
+                      <a:r>
+                        <a:rPr lang="en-US" altLang="ja-JP" sz="2400" b="0" i="0" dirty="0">
+                          <a:latin typeface="Hiragino Kaku Gothic Pro W3" panose="020B0300000000000000" pitchFamily="34" charset="-128"/>
+                          <a:ea typeface="Hiragino Kaku Gothic Pro W3" panose="020B0300000000000000" pitchFamily="34" charset="-128"/>
+                          <a:cs typeface="MS PGothic" charset="-128"/>
+                        </a:rPr>
+                        <a:t>Neo4j</a:t>
+                      </a:r>
+                      <a:r>
+                        <a:rPr lang="ja-JP" altLang="en-US" sz="2400" b="0" i="0">
+                          <a:latin typeface="Hiragino Kaku Gothic Pro W3" panose="020B0300000000000000" pitchFamily="34" charset="-128"/>
+                          <a:ea typeface="Hiragino Kaku Gothic Pro W3" panose="020B0300000000000000" pitchFamily="34" charset="-128"/>
+                          <a:cs typeface="MS PGothic" charset="-128"/>
+                        </a:rPr>
+                        <a:t>への適用</a:t>
+                      </a:r>
+                      <a:endParaRPr lang="en-US" altLang="ja-JP" sz="2400" b="0" i="0" dirty="0">
                         <a:latin typeface="Hiragino Kaku Gothic Pro W3" panose="020B0300000000000000" pitchFamily="34" charset="-128"/>
                         <a:ea typeface="Hiragino Kaku Gothic Pro W3" panose="020B0300000000000000" pitchFamily="34" charset="-128"/>
                         <a:cs typeface="MS PGothic" charset="-128"/>
@@ -10731,6 +14163,14 @@
                     <a:lstStyle/>
                     <a:p>
                       <a:pPr algn="r"/>
+                      <a:r>
+                        <a:rPr kumimoji="1" lang="en-US" altLang="ja-JP" sz="2400" b="0" i="0">
+                          <a:latin typeface="Hiragino Kaku Gothic Pro W3" panose="020B0300000000000000" pitchFamily="34" charset="-128"/>
+                          <a:ea typeface="Hiragino Kaku Gothic Pro W3" panose="020B0300000000000000" pitchFamily="34" charset="-128"/>
+                          <a:cs typeface="MS PGothic" charset="-128"/>
+                        </a:rPr>
+                        <a:t>22</a:t>
+                      </a:r>
                       <a:endParaRPr kumimoji="1" lang="ja-JP" altLang="en-US" sz="2400" b="0" i="0" dirty="0">
                         <a:latin typeface="Hiragino Kaku Gothic Pro W3" panose="020B0300000000000000" pitchFamily="34" charset="-128"/>
                         <a:ea typeface="Hiragino Kaku Gothic Pro W3" panose="020B0300000000000000" pitchFamily="34" charset="-128"/>

</xml_diff>